<commit_message>
insert and check on ppt
dataflow diagram amd er diagram for finalize the ppt and also add in ppt .check it
</commit_message>
<xml_diff>
--- a/Project letrature/IMAGE_STEGNOGRAPHY_USING_PYTHON.pptx
+++ b/Project letrature/IMAGE_STEGNOGRAPHY_USING_PYTHON.pptx
@@ -5,7 +5,7 @@
     <p:sldMasterId id="2147483810" r:id="rId1"/>
   </p:sldMasterIdLst>
   <p:notesMasterIdLst>
-    <p:notesMasterId r:id="rId32"/>
+    <p:notesMasterId r:id="rId33"/>
   </p:notesMasterIdLst>
   <p:sldIdLst>
     <p:sldId id="256" r:id="rId2"/>
@@ -28,16 +28,17 @@
     <p:sldId id="287" r:id="rId19"/>
     <p:sldId id="264" r:id="rId20"/>
     <p:sldId id="265" r:id="rId21"/>
-    <p:sldId id="266" r:id="rId22"/>
-    <p:sldId id="267" r:id="rId23"/>
-    <p:sldId id="270" r:id="rId24"/>
-    <p:sldId id="272" r:id="rId25"/>
-    <p:sldId id="268" r:id="rId26"/>
-    <p:sldId id="269" r:id="rId27"/>
-    <p:sldId id="282" r:id="rId28"/>
-    <p:sldId id="260" r:id="rId29"/>
-    <p:sldId id="274" r:id="rId30"/>
-    <p:sldId id="261" r:id="rId31"/>
+    <p:sldId id="288" r:id="rId22"/>
+    <p:sldId id="266" r:id="rId23"/>
+    <p:sldId id="267" r:id="rId24"/>
+    <p:sldId id="270" r:id="rId25"/>
+    <p:sldId id="272" r:id="rId26"/>
+    <p:sldId id="268" r:id="rId27"/>
+    <p:sldId id="269" r:id="rId28"/>
+    <p:sldId id="282" r:id="rId29"/>
+    <p:sldId id="260" r:id="rId30"/>
+    <p:sldId id="274" r:id="rId31"/>
+    <p:sldId id="261" r:id="rId32"/>
   </p:sldIdLst>
   <p:sldSz cx="12192000" cy="6858000"/>
   <p:notesSz cx="6858000" cy="9144000"/>
@@ -161,6 +162,7 @@
             <p14:sldId id="287"/>
             <p14:sldId id="264"/>
             <p14:sldId id="265"/>
+            <p14:sldId id="288"/>
             <p14:sldId id="266"/>
             <p14:sldId id="267"/>
             <p14:sldId id="270"/>
@@ -316,7 +318,7 @@
             <a:fld id="{1252D0FE-5E30-45DE-9C63-F50EB893C606}" type="datetimeFigureOut">
               <a:rPr lang="en-IN" smtClean="0"/>
               <a:pPr/>
-              <a:t>26-04-2020</a:t>
+              <a:t>27-04-2020</a:t>
             </a:fld>
             <a:endParaRPr lang="en-IN"/>
           </a:p>
@@ -774,7 +776,7 @@
             <a:fld id="{2F669B78-F9AA-4692-8AFB-7CA7ABB16088}" type="datetimeFigureOut">
               <a:rPr lang="en-IN" smtClean="0"/>
               <a:pPr/>
-              <a:t>26-04-2020</a:t>
+              <a:t>27-04-2020</a:t>
             </a:fld>
             <a:endParaRPr lang="en-IN"/>
           </a:p>
@@ -1114,7 +1116,7 @@
             <a:fld id="{2F669B78-F9AA-4692-8AFB-7CA7ABB16088}" type="datetimeFigureOut">
               <a:rPr lang="en-IN" smtClean="0"/>
               <a:pPr/>
-              <a:t>26-04-2020</a:t>
+              <a:t>27-04-2020</a:t>
             </a:fld>
             <a:endParaRPr lang="en-IN"/>
           </a:p>
@@ -1517,7 +1519,7 @@
             <a:fld id="{2F669B78-F9AA-4692-8AFB-7CA7ABB16088}" type="datetimeFigureOut">
               <a:rPr lang="en-IN" smtClean="0"/>
               <a:pPr/>
-              <a:t>26-04-2020</a:t>
+              <a:t>27-04-2020</a:t>
             </a:fld>
             <a:endParaRPr lang="en-IN"/>
           </a:p>
@@ -1855,7 +1857,7 @@
             <a:fld id="{2F669B78-F9AA-4692-8AFB-7CA7ABB16088}" type="datetimeFigureOut">
               <a:rPr lang="en-IN" smtClean="0"/>
               <a:pPr/>
-              <a:t>26-04-2020</a:t>
+              <a:t>27-04-2020</a:t>
             </a:fld>
             <a:endParaRPr lang="en-IN"/>
           </a:p>
@@ -2177,7 +2179,7 @@
             <a:fld id="{2F669B78-F9AA-4692-8AFB-7CA7ABB16088}" type="datetimeFigureOut">
               <a:rPr lang="en-IN" smtClean="0"/>
               <a:pPr/>
-              <a:t>26-04-2020</a:t>
+              <a:t>27-04-2020</a:t>
             </a:fld>
             <a:endParaRPr lang="en-IN"/>
           </a:p>
@@ -2575,7 +2577,7 @@
             <a:fld id="{2F669B78-F9AA-4692-8AFB-7CA7ABB16088}" type="datetimeFigureOut">
               <a:rPr lang="en-IN" smtClean="0"/>
               <a:pPr/>
-              <a:t>26-04-2020</a:t>
+              <a:t>27-04-2020</a:t>
             </a:fld>
             <a:endParaRPr lang="en-IN"/>
           </a:p>
@@ -2834,7 +2836,7 @@
             <a:fld id="{2F669B78-F9AA-4692-8AFB-7CA7ABB16088}" type="datetimeFigureOut">
               <a:rPr lang="en-IN" smtClean="0"/>
               <a:pPr/>
-              <a:t>26-04-2020</a:t>
+              <a:t>27-04-2020</a:t>
             </a:fld>
             <a:endParaRPr lang="en-IN"/>
           </a:p>
@@ -3098,7 +3100,7 @@
             <a:fld id="{2F669B78-F9AA-4692-8AFB-7CA7ABB16088}" type="datetimeFigureOut">
               <a:rPr lang="en-IN" smtClean="0"/>
               <a:pPr/>
-              <a:t>26-04-2020</a:t>
+              <a:t>27-04-2020</a:t>
             </a:fld>
             <a:endParaRPr lang="en-IN"/>
           </a:p>
@@ -3362,7 +3364,7 @@
             <a:fld id="{2F669B78-F9AA-4692-8AFB-7CA7ABB16088}" type="datetimeFigureOut">
               <a:rPr lang="en-IN" smtClean="0"/>
               <a:pPr/>
-              <a:t>26-04-2020</a:t>
+              <a:t>27-04-2020</a:t>
             </a:fld>
             <a:endParaRPr lang="en-IN"/>
           </a:p>
@@ -3693,7 +3695,7 @@
             <a:fld id="{2F669B78-F9AA-4692-8AFB-7CA7ABB16088}" type="datetimeFigureOut">
               <a:rPr lang="en-IN" smtClean="0"/>
               <a:pPr/>
-              <a:t>26-04-2020</a:t>
+              <a:t>27-04-2020</a:t>
             </a:fld>
             <a:endParaRPr lang="en-IN"/>
           </a:p>
@@ -4018,7 +4020,7 @@
             <a:fld id="{2F669B78-F9AA-4692-8AFB-7CA7ABB16088}" type="datetimeFigureOut">
               <a:rPr lang="en-IN" smtClean="0"/>
               <a:pPr/>
-              <a:t>26-04-2020</a:t>
+              <a:t>27-04-2020</a:t>
             </a:fld>
             <a:endParaRPr lang="en-IN"/>
           </a:p>
@@ -4477,7 +4479,7 @@
             <a:fld id="{2F669B78-F9AA-4692-8AFB-7CA7ABB16088}" type="datetimeFigureOut">
               <a:rPr lang="en-IN" smtClean="0"/>
               <a:pPr/>
-              <a:t>26-04-2020</a:t>
+              <a:t>27-04-2020</a:t>
             </a:fld>
             <a:endParaRPr lang="en-IN"/>
           </a:p>
@@ -4684,7 +4686,7 @@
             <a:fld id="{2F669B78-F9AA-4692-8AFB-7CA7ABB16088}" type="datetimeFigureOut">
               <a:rPr lang="en-IN" smtClean="0"/>
               <a:pPr/>
-              <a:t>26-04-2020</a:t>
+              <a:t>27-04-2020</a:t>
             </a:fld>
             <a:endParaRPr lang="en-IN"/>
           </a:p>
@@ -4863,7 +4865,7 @@
             <a:fld id="{2F669B78-F9AA-4692-8AFB-7CA7ABB16088}" type="datetimeFigureOut">
               <a:rPr lang="en-IN" smtClean="0"/>
               <a:pPr/>
-              <a:t>26-04-2020</a:t>
+              <a:t>27-04-2020</a:t>
             </a:fld>
             <a:endParaRPr lang="en-IN"/>
           </a:p>
@@ -5198,7 +5200,7 @@
             <a:fld id="{2F669B78-F9AA-4692-8AFB-7CA7ABB16088}" type="datetimeFigureOut">
               <a:rPr lang="en-IN" smtClean="0"/>
               <a:pPr/>
-              <a:t>26-04-2020</a:t>
+              <a:t>27-04-2020</a:t>
             </a:fld>
             <a:endParaRPr lang="en-IN"/>
           </a:p>
@@ -5545,7 +5547,7 @@
             <a:fld id="{2F669B78-F9AA-4692-8AFB-7CA7ABB16088}" type="datetimeFigureOut">
               <a:rPr lang="en-IN" smtClean="0"/>
               <a:pPr/>
-              <a:t>26-04-2020</a:t>
+              <a:t>27-04-2020</a:t>
             </a:fld>
             <a:endParaRPr lang="en-IN"/>
           </a:p>
@@ -7601,7 +7603,7 @@
             <a:fld id="{2F669B78-F9AA-4692-8AFB-7CA7ABB16088}" type="datetimeFigureOut">
               <a:rPr lang="en-IN" smtClean="0"/>
               <a:pPr/>
-              <a:t>26-04-2020</a:t>
+              <a:t>27-04-2020</a:t>
             </a:fld>
             <a:endParaRPr lang="en-IN"/>
           </a:p>
@@ -11707,6 +11709,74 @@
             <p:ph type="title"/>
           </p:nvPr>
         </p:nvSpPr>
+        <p:spPr/>
+        <p:txBody>
+          <a:bodyPr/>
+          <a:lstStyle/>
+          <a:p>
+            <a:endParaRPr lang="en-IN"/>
+          </a:p>
+        </p:txBody>
+      </p:sp>
+      <p:sp>
+        <p:nvSpPr>
+          <p:cNvPr id="3" name="Content Placeholder 2"/>
+          <p:cNvSpPr>
+            <a:spLocks noGrp="1"/>
+          </p:cNvSpPr>
+          <p:nvPr>
+            <p:ph idx="1"/>
+          </p:nvPr>
+        </p:nvSpPr>
+        <p:spPr/>
+        <p:txBody>
+          <a:bodyPr/>
+          <a:lstStyle/>
+          <a:p>
+            <a:endParaRPr lang="en-IN"/>
+          </a:p>
+        </p:txBody>
+      </p:sp>
+    </p:spTree>
+    <p:extLst>
+      <p:ext uri="{BB962C8B-B14F-4D97-AF65-F5344CB8AC3E}">
+        <p14:creationId xmlns:p14="http://schemas.microsoft.com/office/powerpoint/2010/main" val="3059376019"/>
+      </p:ext>
+    </p:extLst>
+  </p:cSld>
+  <p:clrMapOvr>
+    <a:masterClrMapping/>
+  </p:clrMapOvr>
+</p:sld>
+</file>
+
+<file path=ppt/slides/slide22.xml><?xml version="1.0" encoding="utf-8"?>
+<p:sld xmlns:a="http://schemas.openxmlformats.org/drawingml/2006/main" xmlns:r="http://schemas.openxmlformats.org/officeDocument/2006/relationships" xmlns:p="http://schemas.openxmlformats.org/presentationml/2006/main">
+  <p:cSld>
+    <p:spTree>
+      <p:nvGrpSpPr>
+        <p:cNvPr id="1" name=""/>
+        <p:cNvGrpSpPr/>
+        <p:nvPr/>
+      </p:nvGrpSpPr>
+      <p:grpSpPr>
+        <a:xfrm>
+          <a:off x="0" y="0"/>
+          <a:ext cx="0" cy="0"/>
+          <a:chOff x="0" y="0"/>
+          <a:chExt cx="0" cy="0"/>
+        </a:xfrm>
+      </p:grpSpPr>
+      <p:sp>
+        <p:nvSpPr>
+          <p:cNvPr id="2" name="Title 1"/>
+          <p:cNvSpPr>
+            <a:spLocks noGrp="1"/>
+          </p:cNvSpPr>
+          <p:nvPr>
+            <p:ph type="title"/>
+          </p:nvPr>
+        </p:nvSpPr>
         <p:spPr>
           <a:xfrm>
             <a:off x="2592925" y="624110"/>
@@ -11854,243 +11924,6 @@
     <p:extLst>
       <p:ext uri="{BB962C8B-B14F-4D97-AF65-F5344CB8AC3E}">
         <p14:creationId xmlns:p14="http://schemas.microsoft.com/office/powerpoint/2010/main" val="3968908613"/>
-      </p:ext>
-    </p:extLst>
-  </p:cSld>
-  <p:clrMapOvr>
-    <a:masterClrMapping/>
-  </p:clrMapOvr>
-  <p:timing>
-    <p:tnLst>
-      <p:par>
-        <p:cTn id="1" dur="indefinite" restart="never" nodeType="tmRoot"/>
-      </p:par>
-    </p:tnLst>
-  </p:timing>
-</p:sld>
-</file>
-
-<file path=ppt/slides/slide22.xml><?xml version="1.0" encoding="utf-8"?>
-<p:sld xmlns:a="http://schemas.openxmlformats.org/drawingml/2006/main" xmlns:r="http://schemas.openxmlformats.org/officeDocument/2006/relationships" xmlns:p="http://schemas.openxmlformats.org/presentationml/2006/main">
-  <p:cSld>
-    <p:spTree>
-      <p:nvGrpSpPr>
-        <p:cNvPr id="1" name=""/>
-        <p:cNvGrpSpPr/>
-        <p:nvPr/>
-      </p:nvGrpSpPr>
-      <p:grpSpPr>
-        <a:xfrm>
-          <a:off x="0" y="0"/>
-          <a:ext cx="0" cy="0"/>
-          <a:chOff x="0" y="0"/>
-          <a:chExt cx="0" cy="0"/>
-        </a:xfrm>
-      </p:grpSpPr>
-      <p:sp>
-        <p:nvSpPr>
-          <p:cNvPr id="2" name="Title 1"/>
-          <p:cNvSpPr>
-            <a:spLocks noGrp="1"/>
-          </p:cNvSpPr>
-          <p:nvPr>
-            <p:ph type="title"/>
-          </p:nvPr>
-        </p:nvSpPr>
-        <p:spPr>
-          <a:xfrm>
-            <a:off x="1421481" y="624110"/>
-            <a:ext cx="10083131" cy="1280890"/>
-          </a:xfrm>
-        </p:spPr>
-        <p:txBody>
-          <a:bodyPr/>
-          <a:lstStyle/>
-          <a:p>
-            <a:pPr algn="ctr"/>
-            <a:r>
-              <a:rPr lang="en-US" dirty="0" smtClean="0">
-                <a:latin typeface="Algerian" panose="04020705040A02060702" pitchFamily="82" charset="0"/>
-              </a:rPr>
-              <a:t>Steganography gui module</a:t>
-            </a:r>
-            <a:r>
-              <a:rPr lang="en-US" dirty="0" smtClean="0"/>
-              <a:t/>
-            </a:r>
-            <a:br>
-              <a:rPr lang="en-US" dirty="0" smtClean="0"/>
-            </a:br>
-            <a:endParaRPr lang="en-IN" dirty="0"/>
-          </a:p>
-        </p:txBody>
-      </p:sp>
-      <p:pic>
-        <p:nvPicPr>
-          <p:cNvPr id="5" name="Picture 4"/>
-          <p:cNvPicPr>
-            <a:picLocks noChangeAspect="1"/>
-          </p:cNvPicPr>
-          <p:nvPr/>
-        </p:nvPicPr>
-        <p:blipFill>
-          <a:blip r:embed="rId2" cstate="print"/>
-          <a:stretch>
-            <a:fillRect/>
-          </a:stretch>
-        </p:blipFill>
-        <p:spPr>
-          <a:xfrm>
-            <a:off x="6588019" y="1801305"/>
-            <a:ext cx="5318036" cy="4255845"/>
-          </a:xfrm>
-          <a:prstGeom prst="rect">
-            <a:avLst/>
-          </a:prstGeom>
-        </p:spPr>
-      </p:pic>
-      <p:pic>
-        <p:nvPicPr>
-          <p:cNvPr id="7" name="Content Placeholder 6"/>
-          <p:cNvPicPr>
-            <a:picLocks noGrp="1" noChangeAspect="1"/>
-          </p:cNvPicPr>
-          <p:nvPr>
-            <p:ph idx="1"/>
-          </p:nvPr>
-        </p:nvPicPr>
-        <p:blipFill>
-          <a:blip r:embed="rId3" cstate="print"/>
-          <a:stretch>
-            <a:fillRect/>
-          </a:stretch>
-        </p:blipFill>
-        <p:spPr>
-          <a:xfrm>
-            <a:off x="1421481" y="2040102"/>
-            <a:ext cx="4689808" cy="3778250"/>
-          </a:xfrm>
-          <a:prstGeom prst="rect">
-            <a:avLst/>
-          </a:prstGeom>
-        </p:spPr>
-      </p:pic>
-      <p:cxnSp>
-        <p:nvCxnSpPr>
-          <p:cNvPr id="9" name="Straight Arrow Connector 8"/>
-          <p:cNvCxnSpPr>
-            <a:stCxn id="7" idx="3"/>
-            <a:endCxn id="5" idx="1"/>
-          </p:cNvCxnSpPr>
-          <p:nvPr/>
-        </p:nvCxnSpPr>
-        <p:spPr>
-          <a:xfrm>
-            <a:off x="6111289" y="3929227"/>
-            <a:ext cx="476730" cy="1"/>
-          </a:xfrm>
-          <a:prstGeom prst="straightConnector1">
-            <a:avLst/>
-          </a:prstGeom>
-          <a:ln>
-            <a:solidFill>
-              <a:schemeClr val="tx1"/>
-            </a:solidFill>
-            <a:tailEnd type="triangle"/>
-          </a:ln>
-        </p:spPr>
-        <p:style>
-          <a:lnRef idx="1">
-            <a:schemeClr val="accent3"/>
-          </a:lnRef>
-          <a:fillRef idx="0">
-            <a:schemeClr val="accent3"/>
-          </a:fillRef>
-          <a:effectRef idx="0">
-            <a:schemeClr val="accent3"/>
-          </a:effectRef>
-          <a:fontRef idx="minor">
-            <a:schemeClr val="tx1"/>
-          </a:fontRef>
-        </p:style>
-      </p:cxnSp>
-      <p:sp>
-        <p:nvSpPr>
-          <p:cNvPr id="10" name="TextBox 9"/>
-          <p:cNvSpPr txBox="1"/>
-          <p:nvPr/>
-        </p:nvSpPr>
-        <p:spPr>
-          <a:xfrm>
-            <a:off x="7607431" y="6287679"/>
-            <a:ext cx="3619893" cy="646331"/>
-          </a:xfrm>
-          <a:prstGeom prst="rect">
-            <a:avLst/>
-          </a:prstGeom>
-          <a:noFill/>
-        </p:spPr>
-        <p:txBody>
-          <a:bodyPr wrap="square" rtlCol="0">
-            <a:spAutoFit/>
-          </a:bodyPr>
-          <a:lstStyle/>
-          <a:p>
-            <a:r>
-              <a:rPr lang="en-US" dirty="0">
-                <a:latin typeface="Algerian" panose="04020705040A02060702" pitchFamily="82" charset="0"/>
-              </a:rPr>
-              <a:t>Steganography gui module</a:t>
-            </a:r>
-            <a:r>
-              <a:rPr lang="en-US" dirty="0"/>
-              <a:t/>
-            </a:r>
-            <a:br>
-              <a:rPr lang="en-US" dirty="0"/>
-            </a:br>
-            <a:endParaRPr lang="en-IN" dirty="0"/>
-          </a:p>
-        </p:txBody>
-      </p:sp>
-      <p:sp>
-        <p:nvSpPr>
-          <p:cNvPr id="11" name="Rectangle 10"/>
-          <p:cNvSpPr/>
-          <p:nvPr/>
-        </p:nvSpPr>
-        <p:spPr>
-          <a:xfrm>
-            <a:off x="2590422" y="6287679"/>
-            <a:ext cx="2351926" cy="369332"/>
-          </a:xfrm>
-          <a:prstGeom prst="rect">
-            <a:avLst/>
-          </a:prstGeom>
-        </p:spPr>
-        <p:txBody>
-          <a:bodyPr wrap="none">
-            <a:spAutoFit/>
-          </a:bodyPr>
-          <a:lstStyle/>
-          <a:p>
-            <a:pPr algn="ctr"/>
-            <a:r>
-              <a:rPr lang="en-US" dirty="0">
-                <a:latin typeface="Algerian" panose="04020705040A02060702" pitchFamily="82" charset="0"/>
-              </a:rPr>
-              <a:t>User login window</a:t>
-            </a:r>
-            <a:endParaRPr lang="en-IN" dirty="0">
-              <a:latin typeface="Algerian" panose="04020705040A02060702" pitchFamily="82" charset="0"/>
-            </a:endParaRPr>
-          </a:p>
-        </p:txBody>
-      </p:sp>
-    </p:spTree>
-    <p:extLst>
-      <p:ext uri="{BB962C8B-B14F-4D97-AF65-F5344CB8AC3E}">
-        <p14:creationId xmlns:p14="http://schemas.microsoft.com/office/powerpoint/2010/main" val="1379778435"/>
       </p:ext>
     </p:extLst>
   </p:cSld>
@@ -12126,76 +11959,208 @@
       </p:grpSpPr>
       <p:sp>
         <p:nvSpPr>
-          <p:cNvPr id="3" name="TextBox 2"/>
-          <p:cNvSpPr txBox="1"/>
-          <p:nvPr/>
+          <p:cNvPr id="2" name="Title 1"/>
+          <p:cNvSpPr>
+            <a:spLocks noGrp="1"/>
+          </p:cNvSpPr>
+          <p:nvPr>
+            <p:ph type="title"/>
+          </p:nvPr>
         </p:nvSpPr>
         <p:spPr>
           <a:xfrm>
-            <a:off x="1687395" y="631596"/>
-            <a:ext cx="10154371" cy="646331"/>
-          </a:xfrm>
-          <a:prstGeom prst="rect">
-            <a:avLst/>
-          </a:prstGeom>
-          <a:noFill/>
-        </p:spPr>
-        <p:txBody>
-          <a:bodyPr wrap="square" rtlCol="0">
-            <a:spAutoFit/>
-          </a:bodyPr>
+            <a:off x="1421481" y="624110"/>
+            <a:ext cx="10083131" cy="1280890"/>
+          </a:xfrm>
+        </p:spPr>
+        <p:txBody>
+          <a:bodyPr/>
           <a:lstStyle/>
           <a:p>
             <a:pPr algn="ctr"/>
             <a:r>
-              <a:rPr lang="en-US" sz="3600" dirty="0" smtClean="0">
+              <a:rPr lang="en-US" dirty="0" smtClean="0">
                 <a:latin typeface="Algerian" panose="04020705040A02060702" pitchFamily="82" charset="0"/>
               </a:rPr>
-              <a:t>Encoder </a:t>
-            </a:r>
-            <a:endParaRPr lang="en-IN" sz="3600" dirty="0">
-              <a:latin typeface="Algerian" panose="04020705040A02060702" pitchFamily="82" charset="0"/>
-            </a:endParaRPr>
+              <a:t>Steganography gui module</a:t>
+            </a:r>
+            <a:r>
+              <a:rPr lang="en-US" dirty="0" smtClean="0"/>
+              <a:t/>
+            </a:r>
+            <a:br>
+              <a:rPr lang="en-US" dirty="0" smtClean="0"/>
+            </a:br>
+            <a:endParaRPr lang="en-IN" dirty="0"/>
           </a:p>
         </p:txBody>
       </p:sp>
       <p:pic>
         <p:nvPicPr>
-          <p:cNvPr id="2050" name="Picture 2"/>
+          <p:cNvPr id="5" name="Picture 4"/>
           <p:cNvPicPr>
-            <a:picLocks noChangeAspect="1" noChangeArrowheads="1"/>
+            <a:picLocks noChangeAspect="1"/>
           </p:cNvPicPr>
           <p:nvPr/>
         </p:nvPicPr>
         <p:blipFill>
           <a:blip r:embed="rId2" cstate="print"/>
-          <a:srcRect/>
           <a:stretch>
             <a:fillRect/>
           </a:stretch>
         </p:blipFill>
-        <p:spPr bwMode="auto">
+        <p:spPr>
           <a:xfrm>
-            <a:off x="1453642" y="1379220"/>
-            <a:ext cx="9967214" cy="5013349"/>
+            <a:off x="6588019" y="1801305"/>
+            <a:ext cx="5318036" cy="4255845"/>
+          </a:xfrm>
+          <a:prstGeom prst="rect">
+            <a:avLst/>
+          </a:prstGeom>
+        </p:spPr>
+      </p:pic>
+      <p:pic>
+        <p:nvPicPr>
+          <p:cNvPr id="7" name="Content Placeholder 6"/>
+          <p:cNvPicPr>
+            <a:picLocks noGrp="1" noChangeAspect="1"/>
+          </p:cNvPicPr>
+          <p:nvPr>
+            <p:ph idx="1"/>
+          </p:nvPr>
+        </p:nvPicPr>
+        <p:blipFill>
+          <a:blip r:embed="rId3" cstate="print"/>
+          <a:stretch>
+            <a:fillRect/>
+          </a:stretch>
+        </p:blipFill>
+        <p:spPr>
+          <a:xfrm>
+            <a:off x="1421481" y="2040102"/>
+            <a:ext cx="4689808" cy="3778250"/>
+          </a:xfrm>
+          <a:prstGeom prst="rect">
+            <a:avLst/>
+          </a:prstGeom>
+        </p:spPr>
+      </p:pic>
+      <p:cxnSp>
+        <p:nvCxnSpPr>
+          <p:cNvPr id="9" name="Straight Arrow Connector 8"/>
+          <p:cNvCxnSpPr>
+            <a:stCxn id="7" idx="3"/>
+            <a:endCxn id="5" idx="1"/>
+          </p:cNvCxnSpPr>
+          <p:nvPr/>
+        </p:nvCxnSpPr>
+        <p:spPr>
+          <a:xfrm>
+            <a:off x="6111289" y="3929227"/>
+            <a:ext cx="476730" cy="1"/>
+          </a:xfrm>
+          <a:prstGeom prst="straightConnector1">
+            <a:avLst/>
+          </a:prstGeom>
+          <a:ln>
+            <a:solidFill>
+              <a:schemeClr val="tx1"/>
+            </a:solidFill>
+            <a:tailEnd type="triangle"/>
+          </a:ln>
+        </p:spPr>
+        <p:style>
+          <a:lnRef idx="1">
+            <a:schemeClr val="accent3"/>
+          </a:lnRef>
+          <a:fillRef idx="0">
+            <a:schemeClr val="accent3"/>
+          </a:fillRef>
+          <a:effectRef idx="0">
+            <a:schemeClr val="accent3"/>
+          </a:effectRef>
+          <a:fontRef idx="minor">
+            <a:schemeClr val="tx1"/>
+          </a:fontRef>
+        </p:style>
+      </p:cxnSp>
+      <p:sp>
+        <p:nvSpPr>
+          <p:cNvPr id="10" name="TextBox 9"/>
+          <p:cNvSpPr txBox="1"/>
+          <p:nvPr/>
+        </p:nvSpPr>
+        <p:spPr>
+          <a:xfrm>
+            <a:off x="7607431" y="6287679"/>
+            <a:ext cx="3619893" cy="646331"/>
           </a:xfrm>
           <a:prstGeom prst="rect">
             <a:avLst/>
           </a:prstGeom>
           <a:noFill/>
-          <a:ln w="9525">
-            <a:noFill/>
-            <a:miter lim="800000"/>
-            <a:headEnd/>
-            <a:tailEnd/>
-          </a:ln>
-          <a:effectLst/>
-        </p:spPr>
-      </p:pic>
+        </p:spPr>
+        <p:txBody>
+          <a:bodyPr wrap="square" rtlCol="0">
+            <a:spAutoFit/>
+          </a:bodyPr>
+          <a:lstStyle/>
+          <a:p>
+            <a:r>
+              <a:rPr lang="en-US" dirty="0">
+                <a:latin typeface="Algerian" panose="04020705040A02060702" pitchFamily="82" charset="0"/>
+              </a:rPr>
+              <a:t>Steganography gui module</a:t>
+            </a:r>
+            <a:r>
+              <a:rPr lang="en-US" dirty="0"/>
+              <a:t/>
+            </a:r>
+            <a:br>
+              <a:rPr lang="en-US" dirty="0"/>
+            </a:br>
+            <a:endParaRPr lang="en-IN" dirty="0"/>
+          </a:p>
+        </p:txBody>
+      </p:sp>
+      <p:sp>
+        <p:nvSpPr>
+          <p:cNvPr id="11" name="Rectangle 10"/>
+          <p:cNvSpPr/>
+          <p:nvPr/>
+        </p:nvSpPr>
+        <p:spPr>
+          <a:xfrm>
+            <a:off x="2590422" y="6287679"/>
+            <a:ext cx="2351926" cy="369332"/>
+          </a:xfrm>
+          <a:prstGeom prst="rect">
+            <a:avLst/>
+          </a:prstGeom>
+        </p:spPr>
+        <p:txBody>
+          <a:bodyPr wrap="none">
+            <a:spAutoFit/>
+          </a:bodyPr>
+          <a:lstStyle/>
+          <a:p>
+            <a:pPr algn="ctr"/>
+            <a:r>
+              <a:rPr lang="en-US" dirty="0">
+                <a:latin typeface="Algerian" panose="04020705040A02060702" pitchFamily="82" charset="0"/>
+              </a:rPr>
+              <a:t>User login window</a:t>
+            </a:r>
+            <a:endParaRPr lang="en-IN" dirty="0">
+              <a:latin typeface="Algerian" panose="04020705040A02060702" pitchFamily="82" charset="0"/>
+            </a:endParaRPr>
+          </a:p>
+        </p:txBody>
+      </p:sp>
     </p:spTree>
     <p:extLst>
       <p:ext uri="{BB962C8B-B14F-4D97-AF65-F5344CB8AC3E}">
-        <p14:creationId xmlns:p14="http://schemas.microsoft.com/office/powerpoint/2010/main" val="3097096989"/>
+        <p14:creationId xmlns:p14="http://schemas.microsoft.com/office/powerpoint/2010/main" val="1379778435"/>
       </p:ext>
     </p:extLst>
   </p:cSld>
@@ -12231,32 +12196,34 @@
       </p:grpSpPr>
       <p:sp>
         <p:nvSpPr>
-          <p:cNvPr id="2" name="Title 1"/>
-          <p:cNvSpPr>
-            <a:spLocks noGrp="1"/>
-          </p:cNvSpPr>
-          <p:nvPr>
-            <p:ph type="title"/>
-          </p:nvPr>
+          <p:cNvPr id="3" name="TextBox 2"/>
+          <p:cNvSpPr txBox="1"/>
+          <p:nvPr/>
         </p:nvSpPr>
         <p:spPr>
           <a:xfrm>
-            <a:off x="1085025" y="605822"/>
-            <a:ext cx="10190375" cy="742777"/>
-          </a:xfrm>
-        </p:spPr>
-        <p:txBody>
-          <a:bodyPr/>
+            <a:off x="1687395" y="631596"/>
+            <a:ext cx="10154371" cy="646331"/>
+          </a:xfrm>
+          <a:prstGeom prst="rect">
+            <a:avLst/>
+          </a:prstGeom>
+          <a:noFill/>
+        </p:spPr>
+        <p:txBody>
+          <a:bodyPr wrap="square" rtlCol="0">
+            <a:spAutoFit/>
+          </a:bodyPr>
           <a:lstStyle/>
           <a:p>
             <a:pPr algn="ctr"/>
             <a:r>
-              <a:rPr lang="en-US" dirty="0" smtClean="0">
+              <a:rPr lang="en-US" sz="3600" dirty="0" smtClean="0">
                 <a:latin typeface="Algerian" panose="04020705040A02060702" pitchFamily="82" charset="0"/>
               </a:rPr>
-              <a:t>decoder</a:t>
-            </a:r>
-            <a:endParaRPr lang="en-IN" dirty="0">
+              <a:t>Encoder </a:t>
+            </a:r>
+            <a:endParaRPr lang="en-IN" sz="3600" dirty="0">
               <a:latin typeface="Algerian" panose="04020705040A02060702" pitchFamily="82" charset="0"/>
             </a:endParaRPr>
           </a:p>
@@ -12264,7 +12231,7 @@
       </p:sp>
       <p:pic>
         <p:nvPicPr>
-          <p:cNvPr id="3074" name="Picture 2"/>
+          <p:cNvPr id="2050" name="Picture 2"/>
           <p:cNvPicPr>
             <a:picLocks noChangeAspect="1" noChangeArrowheads="1"/>
           </p:cNvPicPr>
@@ -12279,8 +12246,8 @@
         </p:blipFill>
         <p:spPr bwMode="auto">
           <a:xfrm>
-            <a:off x="1232313" y="1499616"/>
-            <a:ext cx="10411047" cy="5077206"/>
+            <a:off x="1453642" y="1379220"/>
+            <a:ext cx="9967214" cy="5013349"/>
           </a:xfrm>
           <a:prstGeom prst="rect">
             <a:avLst/>
@@ -12298,7 +12265,7 @@
     </p:spTree>
     <p:extLst>
       <p:ext uri="{BB962C8B-B14F-4D97-AF65-F5344CB8AC3E}">
-        <p14:creationId xmlns:p14="http://schemas.microsoft.com/office/powerpoint/2010/main" val="3184472628"/>
+        <p14:creationId xmlns:p14="http://schemas.microsoft.com/office/powerpoint/2010/main" val="3097096989"/>
       </p:ext>
     </p:extLst>
   </p:cSld>
@@ -12344,6 +12311,109 @@
         </p:nvSpPr>
         <p:spPr>
           <a:xfrm>
+            <a:off x="1085025" y="605822"/>
+            <a:ext cx="10190375" cy="742777"/>
+          </a:xfrm>
+        </p:spPr>
+        <p:txBody>
+          <a:bodyPr/>
+          <a:lstStyle/>
+          <a:p>
+            <a:pPr algn="ctr"/>
+            <a:r>
+              <a:rPr lang="en-US" dirty="0" smtClean="0">
+                <a:latin typeface="Algerian" panose="04020705040A02060702" pitchFamily="82" charset="0"/>
+              </a:rPr>
+              <a:t>decoder</a:t>
+            </a:r>
+            <a:endParaRPr lang="en-IN" dirty="0">
+              <a:latin typeface="Algerian" panose="04020705040A02060702" pitchFamily="82" charset="0"/>
+            </a:endParaRPr>
+          </a:p>
+        </p:txBody>
+      </p:sp>
+      <p:pic>
+        <p:nvPicPr>
+          <p:cNvPr id="3074" name="Picture 2"/>
+          <p:cNvPicPr>
+            <a:picLocks noChangeAspect="1" noChangeArrowheads="1"/>
+          </p:cNvPicPr>
+          <p:nvPr/>
+        </p:nvPicPr>
+        <p:blipFill>
+          <a:blip r:embed="rId2" cstate="print"/>
+          <a:srcRect/>
+          <a:stretch>
+            <a:fillRect/>
+          </a:stretch>
+        </p:blipFill>
+        <p:spPr bwMode="auto">
+          <a:xfrm>
+            <a:off x="1232313" y="1499616"/>
+            <a:ext cx="10411047" cy="5077206"/>
+          </a:xfrm>
+          <a:prstGeom prst="rect">
+            <a:avLst/>
+          </a:prstGeom>
+          <a:noFill/>
+          <a:ln w="9525">
+            <a:noFill/>
+            <a:miter lim="800000"/>
+            <a:headEnd/>
+            <a:tailEnd/>
+          </a:ln>
+          <a:effectLst/>
+        </p:spPr>
+      </p:pic>
+    </p:spTree>
+    <p:extLst>
+      <p:ext uri="{BB962C8B-B14F-4D97-AF65-F5344CB8AC3E}">
+        <p14:creationId xmlns:p14="http://schemas.microsoft.com/office/powerpoint/2010/main" val="3184472628"/>
+      </p:ext>
+    </p:extLst>
+  </p:cSld>
+  <p:clrMapOvr>
+    <a:masterClrMapping/>
+  </p:clrMapOvr>
+  <p:timing>
+    <p:tnLst>
+      <p:par>
+        <p:cTn id="1" dur="indefinite" restart="never" nodeType="tmRoot"/>
+      </p:par>
+    </p:tnLst>
+  </p:timing>
+</p:sld>
+</file>
+
+<file path=ppt/slides/slide26.xml><?xml version="1.0" encoding="utf-8"?>
+<p:sld xmlns:a="http://schemas.openxmlformats.org/drawingml/2006/main" xmlns:r="http://schemas.openxmlformats.org/officeDocument/2006/relationships" xmlns:p="http://schemas.openxmlformats.org/presentationml/2006/main">
+  <p:cSld>
+    <p:spTree>
+      <p:nvGrpSpPr>
+        <p:cNvPr id="1" name=""/>
+        <p:cNvGrpSpPr/>
+        <p:nvPr/>
+      </p:nvGrpSpPr>
+      <p:grpSpPr>
+        <a:xfrm>
+          <a:off x="0" y="0"/>
+          <a:ext cx="0" cy="0"/>
+          <a:chOff x="0" y="0"/>
+          <a:chExt cx="0" cy="0"/>
+        </a:xfrm>
+      </p:grpSpPr>
+      <p:sp>
+        <p:nvSpPr>
+          <p:cNvPr id="2" name="Title 1"/>
+          <p:cNvSpPr>
+            <a:spLocks noGrp="1"/>
+          </p:cNvSpPr>
+          <p:nvPr>
+            <p:ph type="title"/>
+          </p:nvPr>
+        </p:nvSpPr>
+        <p:spPr>
+          <a:xfrm>
             <a:off x="989815" y="624110"/>
             <a:ext cx="10514798" cy="752203"/>
           </a:xfrm>
@@ -12540,7 +12610,7 @@
 </p:sld>
 </file>
 
-<file path=ppt/slides/slide26.xml><?xml version="1.0" encoding="utf-8"?>
+<file path=ppt/slides/slide27.xml><?xml version="1.0" encoding="utf-8"?>
 <p:sld xmlns:a="http://schemas.openxmlformats.org/drawingml/2006/main" xmlns:r="http://schemas.openxmlformats.org/officeDocument/2006/relationships" xmlns:p="http://schemas.openxmlformats.org/presentationml/2006/main">
   <p:cSld>
     <p:spTree>
@@ -12695,7 +12765,7 @@
 </p:sld>
 </file>
 
-<file path=ppt/slides/slide27.xml><?xml version="1.0" encoding="utf-8"?>
+<file path=ppt/slides/slide28.xml><?xml version="1.0" encoding="utf-8"?>
 <p:sld xmlns:a="http://schemas.openxmlformats.org/drawingml/2006/main" xmlns:r="http://schemas.openxmlformats.org/officeDocument/2006/relationships" xmlns:p="http://schemas.openxmlformats.org/presentationml/2006/main">
   <p:cSld>
     <p:spTree>
@@ -13133,7 +13203,7 @@
 </p:sld>
 </file>
 
-<file path=ppt/slides/slide28.xml><?xml version="1.0" encoding="utf-8"?>
+<file path=ppt/slides/slide29.xml><?xml version="1.0" encoding="utf-8"?>
 <p:sld xmlns:a="http://schemas.openxmlformats.org/drawingml/2006/main" xmlns:r="http://schemas.openxmlformats.org/officeDocument/2006/relationships" xmlns:p="http://schemas.openxmlformats.org/presentationml/2006/main">
   <p:cSld>
     <p:spTree>
@@ -13689,1108 +13759,6 @@
 </p:sld>
 </file>
 
-<file path=ppt/slides/slide29.xml><?xml version="1.0" encoding="utf-8"?>
-<p:sld xmlns:a="http://schemas.openxmlformats.org/drawingml/2006/main" xmlns:r="http://schemas.openxmlformats.org/officeDocument/2006/relationships" xmlns:p="http://schemas.openxmlformats.org/presentationml/2006/main">
-  <p:cSld>
-    <p:spTree>
-      <p:nvGrpSpPr>
-        <p:cNvPr id="1" name=""/>
-        <p:cNvGrpSpPr/>
-        <p:nvPr/>
-      </p:nvGrpSpPr>
-      <p:grpSpPr>
-        <a:xfrm>
-          <a:off x="0" y="0"/>
-          <a:ext cx="0" cy="0"/>
-          <a:chOff x="0" y="0"/>
-          <a:chExt cx="0" cy="0"/>
-        </a:xfrm>
-      </p:grpSpPr>
-      <p:sp>
-        <p:nvSpPr>
-          <p:cNvPr id="4" name="Title 3"/>
-          <p:cNvSpPr>
-            <a:spLocks noGrp="1"/>
-          </p:cNvSpPr>
-          <p:nvPr>
-            <p:ph type="title"/>
-          </p:nvPr>
-        </p:nvSpPr>
-        <p:spPr>
-          <a:xfrm>
-            <a:off x="1687399" y="624110"/>
-            <a:ext cx="9817214" cy="667362"/>
-          </a:xfrm>
-        </p:spPr>
-        <p:txBody>
-          <a:bodyPr/>
-          <a:lstStyle/>
-          <a:p>
-            <a:pPr algn="ctr"/>
-            <a:r>
-              <a:rPr lang="en-US" dirty="0" smtClean="0">
-                <a:latin typeface="Algerian" panose="04020705040A02060702" pitchFamily="82" charset="0"/>
-              </a:rPr>
-              <a:t>Conclusion </a:t>
-            </a:r>
-            <a:endParaRPr lang="en-IN" dirty="0">
-              <a:latin typeface="Algerian" panose="04020705040A02060702" pitchFamily="82" charset="0"/>
-            </a:endParaRPr>
-          </a:p>
-        </p:txBody>
-      </p:sp>
-      <p:sp>
-        <p:nvSpPr>
-          <p:cNvPr id="5" name="Content Placeholder 4"/>
-          <p:cNvSpPr>
-            <a:spLocks noGrp="1"/>
-          </p:cNvSpPr>
-          <p:nvPr>
-            <p:ph idx="1"/>
-          </p:nvPr>
-        </p:nvSpPr>
-        <p:spPr>
-          <a:xfrm>
-            <a:off x="1717376" y="1559666"/>
-            <a:ext cx="9732373" cy="5069734"/>
-          </a:xfrm>
-        </p:spPr>
-        <p:txBody>
-          <a:bodyPr/>
-          <a:lstStyle/>
-          <a:p>
-            <a:pPr marL="0">
-              <a:lnSpc>
-                <a:spcPts val="3096"/>
-              </a:lnSpc>
-              <a:spcBef>
-                <a:spcPts val="0"/>
-              </a:spcBef>
-            </a:pPr>
-            <a:r>
-              <a:rPr lang="en-US" sz="2800" dirty="0" smtClean="0">
-                <a:solidFill>
-                  <a:schemeClr val="tx1"/>
-                </a:solidFill>
-                <a:latin typeface="Arial" pitchFamily="34" charset="0"/>
-                <a:cs typeface="Arial" pitchFamily="34" charset="0"/>
-              </a:rPr>
-              <a:t>Steganography</a:t>
-            </a:r>
-            <a:r>
-              <a:rPr lang="en-US" sz="2800" spc="192" dirty="0" smtClean="0">
-                <a:solidFill>
-                  <a:schemeClr val="tx1"/>
-                </a:solidFill>
-                <a:latin typeface="Arial" pitchFamily="34" charset="0"/>
-                <a:cs typeface="Arial" pitchFamily="34" charset="0"/>
-              </a:rPr>
-              <a:t> </a:t>
-            </a:r>
-            <a:r>
-              <a:rPr lang="en-US" sz="2800" dirty="0" smtClean="0">
-                <a:solidFill>
-                  <a:schemeClr val="tx1"/>
-                </a:solidFill>
-                <a:latin typeface="Arial" pitchFamily="34" charset="0"/>
-                <a:cs typeface="Arial" pitchFamily="34" charset="0"/>
-              </a:rPr>
-              <a:t>is</a:t>
-            </a:r>
-            <a:r>
-              <a:rPr lang="en-US" sz="2800" spc="173" dirty="0" smtClean="0">
-                <a:solidFill>
-                  <a:schemeClr val="tx1"/>
-                </a:solidFill>
-                <a:latin typeface="Arial" pitchFamily="34" charset="0"/>
-                <a:cs typeface="Arial" pitchFamily="34" charset="0"/>
-              </a:rPr>
-              <a:t> </a:t>
-            </a:r>
-            <a:r>
-              <a:rPr lang="en-US" sz="2800" dirty="0" smtClean="0">
-                <a:solidFill>
-                  <a:schemeClr val="tx1"/>
-                </a:solidFill>
-                <a:latin typeface="Arial" pitchFamily="34" charset="0"/>
-                <a:cs typeface="Arial" pitchFamily="34" charset="0"/>
-              </a:rPr>
-              <a:t>the</a:t>
-            </a:r>
-            <a:r>
-              <a:rPr lang="en-US" sz="2800" spc="166" dirty="0" smtClean="0">
-                <a:solidFill>
-                  <a:schemeClr val="tx1"/>
-                </a:solidFill>
-                <a:latin typeface="Arial" pitchFamily="34" charset="0"/>
-                <a:cs typeface="Arial" pitchFamily="34" charset="0"/>
-              </a:rPr>
-              <a:t> </a:t>
-            </a:r>
-            <a:r>
-              <a:rPr lang="en-US" sz="2800" dirty="0" smtClean="0">
-                <a:solidFill>
-                  <a:schemeClr val="tx1"/>
-                </a:solidFill>
-                <a:latin typeface="Arial" pitchFamily="34" charset="0"/>
-                <a:cs typeface="Arial" pitchFamily="34" charset="0"/>
-              </a:rPr>
-              <a:t>art</a:t>
-            </a:r>
-            <a:r>
-              <a:rPr lang="en-US" sz="2800" spc="178" dirty="0" smtClean="0">
-                <a:solidFill>
-                  <a:schemeClr val="tx1"/>
-                </a:solidFill>
-                <a:latin typeface="Arial" pitchFamily="34" charset="0"/>
-                <a:cs typeface="Arial" pitchFamily="34" charset="0"/>
-              </a:rPr>
-              <a:t> </a:t>
-            </a:r>
-            <a:r>
-              <a:rPr lang="en-US" sz="2800" dirty="0" smtClean="0">
-                <a:solidFill>
-                  <a:schemeClr val="tx1"/>
-                </a:solidFill>
-                <a:latin typeface="Arial" pitchFamily="34" charset="0"/>
-                <a:cs typeface="Arial" pitchFamily="34" charset="0"/>
-              </a:rPr>
-              <a:t>and</a:t>
-            </a:r>
-            <a:r>
-              <a:rPr lang="en-US" sz="2800" spc="185" dirty="0" smtClean="0">
-                <a:solidFill>
-                  <a:schemeClr val="tx1"/>
-                </a:solidFill>
-                <a:latin typeface="Arial" pitchFamily="34" charset="0"/>
-                <a:cs typeface="Arial" pitchFamily="34" charset="0"/>
-              </a:rPr>
-              <a:t> </a:t>
-            </a:r>
-            <a:r>
-              <a:rPr lang="en-US" sz="2800" dirty="0" smtClean="0">
-                <a:solidFill>
-                  <a:schemeClr val="tx1"/>
-                </a:solidFill>
-                <a:latin typeface="Arial" pitchFamily="34" charset="0"/>
-                <a:cs typeface="Arial" pitchFamily="34" charset="0"/>
-              </a:rPr>
-              <a:t>science</a:t>
-            </a:r>
-            <a:r>
-              <a:rPr lang="en-US" sz="2800" spc="162" dirty="0" smtClean="0">
-                <a:solidFill>
-                  <a:schemeClr val="tx1"/>
-                </a:solidFill>
-                <a:latin typeface="Arial" pitchFamily="34" charset="0"/>
-                <a:cs typeface="Arial" pitchFamily="34" charset="0"/>
-              </a:rPr>
-              <a:t> </a:t>
-            </a:r>
-            <a:r>
-              <a:rPr lang="en-US" sz="2800" dirty="0" smtClean="0">
-                <a:solidFill>
-                  <a:schemeClr val="tx1"/>
-                </a:solidFill>
-                <a:latin typeface="Arial" pitchFamily="34" charset="0"/>
-                <a:cs typeface="Arial" pitchFamily="34" charset="0"/>
-              </a:rPr>
-              <a:t>of</a:t>
-            </a:r>
-            <a:r>
-              <a:rPr lang="en-US" sz="2800" spc="189" dirty="0" smtClean="0">
-                <a:solidFill>
-                  <a:schemeClr val="tx1"/>
-                </a:solidFill>
-                <a:latin typeface="Arial" pitchFamily="34" charset="0"/>
-                <a:cs typeface="Arial" pitchFamily="34" charset="0"/>
-              </a:rPr>
-              <a:t> </a:t>
-            </a:r>
-            <a:r>
-              <a:rPr lang="en-US" sz="2800" dirty="0" smtClean="0">
-                <a:solidFill>
-                  <a:schemeClr val="tx1"/>
-                </a:solidFill>
-                <a:latin typeface="Arial" pitchFamily="34" charset="0"/>
-                <a:cs typeface="Arial" pitchFamily="34" charset="0"/>
-              </a:rPr>
-              <a:t>writing hidden</a:t>
-            </a:r>
-            <a:r>
-              <a:rPr lang="en-US" sz="2800" spc="1031" dirty="0" smtClean="0">
-                <a:solidFill>
-                  <a:schemeClr val="tx1"/>
-                </a:solidFill>
-                <a:latin typeface="Arial" pitchFamily="34" charset="0"/>
-                <a:cs typeface="Arial" pitchFamily="34" charset="0"/>
-              </a:rPr>
-              <a:t> </a:t>
-            </a:r>
-            <a:r>
-              <a:rPr lang="en-US" sz="2800" dirty="0" smtClean="0">
-                <a:solidFill>
-                  <a:schemeClr val="tx1"/>
-                </a:solidFill>
-                <a:latin typeface="Arial" pitchFamily="34" charset="0"/>
-                <a:cs typeface="Arial" pitchFamily="34" charset="0"/>
-              </a:rPr>
-              <a:t>message</a:t>
-            </a:r>
-            <a:r>
-              <a:rPr lang="en-US" sz="2800" spc="1017" dirty="0" smtClean="0">
-                <a:solidFill>
-                  <a:schemeClr val="tx1"/>
-                </a:solidFill>
-                <a:latin typeface="Arial" pitchFamily="34" charset="0"/>
-                <a:cs typeface="Arial" pitchFamily="34" charset="0"/>
-              </a:rPr>
-              <a:t> </a:t>
-            </a:r>
-            <a:r>
-              <a:rPr lang="en-US" sz="2800" dirty="0" smtClean="0">
-                <a:solidFill>
-                  <a:schemeClr val="tx1"/>
-                </a:solidFill>
-                <a:latin typeface="Arial" pitchFamily="34" charset="0"/>
-                <a:cs typeface="Arial" pitchFamily="34" charset="0"/>
-              </a:rPr>
-              <a:t>that</a:t>
-            </a:r>
-            <a:r>
-              <a:rPr lang="en-US" sz="2800" spc="1022" dirty="0" smtClean="0">
-                <a:solidFill>
-                  <a:schemeClr val="tx1"/>
-                </a:solidFill>
-                <a:latin typeface="Arial" pitchFamily="34" charset="0"/>
-                <a:cs typeface="Arial" pitchFamily="34" charset="0"/>
-              </a:rPr>
-              <a:t> </a:t>
-            </a:r>
-            <a:r>
-              <a:rPr lang="en-US" sz="2800" dirty="0" smtClean="0">
-                <a:solidFill>
-                  <a:schemeClr val="tx1"/>
-                </a:solidFill>
-                <a:latin typeface="Arial" pitchFamily="34" charset="0"/>
-                <a:cs typeface="Arial" pitchFamily="34" charset="0"/>
-              </a:rPr>
-              <a:t>no</a:t>
-            </a:r>
-            <a:r>
-              <a:rPr lang="en-US" sz="2800" spc="1015" dirty="0" smtClean="0">
-                <a:solidFill>
-                  <a:schemeClr val="tx1"/>
-                </a:solidFill>
-                <a:latin typeface="Arial" pitchFamily="34" charset="0"/>
-                <a:cs typeface="Arial" pitchFamily="34" charset="0"/>
-              </a:rPr>
-              <a:t> </a:t>
-            </a:r>
-            <a:r>
-              <a:rPr lang="en-US" sz="2800" dirty="0" smtClean="0">
-                <a:solidFill>
-                  <a:schemeClr val="tx1"/>
-                </a:solidFill>
-                <a:latin typeface="Arial" pitchFamily="34" charset="0"/>
-                <a:cs typeface="Arial" pitchFamily="34" charset="0"/>
-              </a:rPr>
-              <a:t>one</a:t>
-            </a:r>
-            <a:r>
-              <a:rPr lang="en-US" sz="2800" spc="1006" dirty="0" smtClean="0">
-                <a:solidFill>
-                  <a:schemeClr val="tx1"/>
-                </a:solidFill>
-                <a:latin typeface="Arial" pitchFamily="34" charset="0"/>
-                <a:cs typeface="Arial" pitchFamily="34" charset="0"/>
-              </a:rPr>
-              <a:t> </a:t>
-            </a:r>
-            <a:r>
-              <a:rPr lang="en-US" sz="2800" dirty="0" smtClean="0">
-                <a:solidFill>
-                  <a:schemeClr val="tx1"/>
-                </a:solidFill>
-                <a:latin typeface="Arial" pitchFamily="34" charset="0"/>
-                <a:cs typeface="Arial" pitchFamily="34" charset="0"/>
-              </a:rPr>
-              <a:t>apart</a:t>
-            </a:r>
-            <a:r>
-              <a:rPr lang="en-US" sz="2800" spc="1019" dirty="0" smtClean="0">
-                <a:solidFill>
-                  <a:schemeClr val="tx1"/>
-                </a:solidFill>
-                <a:latin typeface="Arial" pitchFamily="34" charset="0"/>
-                <a:cs typeface="Arial" pitchFamily="34" charset="0"/>
-              </a:rPr>
-              <a:t> </a:t>
-            </a:r>
-            <a:r>
-              <a:rPr lang="en-US" sz="2800" dirty="0" smtClean="0">
-                <a:solidFill>
-                  <a:schemeClr val="tx1"/>
-                </a:solidFill>
-                <a:latin typeface="Arial" pitchFamily="34" charset="0"/>
-                <a:cs typeface="Arial" pitchFamily="34" charset="0"/>
-              </a:rPr>
-              <a:t>from</a:t>
-            </a:r>
-            <a:r>
-              <a:rPr lang="en-US" sz="2800" spc="1006" dirty="0" smtClean="0">
-                <a:solidFill>
-                  <a:schemeClr val="tx1"/>
-                </a:solidFill>
-                <a:latin typeface="Arial" pitchFamily="34" charset="0"/>
-                <a:cs typeface="Arial" pitchFamily="34" charset="0"/>
-              </a:rPr>
-              <a:t> </a:t>
-            </a:r>
-            <a:r>
-              <a:rPr lang="en-US" sz="2800" dirty="0" smtClean="0">
-                <a:solidFill>
-                  <a:schemeClr val="tx1"/>
-                </a:solidFill>
-                <a:latin typeface="Arial" pitchFamily="34" charset="0"/>
-                <a:cs typeface="Arial" pitchFamily="34" charset="0"/>
-              </a:rPr>
-              <a:t>the sender</a:t>
-            </a:r>
-            <a:r>
-              <a:rPr lang="en-US" sz="2800" spc="147" dirty="0" smtClean="0">
-                <a:solidFill>
-                  <a:schemeClr val="tx1"/>
-                </a:solidFill>
-                <a:latin typeface="Arial" pitchFamily="34" charset="0"/>
-                <a:cs typeface="Arial" pitchFamily="34" charset="0"/>
-              </a:rPr>
-              <a:t> </a:t>
-            </a:r>
-            <a:r>
-              <a:rPr lang="en-US" sz="2800" dirty="0" smtClean="0">
-                <a:solidFill>
-                  <a:schemeClr val="tx1"/>
-                </a:solidFill>
-                <a:latin typeface="Arial" pitchFamily="34" charset="0"/>
-                <a:cs typeface="Arial" pitchFamily="34" charset="0"/>
-              </a:rPr>
-              <a:t>and</a:t>
-            </a:r>
-            <a:r>
-              <a:rPr lang="en-US" sz="2800" spc="130" dirty="0" smtClean="0">
-                <a:solidFill>
-                  <a:schemeClr val="tx1"/>
-                </a:solidFill>
-                <a:latin typeface="Arial" pitchFamily="34" charset="0"/>
-                <a:cs typeface="Arial" pitchFamily="34" charset="0"/>
-              </a:rPr>
-              <a:t> </a:t>
-            </a:r>
-            <a:r>
-              <a:rPr lang="en-US" sz="2800" spc="-15" dirty="0" smtClean="0">
-                <a:solidFill>
-                  <a:schemeClr val="tx1"/>
-                </a:solidFill>
-                <a:latin typeface="Arial" pitchFamily="34" charset="0"/>
-                <a:cs typeface="Arial" pitchFamily="34" charset="0"/>
-              </a:rPr>
-              <a:t>receiver,</a:t>
-            </a:r>
-            <a:r>
-              <a:rPr lang="en-US" sz="2800" spc="151" dirty="0" smtClean="0">
-                <a:solidFill>
-                  <a:schemeClr val="tx1"/>
-                </a:solidFill>
-                <a:latin typeface="Arial" pitchFamily="34" charset="0"/>
-                <a:cs typeface="Arial" pitchFamily="34" charset="0"/>
-              </a:rPr>
-              <a:t> </a:t>
-            </a:r>
-            <a:r>
-              <a:rPr lang="en-US" sz="2800" dirty="0" smtClean="0">
-                <a:solidFill>
-                  <a:schemeClr val="tx1"/>
-                </a:solidFill>
-                <a:latin typeface="Arial" pitchFamily="34" charset="0"/>
-                <a:cs typeface="Arial" pitchFamily="34" charset="0"/>
-              </a:rPr>
-              <a:t>suspect</a:t>
-            </a:r>
-            <a:r>
-              <a:rPr lang="en-US" sz="2800" spc="150" dirty="0" smtClean="0">
-                <a:solidFill>
-                  <a:schemeClr val="tx1"/>
-                </a:solidFill>
-                <a:latin typeface="Arial" pitchFamily="34" charset="0"/>
-                <a:cs typeface="Arial" pitchFamily="34" charset="0"/>
-              </a:rPr>
-              <a:t> </a:t>
-            </a:r>
-            <a:r>
-              <a:rPr lang="en-US" sz="2800" dirty="0" smtClean="0">
-                <a:solidFill>
-                  <a:schemeClr val="tx1"/>
-                </a:solidFill>
-                <a:latin typeface="Arial" pitchFamily="34" charset="0"/>
-                <a:cs typeface="Arial" pitchFamily="34" charset="0"/>
-              </a:rPr>
-              <a:t>the</a:t>
-            </a:r>
-            <a:r>
-              <a:rPr lang="en-US" sz="2800" spc="127" dirty="0" smtClean="0">
-                <a:solidFill>
-                  <a:schemeClr val="tx1"/>
-                </a:solidFill>
-                <a:latin typeface="Arial" pitchFamily="34" charset="0"/>
-                <a:cs typeface="Arial" pitchFamily="34" charset="0"/>
-              </a:rPr>
-              <a:t> </a:t>
-            </a:r>
-            <a:r>
-              <a:rPr lang="en-US" sz="2800" dirty="0" smtClean="0">
-                <a:solidFill>
-                  <a:schemeClr val="tx1"/>
-                </a:solidFill>
-                <a:latin typeface="Arial" pitchFamily="34" charset="0"/>
-                <a:cs typeface="Arial" pitchFamily="34" charset="0"/>
-              </a:rPr>
-              <a:t>existence</a:t>
-            </a:r>
-            <a:r>
-              <a:rPr lang="en-US" sz="2800" spc="140" dirty="0" smtClean="0">
-                <a:solidFill>
-                  <a:schemeClr val="tx1"/>
-                </a:solidFill>
-                <a:latin typeface="Arial" pitchFamily="34" charset="0"/>
-                <a:cs typeface="Arial" pitchFamily="34" charset="0"/>
-              </a:rPr>
-              <a:t> </a:t>
-            </a:r>
-            <a:r>
-              <a:rPr lang="en-US" sz="2800" dirty="0" smtClean="0">
-                <a:solidFill>
-                  <a:schemeClr val="tx1"/>
-                </a:solidFill>
-                <a:latin typeface="Arial" pitchFamily="34" charset="0"/>
-                <a:cs typeface="Arial" pitchFamily="34" charset="0"/>
-              </a:rPr>
-              <a:t>of</a:t>
-            </a:r>
-            <a:r>
-              <a:rPr lang="en-US" sz="2800" spc="139" dirty="0" smtClean="0">
-                <a:solidFill>
-                  <a:schemeClr val="tx1"/>
-                </a:solidFill>
-                <a:latin typeface="Arial" pitchFamily="34" charset="0"/>
-                <a:cs typeface="Arial" pitchFamily="34" charset="0"/>
-              </a:rPr>
-              <a:t> </a:t>
-            </a:r>
-            <a:r>
-              <a:rPr lang="en-US" sz="2800" dirty="0" smtClean="0">
-                <a:solidFill>
-                  <a:schemeClr val="tx1"/>
-                </a:solidFill>
-                <a:latin typeface="Arial" pitchFamily="34" charset="0"/>
-                <a:cs typeface="Arial" pitchFamily="34" charset="0"/>
-              </a:rPr>
-              <a:t>the message.</a:t>
-            </a:r>
-          </a:p>
-          <a:p>
-            <a:pPr marL="0">
-              <a:lnSpc>
-                <a:spcPts val="3096"/>
-              </a:lnSpc>
-              <a:spcBef>
-                <a:spcPts val="0"/>
-              </a:spcBef>
-            </a:pPr>
-            <a:endParaRPr lang="en-US" sz="2800" dirty="0" smtClean="0">
-              <a:solidFill>
-                <a:schemeClr val="tx1"/>
-              </a:solidFill>
-              <a:latin typeface="Arial" pitchFamily="34" charset="0"/>
-              <a:cs typeface="Arial" pitchFamily="34" charset="0"/>
-            </a:endParaRPr>
-          </a:p>
-          <a:p>
-            <a:pPr marL="0">
-              <a:lnSpc>
-                <a:spcPts val="3096"/>
-              </a:lnSpc>
-              <a:spcBef>
-                <a:spcPts val="0"/>
-              </a:spcBef>
-            </a:pPr>
-            <a:r>
-              <a:rPr lang="en-US" sz="2800" spc="-15" dirty="0" smtClean="0">
-                <a:solidFill>
-                  <a:schemeClr val="tx1"/>
-                </a:solidFill>
-                <a:latin typeface="Arial" pitchFamily="34" charset="0"/>
-                <a:cs typeface="Arial" pitchFamily="34" charset="0"/>
-              </a:rPr>
-              <a:t>LSB is the  simple method but BPCS is highly secured way of hiding the data in cover image</a:t>
-            </a:r>
-            <a:r>
-              <a:rPr lang="en-US" sz="2800" dirty="0" smtClean="0">
-                <a:solidFill>
-                  <a:schemeClr val="tx1"/>
-                </a:solidFill>
-                <a:latin typeface="Arial" pitchFamily="34" charset="0"/>
-                <a:cs typeface="Arial" pitchFamily="34" charset="0"/>
-              </a:rPr>
-              <a:t>.</a:t>
-            </a:r>
-            <a:r>
-              <a:rPr lang="en-US" sz="2800" spc="268" dirty="0" smtClean="0">
-                <a:solidFill>
-                  <a:schemeClr val="tx1"/>
-                </a:solidFill>
-                <a:latin typeface="Arial" pitchFamily="34" charset="0"/>
-                <a:cs typeface="Arial" pitchFamily="34" charset="0"/>
-              </a:rPr>
-              <a:t> </a:t>
-            </a:r>
-            <a:r>
-              <a:rPr lang="en-US" sz="2800" spc="-198" dirty="0" smtClean="0">
-                <a:solidFill>
-                  <a:schemeClr val="tx1"/>
-                </a:solidFill>
-                <a:latin typeface="Arial" pitchFamily="34" charset="0"/>
-                <a:cs typeface="Arial" pitchFamily="34" charset="0"/>
-              </a:rPr>
-              <a:t>To  </a:t>
-            </a:r>
-            <a:r>
-              <a:rPr lang="en-US" sz="2800" dirty="0" smtClean="0">
-                <a:solidFill>
-                  <a:schemeClr val="tx1"/>
-                </a:solidFill>
-                <a:latin typeface="Arial" pitchFamily="34" charset="0"/>
-                <a:cs typeface="Arial" pitchFamily="34" charset="0"/>
-              </a:rPr>
-              <a:t>provide</a:t>
-            </a:r>
-            <a:r>
-              <a:rPr lang="en-US" sz="2800" spc="2142" dirty="0" smtClean="0">
-                <a:solidFill>
-                  <a:schemeClr val="tx1"/>
-                </a:solidFill>
-                <a:latin typeface="Arial" pitchFamily="34" charset="0"/>
-                <a:cs typeface="Arial" pitchFamily="34" charset="0"/>
-              </a:rPr>
-              <a:t> </a:t>
-            </a:r>
-            <a:r>
-              <a:rPr lang="en-US" sz="2800" dirty="0" smtClean="0">
-                <a:solidFill>
-                  <a:schemeClr val="tx1"/>
-                </a:solidFill>
-                <a:latin typeface="Arial" pitchFamily="34" charset="0"/>
-                <a:cs typeface="Arial" pitchFamily="34" charset="0"/>
-              </a:rPr>
-              <a:t>high</a:t>
-            </a:r>
-            <a:r>
-              <a:rPr lang="en-US" sz="2800" spc="2138" dirty="0" smtClean="0">
-                <a:solidFill>
-                  <a:schemeClr val="tx1"/>
-                </a:solidFill>
-                <a:latin typeface="Arial" pitchFamily="34" charset="0"/>
-                <a:cs typeface="Arial" pitchFamily="34" charset="0"/>
-              </a:rPr>
-              <a:t> </a:t>
-            </a:r>
-            <a:r>
-              <a:rPr lang="en-US" sz="2800" dirty="0" smtClean="0">
-                <a:solidFill>
-                  <a:schemeClr val="tx1"/>
-                </a:solidFill>
-                <a:latin typeface="Arial" pitchFamily="34" charset="0"/>
-                <a:cs typeface="Arial" pitchFamily="34" charset="0"/>
-              </a:rPr>
-              <a:t>security</a:t>
-            </a:r>
-            <a:r>
-              <a:rPr lang="en-US" sz="2800" spc="2146" dirty="0" smtClean="0">
-                <a:solidFill>
-                  <a:schemeClr val="tx1"/>
-                </a:solidFill>
-                <a:latin typeface="Arial" pitchFamily="34" charset="0"/>
-                <a:cs typeface="Arial" pitchFamily="34" charset="0"/>
-              </a:rPr>
-              <a:t> </a:t>
-            </a:r>
-            <a:r>
-              <a:rPr lang="en-US" sz="2800" dirty="0" smtClean="0">
-                <a:solidFill>
-                  <a:schemeClr val="tx1"/>
-                </a:solidFill>
-                <a:latin typeface="Arial" pitchFamily="34" charset="0"/>
-                <a:cs typeface="Arial" pitchFamily="34" charset="0"/>
-              </a:rPr>
-              <a:t>Steganography we also provided 4 digits key option to encrypt your data.</a:t>
-            </a:r>
-          </a:p>
-          <a:p>
-            <a:pPr marL="0">
-              <a:lnSpc>
-                <a:spcPts val="3096"/>
-              </a:lnSpc>
-              <a:spcBef>
-                <a:spcPts val="0"/>
-              </a:spcBef>
-            </a:pPr>
-            <a:endParaRPr lang="en-US" sz="2800" spc="2143" dirty="0" smtClean="0">
-              <a:solidFill>
-                <a:schemeClr val="tx1"/>
-              </a:solidFill>
-              <a:latin typeface="Arial" pitchFamily="34" charset="0"/>
-              <a:cs typeface="Arial" pitchFamily="34" charset="0"/>
-            </a:endParaRPr>
-          </a:p>
-          <a:p>
-            <a:pPr marL="0">
-              <a:lnSpc>
-                <a:spcPts val="3096"/>
-              </a:lnSpc>
-              <a:spcBef>
-                <a:spcPts val="0"/>
-              </a:spcBef>
-            </a:pPr>
-            <a:r>
-              <a:rPr lang="en-US" sz="2800" spc="-11" dirty="0" smtClean="0">
-                <a:solidFill>
-                  <a:schemeClr val="tx1"/>
-                </a:solidFill>
-                <a:latin typeface="Arial" pitchFamily="34" charset="0"/>
-                <a:cs typeface="Arial" pitchFamily="34" charset="0"/>
-              </a:rPr>
-              <a:t>Larger</a:t>
-            </a:r>
-            <a:r>
-              <a:rPr lang="en-US" sz="2800" spc="888" dirty="0" smtClean="0">
-                <a:solidFill>
-                  <a:schemeClr val="tx1"/>
-                </a:solidFill>
-                <a:latin typeface="Arial" pitchFamily="34" charset="0"/>
-                <a:cs typeface="Arial" pitchFamily="34" charset="0"/>
-              </a:rPr>
-              <a:t> </a:t>
-            </a:r>
-            <a:r>
-              <a:rPr lang="en-US" sz="2800" dirty="0" smtClean="0">
-                <a:solidFill>
-                  <a:schemeClr val="tx1"/>
-                </a:solidFill>
-                <a:latin typeface="Arial" pitchFamily="34" charset="0"/>
-                <a:cs typeface="Arial" pitchFamily="34" charset="0"/>
-              </a:rPr>
-              <a:t>PSNR</a:t>
-            </a:r>
-            <a:r>
-              <a:rPr lang="en-US" sz="2800" spc="860" dirty="0" smtClean="0">
-                <a:solidFill>
-                  <a:schemeClr val="tx1"/>
-                </a:solidFill>
-                <a:latin typeface="Arial" pitchFamily="34" charset="0"/>
-                <a:cs typeface="Arial" pitchFamily="34" charset="0"/>
-              </a:rPr>
-              <a:t> </a:t>
-            </a:r>
-            <a:r>
-              <a:rPr lang="en-US" sz="2800" dirty="0" smtClean="0">
-                <a:solidFill>
-                  <a:schemeClr val="tx1"/>
-                </a:solidFill>
-                <a:latin typeface="Arial" pitchFamily="34" charset="0"/>
-                <a:cs typeface="Arial" pitchFamily="34" charset="0"/>
-              </a:rPr>
-              <a:t>indicates</a:t>
-            </a:r>
-            <a:r>
-              <a:rPr lang="en-US" sz="2800" spc="856" dirty="0" smtClean="0">
-                <a:solidFill>
-                  <a:schemeClr val="tx1"/>
-                </a:solidFill>
-                <a:latin typeface="Arial" pitchFamily="34" charset="0"/>
-                <a:cs typeface="Arial" pitchFamily="34" charset="0"/>
-              </a:rPr>
-              <a:t> </a:t>
-            </a:r>
-            <a:r>
-              <a:rPr lang="en-US" sz="2800" dirty="0" smtClean="0">
-                <a:solidFill>
-                  <a:schemeClr val="tx1"/>
-                </a:solidFill>
-                <a:latin typeface="Arial" pitchFamily="34" charset="0"/>
-                <a:cs typeface="Arial" pitchFamily="34" charset="0"/>
-              </a:rPr>
-              <a:t>the</a:t>
-            </a:r>
-            <a:r>
-              <a:rPr lang="en-US" sz="2800" spc="857" dirty="0" smtClean="0">
-                <a:solidFill>
-                  <a:schemeClr val="tx1"/>
-                </a:solidFill>
-                <a:latin typeface="Arial" pitchFamily="34" charset="0"/>
-                <a:cs typeface="Arial" pitchFamily="34" charset="0"/>
-              </a:rPr>
-              <a:t> </a:t>
-            </a:r>
-            <a:r>
-              <a:rPr lang="en-US" sz="2800" dirty="0" smtClean="0">
-                <a:solidFill>
-                  <a:schemeClr val="tx1"/>
-                </a:solidFill>
-                <a:latin typeface="Arial" pitchFamily="34" charset="0"/>
-                <a:cs typeface="Arial" pitchFamily="34" charset="0"/>
-              </a:rPr>
-              <a:t>higher</a:t>
-            </a:r>
-            <a:r>
-              <a:rPr lang="en-US" sz="2800" spc="864" dirty="0" smtClean="0">
-                <a:solidFill>
-                  <a:schemeClr val="tx1"/>
-                </a:solidFill>
-                <a:latin typeface="Arial" pitchFamily="34" charset="0"/>
-                <a:cs typeface="Arial" pitchFamily="34" charset="0"/>
-              </a:rPr>
-              <a:t> </a:t>
-            </a:r>
-            <a:r>
-              <a:rPr lang="en-US" sz="2800" dirty="0" smtClean="0">
-                <a:solidFill>
-                  <a:schemeClr val="tx1"/>
-                </a:solidFill>
-                <a:latin typeface="Arial" pitchFamily="34" charset="0"/>
-                <a:cs typeface="Arial" pitchFamily="34" charset="0"/>
-              </a:rPr>
-              <a:t>the</a:t>
-            </a:r>
-            <a:r>
-              <a:rPr lang="en-US" sz="2800" spc="844" dirty="0" smtClean="0">
-                <a:solidFill>
-                  <a:schemeClr val="tx1"/>
-                </a:solidFill>
-                <a:latin typeface="Arial" pitchFamily="34" charset="0"/>
-                <a:cs typeface="Arial" pitchFamily="34" charset="0"/>
-              </a:rPr>
-              <a:t> </a:t>
-            </a:r>
-            <a:r>
-              <a:rPr lang="en-US" sz="2800" dirty="0" smtClean="0">
-                <a:solidFill>
-                  <a:schemeClr val="tx1"/>
-                </a:solidFill>
-                <a:latin typeface="Arial" pitchFamily="34" charset="0"/>
-                <a:cs typeface="Arial" pitchFamily="34" charset="0"/>
-              </a:rPr>
-              <a:t>image quality.</a:t>
-            </a:r>
-            <a:r>
-              <a:rPr lang="en-US" sz="2800" spc="496" dirty="0" smtClean="0">
-                <a:solidFill>
-                  <a:schemeClr val="tx1"/>
-                </a:solidFill>
-                <a:latin typeface="Arial" pitchFamily="34" charset="0"/>
-                <a:cs typeface="Arial" pitchFamily="34" charset="0"/>
-              </a:rPr>
-              <a:t> </a:t>
-            </a:r>
-            <a:r>
-              <a:rPr lang="en-US" sz="2800" dirty="0" smtClean="0">
-                <a:solidFill>
-                  <a:schemeClr val="tx1"/>
-                </a:solidFill>
-                <a:latin typeface="Arial" pitchFamily="34" charset="0"/>
-                <a:cs typeface="Arial" pitchFamily="34" charset="0"/>
-              </a:rPr>
-              <a:t>A</a:t>
-            </a:r>
-            <a:r>
-              <a:rPr lang="en-US" sz="2800" spc="480" dirty="0" smtClean="0">
-                <a:solidFill>
-                  <a:schemeClr val="tx1"/>
-                </a:solidFill>
-                <a:latin typeface="Arial" pitchFamily="34" charset="0"/>
-                <a:cs typeface="Arial" pitchFamily="34" charset="0"/>
-              </a:rPr>
-              <a:t> </a:t>
-            </a:r>
-            <a:r>
-              <a:rPr lang="en-US" sz="2800" dirty="0" smtClean="0">
-                <a:solidFill>
-                  <a:schemeClr val="tx1"/>
-                </a:solidFill>
-                <a:latin typeface="Arial" pitchFamily="34" charset="0"/>
-                <a:cs typeface="Arial" pitchFamily="34" charset="0"/>
-              </a:rPr>
-              <a:t>smaller</a:t>
-            </a:r>
-            <a:r>
-              <a:rPr lang="en-US" sz="2800" spc="503" dirty="0" smtClean="0">
-                <a:solidFill>
-                  <a:schemeClr val="tx1"/>
-                </a:solidFill>
-                <a:latin typeface="Arial" pitchFamily="34" charset="0"/>
-                <a:cs typeface="Arial" pitchFamily="34" charset="0"/>
-              </a:rPr>
-              <a:t> </a:t>
-            </a:r>
-            <a:r>
-              <a:rPr lang="en-US" sz="2800" dirty="0" smtClean="0">
-                <a:solidFill>
-                  <a:schemeClr val="tx1"/>
-                </a:solidFill>
-                <a:latin typeface="Arial" pitchFamily="34" charset="0"/>
-                <a:cs typeface="Arial" pitchFamily="34" charset="0"/>
-              </a:rPr>
-              <a:t>PSNR</a:t>
-            </a:r>
-            <a:r>
-              <a:rPr lang="en-US" sz="2800" spc="509" dirty="0" smtClean="0">
-                <a:solidFill>
-                  <a:schemeClr val="tx1"/>
-                </a:solidFill>
-                <a:latin typeface="Arial" pitchFamily="34" charset="0"/>
-                <a:cs typeface="Arial" pitchFamily="34" charset="0"/>
-              </a:rPr>
-              <a:t> </a:t>
-            </a:r>
-            <a:r>
-              <a:rPr lang="en-US" sz="2800" dirty="0" smtClean="0">
-                <a:solidFill>
-                  <a:schemeClr val="tx1"/>
-                </a:solidFill>
-                <a:latin typeface="Arial" pitchFamily="34" charset="0"/>
-                <a:cs typeface="Arial" pitchFamily="34" charset="0"/>
-              </a:rPr>
-              <a:t>means</a:t>
-            </a:r>
-            <a:r>
-              <a:rPr lang="en-US" sz="2800" spc="503" dirty="0" smtClean="0">
-                <a:solidFill>
-                  <a:schemeClr val="tx1"/>
-                </a:solidFill>
-                <a:latin typeface="Arial" pitchFamily="34" charset="0"/>
-                <a:cs typeface="Arial" pitchFamily="34" charset="0"/>
-              </a:rPr>
-              <a:t> </a:t>
-            </a:r>
-            <a:r>
-              <a:rPr lang="en-US" sz="2800" dirty="0" smtClean="0">
-                <a:solidFill>
-                  <a:schemeClr val="tx1"/>
-                </a:solidFill>
-                <a:latin typeface="Arial" pitchFamily="34" charset="0"/>
-                <a:cs typeface="Arial" pitchFamily="34" charset="0"/>
-              </a:rPr>
-              <a:t>there</a:t>
-            </a:r>
-            <a:r>
-              <a:rPr lang="en-US" sz="2800" spc="498" dirty="0" smtClean="0">
-                <a:solidFill>
-                  <a:schemeClr val="tx1"/>
-                </a:solidFill>
-                <a:latin typeface="Arial" pitchFamily="34" charset="0"/>
-                <a:cs typeface="Arial" pitchFamily="34" charset="0"/>
-              </a:rPr>
-              <a:t> </a:t>
-            </a:r>
-            <a:r>
-              <a:rPr lang="en-US" sz="2800" spc="-10" dirty="0" smtClean="0">
-                <a:solidFill>
-                  <a:schemeClr val="tx1"/>
-                </a:solidFill>
-                <a:latin typeface="Arial" pitchFamily="34" charset="0"/>
-                <a:cs typeface="Arial" pitchFamily="34" charset="0"/>
-              </a:rPr>
-              <a:t>is</a:t>
-            </a:r>
-            <a:r>
-              <a:rPr lang="en-US" sz="2800" spc="511" dirty="0" smtClean="0">
-                <a:solidFill>
-                  <a:schemeClr val="tx1"/>
-                </a:solidFill>
-                <a:latin typeface="Arial" pitchFamily="34" charset="0"/>
-                <a:cs typeface="Arial" pitchFamily="34" charset="0"/>
-              </a:rPr>
-              <a:t> </a:t>
-            </a:r>
-            <a:r>
-              <a:rPr lang="en-US" sz="2800" dirty="0" smtClean="0">
-                <a:solidFill>
-                  <a:schemeClr val="tx1"/>
-                </a:solidFill>
-                <a:latin typeface="Arial" pitchFamily="34" charset="0"/>
-                <a:cs typeface="Arial" pitchFamily="34" charset="0"/>
-              </a:rPr>
-              <a:t>huge distortion</a:t>
-            </a:r>
-            <a:r>
-              <a:rPr lang="en-US" sz="2800" spc="1247" dirty="0" smtClean="0">
-                <a:solidFill>
-                  <a:schemeClr val="tx1"/>
-                </a:solidFill>
-                <a:latin typeface="Arial" pitchFamily="34" charset="0"/>
-                <a:cs typeface="Arial" pitchFamily="34" charset="0"/>
-              </a:rPr>
-              <a:t> </a:t>
-            </a:r>
-            <a:r>
-              <a:rPr lang="en-US" sz="2800" dirty="0" smtClean="0">
-                <a:solidFill>
-                  <a:schemeClr val="tx1"/>
-                </a:solidFill>
-                <a:latin typeface="Arial" pitchFamily="34" charset="0"/>
-                <a:cs typeface="Arial" pitchFamily="34" charset="0"/>
-              </a:rPr>
-              <a:t>between</a:t>
-            </a:r>
-            <a:r>
-              <a:rPr lang="en-US" sz="2800" spc="1265" dirty="0" smtClean="0">
-                <a:solidFill>
-                  <a:schemeClr val="tx1"/>
-                </a:solidFill>
-                <a:latin typeface="Arial" pitchFamily="34" charset="0"/>
-                <a:cs typeface="Arial" pitchFamily="34" charset="0"/>
-              </a:rPr>
-              <a:t> </a:t>
-            </a:r>
-            <a:r>
-              <a:rPr lang="en-US" sz="2800" dirty="0" smtClean="0">
-                <a:solidFill>
-                  <a:schemeClr val="tx1"/>
-                </a:solidFill>
-                <a:latin typeface="Arial" pitchFamily="34" charset="0"/>
-                <a:cs typeface="Arial" pitchFamily="34" charset="0"/>
-              </a:rPr>
-              <a:t>the</a:t>
-            </a:r>
-            <a:r>
-              <a:rPr lang="en-US" sz="2800" spc="1239" dirty="0" smtClean="0">
-                <a:solidFill>
-                  <a:schemeClr val="tx1"/>
-                </a:solidFill>
-                <a:latin typeface="Arial" pitchFamily="34" charset="0"/>
-                <a:cs typeface="Arial" pitchFamily="34" charset="0"/>
-              </a:rPr>
-              <a:t> </a:t>
-            </a:r>
-            <a:r>
-              <a:rPr lang="en-US" sz="2800" dirty="0" smtClean="0">
-                <a:solidFill>
-                  <a:schemeClr val="tx1"/>
-                </a:solidFill>
-                <a:latin typeface="Arial" pitchFamily="34" charset="0"/>
-                <a:cs typeface="Arial" pitchFamily="34" charset="0"/>
-              </a:rPr>
-              <a:t>cover-image</a:t>
-            </a:r>
-            <a:r>
-              <a:rPr lang="en-US" sz="2800" spc="1259" dirty="0" smtClean="0">
-                <a:solidFill>
-                  <a:schemeClr val="tx1"/>
-                </a:solidFill>
-                <a:latin typeface="Arial" pitchFamily="34" charset="0"/>
-                <a:cs typeface="Arial" pitchFamily="34" charset="0"/>
-              </a:rPr>
-              <a:t> </a:t>
-            </a:r>
-            <a:r>
-              <a:rPr lang="en-US" sz="2800" dirty="0" smtClean="0">
-                <a:solidFill>
-                  <a:schemeClr val="tx1"/>
-                </a:solidFill>
-                <a:latin typeface="Arial" pitchFamily="34" charset="0"/>
-                <a:cs typeface="Arial" pitchFamily="34" charset="0"/>
-              </a:rPr>
-              <a:t>and</a:t>
-            </a:r>
-            <a:r>
-              <a:rPr lang="en-US" sz="2800" spc="1252" dirty="0" smtClean="0">
-                <a:solidFill>
-                  <a:schemeClr val="tx1"/>
-                </a:solidFill>
-                <a:latin typeface="Arial" pitchFamily="34" charset="0"/>
-                <a:cs typeface="Arial" pitchFamily="34" charset="0"/>
-              </a:rPr>
-              <a:t> </a:t>
-            </a:r>
-            <a:r>
-              <a:rPr lang="en-US" sz="2800" dirty="0" smtClean="0">
-                <a:solidFill>
-                  <a:schemeClr val="tx1"/>
-                </a:solidFill>
-                <a:latin typeface="Arial" pitchFamily="34" charset="0"/>
-                <a:cs typeface="Arial" pitchFamily="34" charset="0"/>
-              </a:rPr>
-              <a:t>the stegano Image</a:t>
-            </a:r>
-          </a:p>
-          <a:p>
-            <a:pPr marL="0">
-              <a:lnSpc>
-                <a:spcPts val="3096"/>
-              </a:lnSpc>
-              <a:spcBef>
-                <a:spcPts val="0"/>
-              </a:spcBef>
-            </a:pPr>
-            <a:endParaRPr lang="en-US" dirty="0" smtClean="0">
-              <a:solidFill>
-                <a:srgbClr val="000000"/>
-              </a:solidFill>
-              <a:latin typeface="Times New Roman"/>
-              <a:cs typeface="Times New Roman"/>
-            </a:endParaRPr>
-          </a:p>
-          <a:p>
-            <a:pPr marL="0">
-              <a:lnSpc>
-                <a:spcPts val="3096"/>
-              </a:lnSpc>
-              <a:spcBef>
-                <a:spcPts val="0"/>
-              </a:spcBef>
-            </a:pPr>
-            <a:endParaRPr lang="en-US" dirty="0" smtClean="0">
-              <a:solidFill>
-                <a:srgbClr val="000000"/>
-              </a:solidFill>
-              <a:latin typeface="Times New Roman"/>
-              <a:cs typeface="Times New Roman"/>
-            </a:endParaRPr>
-          </a:p>
-          <a:p>
-            <a:endParaRPr lang="en-IN" dirty="0"/>
-          </a:p>
-        </p:txBody>
-      </p:sp>
-    </p:spTree>
-    <p:extLst>
-      <p:ext uri="{BB962C8B-B14F-4D97-AF65-F5344CB8AC3E}">
-        <p14:creationId xmlns:p14="http://schemas.microsoft.com/office/powerpoint/2010/main" val="2347577460"/>
-      </p:ext>
-    </p:extLst>
-  </p:cSld>
-  <p:clrMapOvr>
-    <a:masterClrMapping/>
-  </p:clrMapOvr>
-  <p:timing>
-    <p:tnLst>
-      <p:par>
-        <p:cTn id="1" dur="indefinite" restart="never" nodeType="tmRoot"/>
-      </p:par>
-    </p:tnLst>
-  </p:timing>
-</p:sld>
-</file>
-
 <file path=ppt/slides/slide3.xml><?xml version="1.0" encoding="utf-8"?>
 <p:sld xmlns:a="http://schemas.openxmlformats.org/drawingml/2006/main" xmlns:r="http://schemas.openxmlformats.org/officeDocument/2006/relationships" xmlns:p="http://schemas.openxmlformats.org/presentationml/2006/main">
   <p:cSld>
@@ -14920,6 +13888,1108 @@
 </file>
 
 <file path=ppt/slides/slide30.xml><?xml version="1.0" encoding="utf-8"?>
+<p:sld xmlns:a="http://schemas.openxmlformats.org/drawingml/2006/main" xmlns:r="http://schemas.openxmlformats.org/officeDocument/2006/relationships" xmlns:p="http://schemas.openxmlformats.org/presentationml/2006/main">
+  <p:cSld>
+    <p:spTree>
+      <p:nvGrpSpPr>
+        <p:cNvPr id="1" name=""/>
+        <p:cNvGrpSpPr/>
+        <p:nvPr/>
+      </p:nvGrpSpPr>
+      <p:grpSpPr>
+        <a:xfrm>
+          <a:off x="0" y="0"/>
+          <a:ext cx="0" cy="0"/>
+          <a:chOff x="0" y="0"/>
+          <a:chExt cx="0" cy="0"/>
+        </a:xfrm>
+      </p:grpSpPr>
+      <p:sp>
+        <p:nvSpPr>
+          <p:cNvPr id="4" name="Title 3"/>
+          <p:cNvSpPr>
+            <a:spLocks noGrp="1"/>
+          </p:cNvSpPr>
+          <p:nvPr>
+            <p:ph type="title"/>
+          </p:nvPr>
+        </p:nvSpPr>
+        <p:spPr>
+          <a:xfrm>
+            <a:off x="1687399" y="624110"/>
+            <a:ext cx="9817214" cy="667362"/>
+          </a:xfrm>
+        </p:spPr>
+        <p:txBody>
+          <a:bodyPr/>
+          <a:lstStyle/>
+          <a:p>
+            <a:pPr algn="ctr"/>
+            <a:r>
+              <a:rPr lang="en-US" dirty="0" smtClean="0">
+                <a:latin typeface="Algerian" panose="04020705040A02060702" pitchFamily="82" charset="0"/>
+              </a:rPr>
+              <a:t>Conclusion </a:t>
+            </a:r>
+            <a:endParaRPr lang="en-IN" dirty="0">
+              <a:latin typeface="Algerian" panose="04020705040A02060702" pitchFamily="82" charset="0"/>
+            </a:endParaRPr>
+          </a:p>
+        </p:txBody>
+      </p:sp>
+      <p:sp>
+        <p:nvSpPr>
+          <p:cNvPr id="5" name="Content Placeholder 4"/>
+          <p:cNvSpPr>
+            <a:spLocks noGrp="1"/>
+          </p:cNvSpPr>
+          <p:nvPr>
+            <p:ph idx="1"/>
+          </p:nvPr>
+        </p:nvSpPr>
+        <p:spPr>
+          <a:xfrm>
+            <a:off x="1717376" y="1559666"/>
+            <a:ext cx="9732373" cy="5069734"/>
+          </a:xfrm>
+        </p:spPr>
+        <p:txBody>
+          <a:bodyPr/>
+          <a:lstStyle/>
+          <a:p>
+            <a:pPr marL="0">
+              <a:lnSpc>
+                <a:spcPts val="3096"/>
+              </a:lnSpc>
+              <a:spcBef>
+                <a:spcPts val="0"/>
+              </a:spcBef>
+            </a:pPr>
+            <a:r>
+              <a:rPr lang="en-US" sz="2800" dirty="0" smtClean="0">
+                <a:solidFill>
+                  <a:schemeClr val="tx1"/>
+                </a:solidFill>
+                <a:latin typeface="Arial" pitchFamily="34" charset="0"/>
+                <a:cs typeface="Arial" pitchFamily="34" charset="0"/>
+              </a:rPr>
+              <a:t>Steganography</a:t>
+            </a:r>
+            <a:r>
+              <a:rPr lang="en-US" sz="2800" spc="192" dirty="0" smtClean="0">
+                <a:solidFill>
+                  <a:schemeClr val="tx1"/>
+                </a:solidFill>
+                <a:latin typeface="Arial" pitchFamily="34" charset="0"/>
+                <a:cs typeface="Arial" pitchFamily="34" charset="0"/>
+              </a:rPr>
+              <a:t> </a:t>
+            </a:r>
+            <a:r>
+              <a:rPr lang="en-US" sz="2800" dirty="0" smtClean="0">
+                <a:solidFill>
+                  <a:schemeClr val="tx1"/>
+                </a:solidFill>
+                <a:latin typeface="Arial" pitchFamily="34" charset="0"/>
+                <a:cs typeface="Arial" pitchFamily="34" charset="0"/>
+              </a:rPr>
+              <a:t>is</a:t>
+            </a:r>
+            <a:r>
+              <a:rPr lang="en-US" sz="2800" spc="173" dirty="0" smtClean="0">
+                <a:solidFill>
+                  <a:schemeClr val="tx1"/>
+                </a:solidFill>
+                <a:latin typeface="Arial" pitchFamily="34" charset="0"/>
+                <a:cs typeface="Arial" pitchFamily="34" charset="0"/>
+              </a:rPr>
+              <a:t> </a:t>
+            </a:r>
+            <a:r>
+              <a:rPr lang="en-US" sz="2800" dirty="0" smtClean="0">
+                <a:solidFill>
+                  <a:schemeClr val="tx1"/>
+                </a:solidFill>
+                <a:latin typeface="Arial" pitchFamily="34" charset="0"/>
+                <a:cs typeface="Arial" pitchFamily="34" charset="0"/>
+              </a:rPr>
+              <a:t>the</a:t>
+            </a:r>
+            <a:r>
+              <a:rPr lang="en-US" sz="2800" spc="166" dirty="0" smtClean="0">
+                <a:solidFill>
+                  <a:schemeClr val="tx1"/>
+                </a:solidFill>
+                <a:latin typeface="Arial" pitchFamily="34" charset="0"/>
+                <a:cs typeface="Arial" pitchFamily="34" charset="0"/>
+              </a:rPr>
+              <a:t> </a:t>
+            </a:r>
+            <a:r>
+              <a:rPr lang="en-US" sz="2800" dirty="0" smtClean="0">
+                <a:solidFill>
+                  <a:schemeClr val="tx1"/>
+                </a:solidFill>
+                <a:latin typeface="Arial" pitchFamily="34" charset="0"/>
+                <a:cs typeface="Arial" pitchFamily="34" charset="0"/>
+              </a:rPr>
+              <a:t>art</a:t>
+            </a:r>
+            <a:r>
+              <a:rPr lang="en-US" sz="2800" spc="178" dirty="0" smtClean="0">
+                <a:solidFill>
+                  <a:schemeClr val="tx1"/>
+                </a:solidFill>
+                <a:latin typeface="Arial" pitchFamily="34" charset="0"/>
+                <a:cs typeface="Arial" pitchFamily="34" charset="0"/>
+              </a:rPr>
+              <a:t> </a:t>
+            </a:r>
+            <a:r>
+              <a:rPr lang="en-US" sz="2800" dirty="0" smtClean="0">
+                <a:solidFill>
+                  <a:schemeClr val="tx1"/>
+                </a:solidFill>
+                <a:latin typeface="Arial" pitchFamily="34" charset="0"/>
+                <a:cs typeface="Arial" pitchFamily="34" charset="0"/>
+              </a:rPr>
+              <a:t>and</a:t>
+            </a:r>
+            <a:r>
+              <a:rPr lang="en-US" sz="2800" spc="185" dirty="0" smtClean="0">
+                <a:solidFill>
+                  <a:schemeClr val="tx1"/>
+                </a:solidFill>
+                <a:latin typeface="Arial" pitchFamily="34" charset="0"/>
+                <a:cs typeface="Arial" pitchFamily="34" charset="0"/>
+              </a:rPr>
+              <a:t> </a:t>
+            </a:r>
+            <a:r>
+              <a:rPr lang="en-US" sz="2800" dirty="0" smtClean="0">
+                <a:solidFill>
+                  <a:schemeClr val="tx1"/>
+                </a:solidFill>
+                <a:latin typeface="Arial" pitchFamily="34" charset="0"/>
+                <a:cs typeface="Arial" pitchFamily="34" charset="0"/>
+              </a:rPr>
+              <a:t>science</a:t>
+            </a:r>
+            <a:r>
+              <a:rPr lang="en-US" sz="2800" spc="162" dirty="0" smtClean="0">
+                <a:solidFill>
+                  <a:schemeClr val="tx1"/>
+                </a:solidFill>
+                <a:latin typeface="Arial" pitchFamily="34" charset="0"/>
+                <a:cs typeface="Arial" pitchFamily="34" charset="0"/>
+              </a:rPr>
+              <a:t> </a:t>
+            </a:r>
+            <a:r>
+              <a:rPr lang="en-US" sz="2800" dirty="0" smtClean="0">
+                <a:solidFill>
+                  <a:schemeClr val="tx1"/>
+                </a:solidFill>
+                <a:latin typeface="Arial" pitchFamily="34" charset="0"/>
+                <a:cs typeface="Arial" pitchFamily="34" charset="0"/>
+              </a:rPr>
+              <a:t>of</a:t>
+            </a:r>
+            <a:r>
+              <a:rPr lang="en-US" sz="2800" spc="189" dirty="0" smtClean="0">
+                <a:solidFill>
+                  <a:schemeClr val="tx1"/>
+                </a:solidFill>
+                <a:latin typeface="Arial" pitchFamily="34" charset="0"/>
+                <a:cs typeface="Arial" pitchFamily="34" charset="0"/>
+              </a:rPr>
+              <a:t> </a:t>
+            </a:r>
+            <a:r>
+              <a:rPr lang="en-US" sz="2800" dirty="0" smtClean="0">
+                <a:solidFill>
+                  <a:schemeClr val="tx1"/>
+                </a:solidFill>
+                <a:latin typeface="Arial" pitchFamily="34" charset="0"/>
+                <a:cs typeface="Arial" pitchFamily="34" charset="0"/>
+              </a:rPr>
+              <a:t>writing hidden</a:t>
+            </a:r>
+            <a:r>
+              <a:rPr lang="en-US" sz="2800" spc="1031" dirty="0" smtClean="0">
+                <a:solidFill>
+                  <a:schemeClr val="tx1"/>
+                </a:solidFill>
+                <a:latin typeface="Arial" pitchFamily="34" charset="0"/>
+                <a:cs typeface="Arial" pitchFamily="34" charset="0"/>
+              </a:rPr>
+              <a:t> </a:t>
+            </a:r>
+            <a:r>
+              <a:rPr lang="en-US" sz="2800" dirty="0" smtClean="0">
+                <a:solidFill>
+                  <a:schemeClr val="tx1"/>
+                </a:solidFill>
+                <a:latin typeface="Arial" pitchFamily="34" charset="0"/>
+                <a:cs typeface="Arial" pitchFamily="34" charset="0"/>
+              </a:rPr>
+              <a:t>message</a:t>
+            </a:r>
+            <a:r>
+              <a:rPr lang="en-US" sz="2800" spc="1017" dirty="0" smtClean="0">
+                <a:solidFill>
+                  <a:schemeClr val="tx1"/>
+                </a:solidFill>
+                <a:latin typeface="Arial" pitchFamily="34" charset="0"/>
+                <a:cs typeface="Arial" pitchFamily="34" charset="0"/>
+              </a:rPr>
+              <a:t> </a:t>
+            </a:r>
+            <a:r>
+              <a:rPr lang="en-US" sz="2800" dirty="0" smtClean="0">
+                <a:solidFill>
+                  <a:schemeClr val="tx1"/>
+                </a:solidFill>
+                <a:latin typeface="Arial" pitchFamily="34" charset="0"/>
+                <a:cs typeface="Arial" pitchFamily="34" charset="0"/>
+              </a:rPr>
+              <a:t>that</a:t>
+            </a:r>
+            <a:r>
+              <a:rPr lang="en-US" sz="2800" spc="1022" dirty="0" smtClean="0">
+                <a:solidFill>
+                  <a:schemeClr val="tx1"/>
+                </a:solidFill>
+                <a:latin typeface="Arial" pitchFamily="34" charset="0"/>
+                <a:cs typeface="Arial" pitchFamily="34" charset="0"/>
+              </a:rPr>
+              <a:t> </a:t>
+            </a:r>
+            <a:r>
+              <a:rPr lang="en-US" sz="2800" dirty="0" smtClean="0">
+                <a:solidFill>
+                  <a:schemeClr val="tx1"/>
+                </a:solidFill>
+                <a:latin typeface="Arial" pitchFamily="34" charset="0"/>
+                <a:cs typeface="Arial" pitchFamily="34" charset="0"/>
+              </a:rPr>
+              <a:t>no</a:t>
+            </a:r>
+            <a:r>
+              <a:rPr lang="en-US" sz="2800" spc="1015" dirty="0" smtClean="0">
+                <a:solidFill>
+                  <a:schemeClr val="tx1"/>
+                </a:solidFill>
+                <a:latin typeface="Arial" pitchFamily="34" charset="0"/>
+                <a:cs typeface="Arial" pitchFamily="34" charset="0"/>
+              </a:rPr>
+              <a:t> </a:t>
+            </a:r>
+            <a:r>
+              <a:rPr lang="en-US" sz="2800" dirty="0" smtClean="0">
+                <a:solidFill>
+                  <a:schemeClr val="tx1"/>
+                </a:solidFill>
+                <a:latin typeface="Arial" pitchFamily="34" charset="0"/>
+                <a:cs typeface="Arial" pitchFamily="34" charset="0"/>
+              </a:rPr>
+              <a:t>one</a:t>
+            </a:r>
+            <a:r>
+              <a:rPr lang="en-US" sz="2800" spc="1006" dirty="0" smtClean="0">
+                <a:solidFill>
+                  <a:schemeClr val="tx1"/>
+                </a:solidFill>
+                <a:latin typeface="Arial" pitchFamily="34" charset="0"/>
+                <a:cs typeface="Arial" pitchFamily="34" charset="0"/>
+              </a:rPr>
+              <a:t> </a:t>
+            </a:r>
+            <a:r>
+              <a:rPr lang="en-US" sz="2800" dirty="0" smtClean="0">
+                <a:solidFill>
+                  <a:schemeClr val="tx1"/>
+                </a:solidFill>
+                <a:latin typeface="Arial" pitchFamily="34" charset="0"/>
+                <a:cs typeface="Arial" pitchFamily="34" charset="0"/>
+              </a:rPr>
+              <a:t>apart</a:t>
+            </a:r>
+            <a:r>
+              <a:rPr lang="en-US" sz="2800" spc="1019" dirty="0" smtClean="0">
+                <a:solidFill>
+                  <a:schemeClr val="tx1"/>
+                </a:solidFill>
+                <a:latin typeface="Arial" pitchFamily="34" charset="0"/>
+                <a:cs typeface="Arial" pitchFamily="34" charset="0"/>
+              </a:rPr>
+              <a:t> </a:t>
+            </a:r>
+            <a:r>
+              <a:rPr lang="en-US" sz="2800" dirty="0" smtClean="0">
+                <a:solidFill>
+                  <a:schemeClr val="tx1"/>
+                </a:solidFill>
+                <a:latin typeface="Arial" pitchFamily="34" charset="0"/>
+                <a:cs typeface="Arial" pitchFamily="34" charset="0"/>
+              </a:rPr>
+              <a:t>from</a:t>
+            </a:r>
+            <a:r>
+              <a:rPr lang="en-US" sz="2800" spc="1006" dirty="0" smtClean="0">
+                <a:solidFill>
+                  <a:schemeClr val="tx1"/>
+                </a:solidFill>
+                <a:latin typeface="Arial" pitchFamily="34" charset="0"/>
+                <a:cs typeface="Arial" pitchFamily="34" charset="0"/>
+              </a:rPr>
+              <a:t> </a:t>
+            </a:r>
+            <a:r>
+              <a:rPr lang="en-US" sz="2800" dirty="0" smtClean="0">
+                <a:solidFill>
+                  <a:schemeClr val="tx1"/>
+                </a:solidFill>
+                <a:latin typeface="Arial" pitchFamily="34" charset="0"/>
+                <a:cs typeface="Arial" pitchFamily="34" charset="0"/>
+              </a:rPr>
+              <a:t>the sender</a:t>
+            </a:r>
+            <a:r>
+              <a:rPr lang="en-US" sz="2800" spc="147" dirty="0" smtClean="0">
+                <a:solidFill>
+                  <a:schemeClr val="tx1"/>
+                </a:solidFill>
+                <a:latin typeface="Arial" pitchFamily="34" charset="0"/>
+                <a:cs typeface="Arial" pitchFamily="34" charset="0"/>
+              </a:rPr>
+              <a:t> </a:t>
+            </a:r>
+            <a:r>
+              <a:rPr lang="en-US" sz="2800" dirty="0" smtClean="0">
+                <a:solidFill>
+                  <a:schemeClr val="tx1"/>
+                </a:solidFill>
+                <a:latin typeface="Arial" pitchFamily="34" charset="0"/>
+                <a:cs typeface="Arial" pitchFamily="34" charset="0"/>
+              </a:rPr>
+              <a:t>and</a:t>
+            </a:r>
+            <a:r>
+              <a:rPr lang="en-US" sz="2800" spc="130" dirty="0" smtClean="0">
+                <a:solidFill>
+                  <a:schemeClr val="tx1"/>
+                </a:solidFill>
+                <a:latin typeface="Arial" pitchFamily="34" charset="0"/>
+                <a:cs typeface="Arial" pitchFamily="34" charset="0"/>
+              </a:rPr>
+              <a:t> </a:t>
+            </a:r>
+            <a:r>
+              <a:rPr lang="en-US" sz="2800" spc="-15" dirty="0" smtClean="0">
+                <a:solidFill>
+                  <a:schemeClr val="tx1"/>
+                </a:solidFill>
+                <a:latin typeface="Arial" pitchFamily="34" charset="0"/>
+                <a:cs typeface="Arial" pitchFamily="34" charset="0"/>
+              </a:rPr>
+              <a:t>receiver,</a:t>
+            </a:r>
+            <a:r>
+              <a:rPr lang="en-US" sz="2800" spc="151" dirty="0" smtClean="0">
+                <a:solidFill>
+                  <a:schemeClr val="tx1"/>
+                </a:solidFill>
+                <a:latin typeface="Arial" pitchFamily="34" charset="0"/>
+                <a:cs typeface="Arial" pitchFamily="34" charset="0"/>
+              </a:rPr>
+              <a:t> </a:t>
+            </a:r>
+            <a:r>
+              <a:rPr lang="en-US" sz="2800" dirty="0" smtClean="0">
+                <a:solidFill>
+                  <a:schemeClr val="tx1"/>
+                </a:solidFill>
+                <a:latin typeface="Arial" pitchFamily="34" charset="0"/>
+                <a:cs typeface="Arial" pitchFamily="34" charset="0"/>
+              </a:rPr>
+              <a:t>suspect</a:t>
+            </a:r>
+            <a:r>
+              <a:rPr lang="en-US" sz="2800" spc="150" dirty="0" smtClean="0">
+                <a:solidFill>
+                  <a:schemeClr val="tx1"/>
+                </a:solidFill>
+                <a:latin typeface="Arial" pitchFamily="34" charset="0"/>
+                <a:cs typeface="Arial" pitchFamily="34" charset="0"/>
+              </a:rPr>
+              <a:t> </a:t>
+            </a:r>
+            <a:r>
+              <a:rPr lang="en-US" sz="2800" dirty="0" smtClean="0">
+                <a:solidFill>
+                  <a:schemeClr val="tx1"/>
+                </a:solidFill>
+                <a:latin typeface="Arial" pitchFamily="34" charset="0"/>
+                <a:cs typeface="Arial" pitchFamily="34" charset="0"/>
+              </a:rPr>
+              <a:t>the</a:t>
+            </a:r>
+            <a:r>
+              <a:rPr lang="en-US" sz="2800" spc="127" dirty="0" smtClean="0">
+                <a:solidFill>
+                  <a:schemeClr val="tx1"/>
+                </a:solidFill>
+                <a:latin typeface="Arial" pitchFamily="34" charset="0"/>
+                <a:cs typeface="Arial" pitchFamily="34" charset="0"/>
+              </a:rPr>
+              <a:t> </a:t>
+            </a:r>
+            <a:r>
+              <a:rPr lang="en-US" sz="2800" dirty="0" smtClean="0">
+                <a:solidFill>
+                  <a:schemeClr val="tx1"/>
+                </a:solidFill>
+                <a:latin typeface="Arial" pitchFamily="34" charset="0"/>
+                <a:cs typeface="Arial" pitchFamily="34" charset="0"/>
+              </a:rPr>
+              <a:t>existence</a:t>
+            </a:r>
+            <a:r>
+              <a:rPr lang="en-US" sz="2800" spc="140" dirty="0" smtClean="0">
+                <a:solidFill>
+                  <a:schemeClr val="tx1"/>
+                </a:solidFill>
+                <a:latin typeface="Arial" pitchFamily="34" charset="0"/>
+                <a:cs typeface="Arial" pitchFamily="34" charset="0"/>
+              </a:rPr>
+              <a:t> </a:t>
+            </a:r>
+            <a:r>
+              <a:rPr lang="en-US" sz="2800" dirty="0" smtClean="0">
+                <a:solidFill>
+                  <a:schemeClr val="tx1"/>
+                </a:solidFill>
+                <a:latin typeface="Arial" pitchFamily="34" charset="0"/>
+                <a:cs typeface="Arial" pitchFamily="34" charset="0"/>
+              </a:rPr>
+              <a:t>of</a:t>
+            </a:r>
+            <a:r>
+              <a:rPr lang="en-US" sz="2800" spc="139" dirty="0" smtClean="0">
+                <a:solidFill>
+                  <a:schemeClr val="tx1"/>
+                </a:solidFill>
+                <a:latin typeface="Arial" pitchFamily="34" charset="0"/>
+                <a:cs typeface="Arial" pitchFamily="34" charset="0"/>
+              </a:rPr>
+              <a:t> </a:t>
+            </a:r>
+            <a:r>
+              <a:rPr lang="en-US" sz="2800" dirty="0" smtClean="0">
+                <a:solidFill>
+                  <a:schemeClr val="tx1"/>
+                </a:solidFill>
+                <a:latin typeface="Arial" pitchFamily="34" charset="0"/>
+                <a:cs typeface="Arial" pitchFamily="34" charset="0"/>
+              </a:rPr>
+              <a:t>the message.</a:t>
+            </a:r>
+          </a:p>
+          <a:p>
+            <a:pPr marL="0">
+              <a:lnSpc>
+                <a:spcPts val="3096"/>
+              </a:lnSpc>
+              <a:spcBef>
+                <a:spcPts val="0"/>
+              </a:spcBef>
+            </a:pPr>
+            <a:endParaRPr lang="en-US" sz="2800" dirty="0" smtClean="0">
+              <a:solidFill>
+                <a:schemeClr val="tx1"/>
+              </a:solidFill>
+              <a:latin typeface="Arial" pitchFamily="34" charset="0"/>
+              <a:cs typeface="Arial" pitchFamily="34" charset="0"/>
+            </a:endParaRPr>
+          </a:p>
+          <a:p>
+            <a:pPr marL="0">
+              <a:lnSpc>
+                <a:spcPts val="3096"/>
+              </a:lnSpc>
+              <a:spcBef>
+                <a:spcPts val="0"/>
+              </a:spcBef>
+            </a:pPr>
+            <a:r>
+              <a:rPr lang="en-US" sz="2800" spc="-15" dirty="0" smtClean="0">
+                <a:solidFill>
+                  <a:schemeClr val="tx1"/>
+                </a:solidFill>
+                <a:latin typeface="Arial" pitchFamily="34" charset="0"/>
+                <a:cs typeface="Arial" pitchFamily="34" charset="0"/>
+              </a:rPr>
+              <a:t>LSB is the  simple method but BPCS is highly secured way of hiding the data in cover image</a:t>
+            </a:r>
+            <a:r>
+              <a:rPr lang="en-US" sz="2800" dirty="0" smtClean="0">
+                <a:solidFill>
+                  <a:schemeClr val="tx1"/>
+                </a:solidFill>
+                <a:latin typeface="Arial" pitchFamily="34" charset="0"/>
+                <a:cs typeface="Arial" pitchFamily="34" charset="0"/>
+              </a:rPr>
+              <a:t>.</a:t>
+            </a:r>
+            <a:r>
+              <a:rPr lang="en-US" sz="2800" spc="268" dirty="0" smtClean="0">
+                <a:solidFill>
+                  <a:schemeClr val="tx1"/>
+                </a:solidFill>
+                <a:latin typeface="Arial" pitchFamily="34" charset="0"/>
+                <a:cs typeface="Arial" pitchFamily="34" charset="0"/>
+              </a:rPr>
+              <a:t> </a:t>
+            </a:r>
+            <a:r>
+              <a:rPr lang="en-US" sz="2800" spc="-198" dirty="0" smtClean="0">
+                <a:solidFill>
+                  <a:schemeClr val="tx1"/>
+                </a:solidFill>
+                <a:latin typeface="Arial" pitchFamily="34" charset="0"/>
+                <a:cs typeface="Arial" pitchFamily="34" charset="0"/>
+              </a:rPr>
+              <a:t>To  </a:t>
+            </a:r>
+            <a:r>
+              <a:rPr lang="en-US" sz="2800" dirty="0" smtClean="0">
+                <a:solidFill>
+                  <a:schemeClr val="tx1"/>
+                </a:solidFill>
+                <a:latin typeface="Arial" pitchFamily="34" charset="0"/>
+                <a:cs typeface="Arial" pitchFamily="34" charset="0"/>
+              </a:rPr>
+              <a:t>provide</a:t>
+            </a:r>
+            <a:r>
+              <a:rPr lang="en-US" sz="2800" spc="2142" dirty="0" smtClean="0">
+                <a:solidFill>
+                  <a:schemeClr val="tx1"/>
+                </a:solidFill>
+                <a:latin typeface="Arial" pitchFamily="34" charset="0"/>
+                <a:cs typeface="Arial" pitchFamily="34" charset="0"/>
+              </a:rPr>
+              <a:t> </a:t>
+            </a:r>
+            <a:r>
+              <a:rPr lang="en-US" sz="2800" dirty="0" smtClean="0">
+                <a:solidFill>
+                  <a:schemeClr val="tx1"/>
+                </a:solidFill>
+                <a:latin typeface="Arial" pitchFamily="34" charset="0"/>
+                <a:cs typeface="Arial" pitchFamily="34" charset="0"/>
+              </a:rPr>
+              <a:t>high</a:t>
+            </a:r>
+            <a:r>
+              <a:rPr lang="en-US" sz="2800" spc="2138" dirty="0" smtClean="0">
+                <a:solidFill>
+                  <a:schemeClr val="tx1"/>
+                </a:solidFill>
+                <a:latin typeface="Arial" pitchFamily="34" charset="0"/>
+                <a:cs typeface="Arial" pitchFamily="34" charset="0"/>
+              </a:rPr>
+              <a:t> </a:t>
+            </a:r>
+            <a:r>
+              <a:rPr lang="en-US" sz="2800" dirty="0" smtClean="0">
+                <a:solidFill>
+                  <a:schemeClr val="tx1"/>
+                </a:solidFill>
+                <a:latin typeface="Arial" pitchFamily="34" charset="0"/>
+                <a:cs typeface="Arial" pitchFamily="34" charset="0"/>
+              </a:rPr>
+              <a:t>security</a:t>
+            </a:r>
+            <a:r>
+              <a:rPr lang="en-US" sz="2800" spc="2146" dirty="0" smtClean="0">
+                <a:solidFill>
+                  <a:schemeClr val="tx1"/>
+                </a:solidFill>
+                <a:latin typeface="Arial" pitchFamily="34" charset="0"/>
+                <a:cs typeface="Arial" pitchFamily="34" charset="0"/>
+              </a:rPr>
+              <a:t> </a:t>
+            </a:r>
+            <a:r>
+              <a:rPr lang="en-US" sz="2800" dirty="0" smtClean="0">
+                <a:solidFill>
+                  <a:schemeClr val="tx1"/>
+                </a:solidFill>
+                <a:latin typeface="Arial" pitchFamily="34" charset="0"/>
+                <a:cs typeface="Arial" pitchFamily="34" charset="0"/>
+              </a:rPr>
+              <a:t>Steganography we also provided 4 digits key option to encrypt your data.</a:t>
+            </a:r>
+          </a:p>
+          <a:p>
+            <a:pPr marL="0">
+              <a:lnSpc>
+                <a:spcPts val="3096"/>
+              </a:lnSpc>
+              <a:spcBef>
+                <a:spcPts val="0"/>
+              </a:spcBef>
+            </a:pPr>
+            <a:endParaRPr lang="en-US" sz="2800" spc="2143" dirty="0" smtClean="0">
+              <a:solidFill>
+                <a:schemeClr val="tx1"/>
+              </a:solidFill>
+              <a:latin typeface="Arial" pitchFamily="34" charset="0"/>
+              <a:cs typeface="Arial" pitchFamily="34" charset="0"/>
+            </a:endParaRPr>
+          </a:p>
+          <a:p>
+            <a:pPr marL="0">
+              <a:lnSpc>
+                <a:spcPts val="3096"/>
+              </a:lnSpc>
+              <a:spcBef>
+                <a:spcPts val="0"/>
+              </a:spcBef>
+            </a:pPr>
+            <a:r>
+              <a:rPr lang="en-US" sz="2800" spc="-11" dirty="0" smtClean="0">
+                <a:solidFill>
+                  <a:schemeClr val="tx1"/>
+                </a:solidFill>
+                <a:latin typeface="Arial" pitchFamily="34" charset="0"/>
+                <a:cs typeface="Arial" pitchFamily="34" charset="0"/>
+              </a:rPr>
+              <a:t>Larger</a:t>
+            </a:r>
+            <a:r>
+              <a:rPr lang="en-US" sz="2800" spc="888" dirty="0" smtClean="0">
+                <a:solidFill>
+                  <a:schemeClr val="tx1"/>
+                </a:solidFill>
+                <a:latin typeface="Arial" pitchFamily="34" charset="0"/>
+                <a:cs typeface="Arial" pitchFamily="34" charset="0"/>
+              </a:rPr>
+              <a:t> </a:t>
+            </a:r>
+            <a:r>
+              <a:rPr lang="en-US" sz="2800" dirty="0" smtClean="0">
+                <a:solidFill>
+                  <a:schemeClr val="tx1"/>
+                </a:solidFill>
+                <a:latin typeface="Arial" pitchFamily="34" charset="0"/>
+                <a:cs typeface="Arial" pitchFamily="34" charset="0"/>
+              </a:rPr>
+              <a:t>PSNR</a:t>
+            </a:r>
+            <a:r>
+              <a:rPr lang="en-US" sz="2800" spc="860" dirty="0" smtClean="0">
+                <a:solidFill>
+                  <a:schemeClr val="tx1"/>
+                </a:solidFill>
+                <a:latin typeface="Arial" pitchFamily="34" charset="0"/>
+                <a:cs typeface="Arial" pitchFamily="34" charset="0"/>
+              </a:rPr>
+              <a:t> </a:t>
+            </a:r>
+            <a:r>
+              <a:rPr lang="en-US" sz="2800" dirty="0" smtClean="0">
+                <a:solidFill>
+                  <a:schemeClr val="tx1"/>
+                </a:solidFill>
+                <a:latin typeface="Arial" pitchFamily="34" charset="0"/>
+                <a:cs typeface="Arial" pitchFamily="34" charset="0"/>
+              </a:rPr>
+              <a:t>indicates</a:t>
+            </a:r>
+            <a:r>
+              <a:rPr lang="en-US" sz="2800" spc="856" dirty="0" smtClean="0">
+                <a:solidFill>
+                  <a:schemeClr val="tx1"/>
+                </a:solidFill>
+                <a:latin typeface="Arial" pitchFamily="34" charset="0"/>
+                <a:cs typeface="Arial" pitchFamily="34" charset="0"/>
+              </a:rPr>
+              <a:t> </a:t>
+            </a:r>
+            <a:r>
+              <a:rPr lang="en-US" sz="2800" dirty="0" smtClean="0">
+                <a:solidFill>
+                  <a:schemeClr val="tx1"/>
+                </a:solidFill>
+                <a:latin typeface="Arial" pitchFamily="34" charset="0"/>
+                <a:cs typeface="Arial" pitchFamily="34" charset="0"/>
+              </a:rPr>
+              <a:t>the</a:t>
+            </a:r>
+            <a:r>
+              <a:rPr lang="en-US" sz="2800" spc="857" dirty="0" smtClean="0">
+                <a:solidFill>
+                  <a:schemeClr val="tx1"/>
+                </a:solidFill>
+                <a:latin typeface="Arial" pitchFamily="34" charset="0"/>
+                <a:cs typeface="Arial" pitchFamily="34" charset="0"/>
+              </a:rPr>
+              <a:t> </a:t>
+            </a:r>
+            <a:r>
+              <a:rPr lang="en-US" sz="2800" dirty="0" smtClean="0">
+                <a:solidFill>
+                  <a:schemeClr val="tx1"/>
+                </a:solidFill>
+                <a:latin typeface="Arial" pitchFamily="34" charset="0"/>
+                <a:cs typeface="Arial" pitchFamily="34" charset="0"/>
+              </a:rPr>
+              <a:t>higher</a:t>
+            </a:r>
+            <a:r>
+              <a:rPr lang="en-US" sz="2800" spc="864" dirty="0" smtClean="0">
+                <a:solidFill>
+                  <a:schemeClr val="tx1"/>
+                </a:solidFill>
+                <a:latin typeface="Arial" pitchFamily="34" charset="0"/>
+                <a:cs typeface="Arial" pitchFamily="34" charset="0"/>
+              </a:rPr>
+              <a:t> </a:t>
+            </a:r>
+            <a:r>
+              <a:rPr lang="en-US" sz="2800" dirty="0" smtClean="0">
+                <a:solidFill>
+                  <a:schemeClr val="tx1"/>
+                </a:solidFill>
+                <a:latin typeface="Arial" pitchFamily="34" charset="0"/>
+                <a:cs typeface="Arial" pitchFamily="34" charset="0"/>
+              </a:rPr>
+              <a:t>the</a:t>
+            </a:r>
+            <a:r>
+              <a:rPr lang="en-US" sz="2800" spc="844" dirty="0" smtClean="0">
+                <a:solidFill>
+                  <a:schemeClr val="tx1"/>
+                </a:solidFill>
+                <a:latin typeface="Arial" pitchFamily="34" charset="0"/>
+                <a:cs typeface="Arial" pitchFamily="34" charset="0"/>
+              </a:rPr>
+              <a:t> </a:t>
+            </a:r>
+            <a:r>
+              <a:rPr lang="en-US" sz="2800" dirty="0" smtClean="0">
+                <a:solidFill>
+                  <a:schemeClr val="tx1"/>
+                </a:solidFill>
+                <a:latin typeface="Arial" pitchFamily="34" charset="0"/>
+                <a:cs typeface="Arial" pitchFamily="34" charset="0"/>
+              </a:rPr>
+              <a:t>image quality.</a:t>
+            </a:r>
+            <a:r>
+              <a:rPr lang="en-US" sz="2800" spc="496" dirty="0" smtClean="0">
+                <a:solidFill>
+                  <a:schemeClr val="tx1"/>
+                </a:solidFill>
+                <a:latin typeface="Arial" pitchFamily="34" charset="0"/>
+                <a:cs typeface="Arial" pitchFamily="34" charset="0"/>
+              </a:rPr>
+              <a:t> </a:t>
+            </a:r>
+            <a:r>
+              <a:rPr lang="en-US" sz="2800" dirty="0" smtClean="0">
+                <a:solidFill>
+                  <a:schemeClr val="tx1"/>
+                </a:solidFill>
+                <a:latin typeface="Arial" pitchFamily="34" charset="0"/>
+                <a:cs typeface="Arial" pitchFamily="34" charset="0"/>
+              </a:rPr>
+              <a:t>A</a:t>
+            </a:r>
+            <a:r>
+              <a:rPr lang="en-US" sz="2800" spc="480" dirty="0" smtClean="0">
+                <a:solidFill>
+                  <a:schemeClr val="tx1"/>
+                </a:solidFill>
+                <a:latin typeface="Arial" pitchFamily="34" charset="0"/>
+                <a:cs typeface="Arial" pitchFamily="34" charset="0"/>
+              </a:rPr>
+              <a:t> </a:t>
+            </a:r>
+            <a:r>
+              <a:rPr lang="en-US" sz="2800" dirty="0" smtClean="0">
+                <a:solidFill>
+                  <a:schemeClr val="tx1"/>
+                </a:solidFill>
+                <a:latin typeface="Arial" pitchFamily="34" charset="0"/>
+                <a:cs typeface="Arial" pitchFamily="34" charset="0"/>
+              </a:rPr>
+              <a:t>smaller</a:t>
+            </a:r>
+            <a:r>
+              <a:rPr lang="en-US" sz="2800" spc="503" dirty="0" smtClean="0">
+                <a:solidFill>
+                  <a:schemeClr val="tx1"/>
+                </a:solidFill>
+                <a:latin typeface="Arial" pitchFamily="34" charset="0"/>
+                <a:cs typeface="Arial" pitchFamily="34" charset="0"/>
+              </a:rPr>
+              <a:t> </a:t>
+            </a:r>
+            <a:r>
+              <a:rPr lang="en-US" sz="2800" dirty="0" smtClean="0">
+                <a:solidFill>
+                  <a:schemeClr val="tx1"/>
+                </a:solidFill>
+                <a:latin typeface="Arial" pitchFamily="34" charset="0"/>
+                <a:cs typeface="Arial" pitchFamily="34" charset="0"/>
+              </a:rPr>
+              <a:t>PSNR</a:t>
+            </a:r>
+            <a:r>
+              <a:rPr lang="en-US" sz="2800" spc="509" dirty="0" smtClean="0">
+                <a:solidFill>
+                  <a:schemeClr val="tx1"/>
+                </a:solidFill>
+                <a:latin typeface="Arial" pitchFamily="34" charset="0"/>
+                <a:cs typeface="Arial" pitchFamily="34" charset="0"/>
+              </a:rPr>
+              <a:t> </a:t>
+            </a:r>
+            <a:r>
+              <a:rPr lang="en-US" sz="2800" dirty="0" smtClean="0">
+                <a:solidFill>
+                  <a:schemeClr val="tx1"/>
+                </a:solidFill>
+                <a:latin typeface="Arial" pitchFamily="34" charset="0"/>
+                <a:cs typeface="Arial" pitchFamily="34" charset="0"/>
+              </a:rPr>
+              <a:t>means</a:t>
+            </a:r>
+            <a:r>
+              <a:rPr lang="en-US" sz="2800" spc="503" dirty="0" smtClean="0">
+                <a:solidFill>
+                  <a:schemeClr val="tx1"/>
+                </a:solidFill>
+                <a:latin typeface="Arial" pitchFamily="34" charset="0"/>
+                <a:cs typeface="Arial" pitchFamily="34" charset="0"/>
+              </a:rPr>
+              <a:t> </a:t>
+            </a:r>
+            <a:r>
+              <a:rPr lang="en-US" sz="2800" dirty="0" smtClean="0">
+                <a:solidFill>
+                  <a:schemeClr val="tx1"/>
+                </a:solidFill>
+                <a:latin typeface="Arial" pitchFamily="34" charset="0"/>
+                <a:cs typeface="Arial" pitchFamily="34" charset="0"/>
+              </a:rPr>
+              <a:t>there</a:t>
+            </a:r>
+            <a:r>
+              <a:rPr lang="en-US" sz="2800" spc="498" dirty="0" smtClean="0">
+                <a:solidFill>
+                  <a:schemeClr val="tx1"/>
+                </a:solidFill>
+                <a:latin typeface="Arial" pitchFamily="34" charset="0"/>
+                <a:cs typeface="Arial" pitchFamily="34" charset="0"/>
+              </a:rPr>
+              <a:t> </a:t>
+            </a:r>
+            <a:r>
+              <a:rPr lang="en-US" sz="2800" spc="-10" dirty="0" smtClean="0">
+                <a:solidFill>
+                  <a:schemeClr val="tx1"/>
+                </a:solidFill>
+                <a:latin typeface="Arial" pitchFamily="34" charset="0"/>
+                <a:cs typeface="Arial" pitchFamily="34" charset="0"/>
+              </a:rPr>
+              <a:t>is</a:t>
+            </a:r>
+            <a:r>
+              <a:rPr lang="en-US" sz="2800" spc="511" dirty="0" smtClean="0">
+                <a:solidFill>
+                  <a:schemeClr val="tx1"/>
+                </a:solidFill>
+                <a:latin typeface="Arial" pitchFamily="34" charset="0"/>
+                <a:cs typeface="Arial" pitchFamily="34" charset="0"/>
+              </a:rPr>
+              <a:t> </a:t>
+            </a:r>
+            <a:r>
+              <a:rPr lang="en-US" sz="2800" dirty="0" smtClean="0">
+                <a:solidFill>
+                  <a:schemeClr val="tx1"/>
+                </a:solidFill>
+                <a:latin typeface="Arial" pitchFamily="34" charset="0"/>
+                <a:cs typeface="Arial" pitchFamily="34" charset="0"/>
+              </a:rPr>
+              <a:t>huge distortion</a:t>
+            </a:r>
+            <a:r>
+              <a:rPr lang="en-US" sz="2800" spc="1247" dirty="0" smtClean="0">
+                <a:solidFill>
+                  <a:schemeClr val="tx1"/>
+                </a:solidFill>
+                <a:latin typeface="Arial" pitchFamily="34" charset="0"/>
+                <a:cs typeface="Arial" pitchFamily="34" charset="0"/>
+              </a:rPr>
+              <a:t> </a:t>
+            </a:r>
+            <a:r>
+              <a:rPr lang="en-US" sz="2800" dirty="0" smtClean="0">
+                <a:solidFill>
+                  <a:schemeClr val="tx1"/>
+                </a:solidFill>
+                <a:latin typeface="Arial" pitchFamily="34" charset="0"/>
+                <a:cs typeface="Arial" pitchFamily="34" charset="0"/>
+              </a:rPr>
+              <a:t>between</a:t>
+            </a:r>
+            <a:r>
+              <a:rPr lang="en-US" sz="2800" spc="1265" dirty="0" smtClean="0">
+                <a:solidFill>
+                  <a:schemeClr val="tx1"/>
+                </a:solidFill>
+                <a:latin typeface="Arial" pitchFamily="34" charset="0"/>
+                <a:cs typeface="Arial" pitchFamily="34" charset="0"/>
+              </a:rPr>
+              <a:t> </a:t>
+            </a:r>
+            <a:r>
+              <a:rPr lang="en-US" sz="2800" dirty="0" smtClean="0">
+                <a:solidFill>
+                  <a:schemeClr val="tx1"/>
+                </a:solidFill>
+                <a:latin typeface="Arial" pitchFamily="34" charset="0"/>
+                <a:cs typeface="Arial" pitchFamily="34" charset="0"/>
+              </a:rPr>
+              <a:t>the</a:t>
+            </a:r>
+            <a:r>
+              <a:rPr lang="en-US" sz="2800" spc="1239" dirty="0" smtClean="0">
+                <a:solidFill>
+                  <a:schemeClr val="tx1"/>
+                </a:solidFill>
+                <a:latin typeface="Arial" pitchFamily="34" charset="0"/>
+                <a:cs typeface="Arial" pitchFamily="34" charset="0"/>
+              </a:rPr>
+              <a:t> </a:t>
+            </a:r>
+            <a:r>
+              <a:rPr lang="en-US" sz="2800" dirty="0" smtClean="0">
+                <a:solidFill>
+                  <a:schemeClr val="tx1"/>
+                </a:solidFill>
+                <a:latin typeface="Arial" pitchFamily="34" charset="0"/>
+                <a:cs typeface="Arial" pitchFamily="34" charset="0"/>
+              </a:rPr>
+              <a:t>cover-image</a:t>
+            </a:r>
+            <a:r>
+              <a:rPr lang="en-US" sz="2800" spc="1259" dirty="0" smtClean="0">
+                <a:solidFill>
+                  <a:schemeClr val="tx1"/>
+                </a:solidFill>
+                <a:latin typeface="Arial" pitchFamily="34" charset="0"/>
+                <a:cs typeface="Arial" pitchFamily="34" charset="0"/>
+              </a:rPr>
+              <a:t> </a:t>
+            </a:r>
+            <a:r>
+              <a:rPr lang="en-US" sz="2800" dirty="0" smtClean="0">
+                <a:solidFill>
+                  <a:schemeClr val="tx1"/>
+                </a:solidFill>
+                <a:latin typeface="Arial" pitchFamily="34" charset="0"/>
+                <a:cs typeface="Arial" pitchFamily="34" charset="0"/>
+              </a:rPr>
+              <a:t>and</a:t>
+            </a:r>
+            <a:r>
+              <a:rPr lang="en-US" sz="2800" spc="1252" dirty="0" smtClean="0">
+                <a:solidFill>
+                  <a:schemeClr val="tx1"/>
+                </a:solidFill>
+                <a:latin typeface="Arial" pitchFamily="34" charset="0"/>
+                <a:cs typeface="Arial" pitchFamily="34" charset="0"/>
+              </a:rPr>
+              <a:t> </a:t>
+            </a:r>
+            <a:r>
+              <a:rPr lang="en-US" sz="2800" dirty="0" smtClean="0">
+                <a:solidFill>
+                  <a:schemeClr val="tx1"/>
+                </a:solidFill>
+                <a:latin typeface="Arial" pitchFamily="34" charset="0"/>
+                <a:cs typeface="Arial" pitchFamily="34" charset="0"/>
+              </a:rPr>
+              <a:t>the stegano Image</a:t>
+            </a:r>
+          </a:p>
+          <a:p>
+            <a:pPr marL="0">
+              <a:lnSpc>
+                <a:spcPts val="3096"/>
+              </a:lnSpc>
+              <a:spcBef>
+                <a:spcPts val="0"/>
+              </a:spcBef>
+            </a:pPr>
+            <a:endParaRPr lang="en-US" dirty="0" smtClean="0">
+              <a:solidFill>
+                <a:srgbClr val="000000"/>
+              </a:solidFill>
+              <a:latin typeface="Times New Roman"/>
+              <a:cs typeface="Times New Roman"/>
+            </a:endParaRPr>
+          </a:p>
+          <a:p>
+            <a:pPr marL="0">
+              <a:lnSpc>
+                <a:spcPts val="3096"/>
+              </a:lnSpc>
+              <a:spcBef>
+                <a:spcPts val="0"/>
+              </a:spcBef>
+            </a:pPr>
+            <a:endParaRPr lang="en-US" dirty="0" smtClean="0">
+              <a:solidFill>
+                <a:srgbClr val="000000"/>
+              </a:solidFill>
+              <a:latin typeface="Times New Roman"/>
+              <a:cs typeface="Times New Roman"/>
+            </a:endParaRPr>
+          </a:p>
+          <a:p>
+            <a:endParaRPr lang="en-IN" dirty="0"/>
+          </a:p>
+        </p:txBody>
+      </p:sp>
+    </p:spTree>
+    <p:extLst>
+      <p:ext uri="{BB962C8B-B14F-4D97-AF65-F5344CB8AC3E}">
+        <p14:creationId xmlns:p14="http://schemas.microsoft.com/office/powerpoint/2010/main" val="2347577460"/>
+      </p:ext>
+    </p:extLst>
+  </p:cSld>
+  <p:clrMapOvr>
+    <a:masterClrMapping/>
+  </p:clrMapOvr>
+  <p:timing>
+    <p:tnLst>
+      <p:par>
+        <p:cTn id="1" dur="indefinite" restart="never" nodeType="tmRoot"/>
+      </p:par>
+    </p:tnLst>
+  </p:timing>
+</p:sld>
+</file>
+
+<file path=ppt/slides/slide31.xml><?xml version="1.0" encoding="utf-8"?>
 <p:sld xmlns:a="http://schemas.openxmlformats.org/drawingml/2006/main" xmlns:r="http://schemas.openxmlformats.org/officeDocument/2006/relationships" xmlns:p="http://schemas.openxmlformats.org/presentationml/2006/main">
   <p:cSld>
     <p:spTree>

</xml_diff>

<commit_message>
CHAPTER 4 IS COMPLETE AND EDITED
</commit_message>
<xml_diff>
--- a/Project letrature/IMAGE_STEGNOGRAPHY_USING_PYTHON.pptx
+++ b/Project letrature/IMAGE_STEGNOGRAPHY_USING_PYTHON.pptx
@@ -141,7 +141,7 @@
   </p:defaultTextStyle>
   <p:extLst>
     <p:ext uri="{521415D9-36F7-43E2-AB2F-B90AF26B5E84}">
-      <p14:sectionLst xmlns:p14="http://schemas.microsoft.com/office/powerpoint/2010/main">
+      <p14:sectionLst xmlns:p14="http://schemas.microsoft.com/office/powerpoint/2010/main" xmlns="">
         <p14:section name="Default Section" id="{1709AB17-A0DF-4151-9302-FDFCA00A6D75}">
           <p14:sldIdLst>
             <p14:sldId id="256"/>
@@ -165,8 +165,6 @@
             <p14:sldId id="264"/>
             <p14:sldId id="265"/>
             <p14:sldId id="288"/>
-            <p14:sldId id="289"/>
-            <p14:sldId id="290"/>
             <p14:sldId id="266"/>
             <p14:sldId id="267"/>
             <p14:sldId id="270"/>
@@ -182,7 +180,7 @@
       </p14:sectionLst>
     </p:ext>
     <p:ext uri="{EFAFB233-063F-42B5-8137-9DF3F51BA10A}">
-      <p15:sldGuideLst xmlns:p15="http://schemas.microsoft.com/office/powerpoint/2012/main">
+      <p15:sldGuideLst xmlns:p15="http://schemas.microsoft.com/office/powerpoint/2012/main" xmlns="">
         <p15:guide id="1" orient="horz" pos="2160">
           <p15:clr>
             <a:srgbClr val="A4A3A4"/>
@@ -204,7 +202,7 @@
   <p:cmAuthor id="1" name="Tarun Verma" initials="TV" lastIdx="2" clrIdx="0">
     <p:extLst>
       <p:ext uri="{19B8F6BF-5375-455C-9EA6-DF929625EA0E}">
-        <p15:presenceInfo xmlns:p15="http://schemas.microsoft.com/office/powerpoint/2012/main" userId="12328a8a1cac093b" providerId="Windows Live"/>
+        <p15:presenceInfo xmlns:p15="http://schemas.microsoft.com/office/powerpoint/2012/main" xmlns="" userId="12328a8a1cac093b" providerId="Windows Live"/>
       </p:ext>
     </p:extLst>
   </p:cmAuthor>
@@ -218,7 +216,7 @@
     <p:text/>
     <p:extLst>
       <p:ext uri="{C676402C-5697-4E1C-873F-D02D1690AC5C}">
-        <p15:threadingInfo xmlns:p15="http://schemas.microsoft.com/office/powerpoint/2012/main" timeZoneBias="-330"/>
+        <p15:threadingInfo xmlns:p15="http://schemas.microsoft.com/office/powerpoint/2012/main" xmlns="" timeZoneBias="-330"/>
       </p:ext>
     </p:extLst>
   </p:cm>
@@ -232,7 +230,7 @@
     <p:text/>
     <p:extLst>
       <p:ext uri="{C676402C-5697-4E1C-873F-D02D1690AC5C}">
-        <p15:threadingInfo xmlns:p15="http://schemas.microsoft.com/office/powerpoint/2012/main" timeZoneBias="-330"/>
+        <p15:threadingInfo xmlns:p15="http://schemas.microsoft.com/office/powerpoint/2012/main" xmlns="" timeZoneBias="-330"/>
       </p:ext>
     </p:extLst>
   </p:cm>
@@ -491,7 +489,7 @@
     </p:spTree>
     <p:extLst>
       <p:ext uri="{BB962C8B-B14F-4D97-AF65-F5344CB8AC3E}">
-        <p14:creationId xmlns:p14="http://schemas.microsoft.com/office/powerpoint/2010/main" val="2598052617"/>
+        <p14:creationId xmlns:p14="http://schemas.microsoft.com/office/powerpoint/2010/main" xmlns="" val="2598052617"/>
       </p:ext>
     </p:extLst>
   </p:cSld>
@@ -919,7 +917,7 @@
     </p:spTree>
     <p:extLst>
       <p:ext uri="{BB962C8B-B14F-4D97-AF65-F5344CB8AC3E}">
-        <p14:creationId xmlns:p14="http://schemas.microsoft.com/office/powerpoint/2010/main" val="2832675995"/>
+        <p14:creationId xmlns:p14="http://schemas.microsoft.com/office/powerpoint/2010/main" xmlns="" val="2832675995"/>
       </p:ext>
     </p:extLst>
   </p:cSld>
@@ -1259,7 +1257,7 @@
     </p:spTree>
     <p:extLst>
       <p:ext uri="{BB962C8B-B14F-4D97-AF65-F5344CB8AC3E}">
-        <p14:creationId xmlns:p14="http://schemas.microsoft.com/office/powerpoint/2010/main" val="1136343294"/>
+        <p14:creationId xmlns:p14="http://schemas.microsoft.com/office/powerpoint/2010/main" xmlns="" val="1136343294"/>
       </p:ext>
     </p:extLst>
   </p:cSld>
@@ -1738,7 +1736,7 @@
     </p:spTree>
     <p:extLst>
       <p:ext uri="{BB962C8B-B14F-4D97-AF65-F5344CB8AC3E}">
-        <p14:creationId xmlns:p14="http://schemas.microsoft.com/office/powerpoint/2010/main" val="1584917057"/>
+        <p14:creationId xmlns:p14="http://schemas.microsoft.com/office/powerpoint/2010/main" xmlns="" val="1584917057"/>
       </p:ext>
     </p:extLst>
   </p:cSld>
@@ -2000,7 +1998,7 @@
     </p:spTree>
     <p:extLst>
       <p:ext uri="{BB962C8B-B14F-4D97-AF65-F5344CB8AC3E}">
-        <p14:creationId xmlns:p14="http://schemas.microsoft.com/office/powerpoint/2010/main" val="1255812982"/>
+        <p14:creationId xmlns:p14="http://schemas.microsoft.com/office/powerpoint/2010/main" xmlns="" val="1255812982"/>
       </p:ext>
     </p:extLst>
   </p:cSld>
@@ -2398,7 +2396,7 @@
     </p:spTree>
     <p:extLst>
       <p:ext uri="{BB962C8B-B14F-4D97-AF65-F5344CB8AC3E}">
-        <p14:creationId xmlns:p14="http://schemas.microsoft.com/office/powerpoint/2010/main" val="3619512775"/>
+        <p14:creationId xmlns:p14="http://schemas.microsoft.com/office/powerpoint/2010/main" xmlns="" val="3619512775"/>
       </p:ext>
     </p:extLst>
   </p:cSld>
@@ -2720,7 +2718,7 @@
     </p:spTree>
     <p:extLst>
       <p:ext uri="{BB962C8B-B14F-4D97-AF65-F5344CB8AC3E}">
-        <p14:creationId xmlns:p14="http://schemas.microsoft.com/office/powerpoint/2010/main" val="3559520111"/>
+        <p14:creationId xmlns:p14="http://schemas.microsoft.com/office/powerpoint/2010/main" xmlns="" val="3559520111"/>
       </p:ext>
     </p:extLst>
   </p:cSld>
@@ -2974,7 +2972,7 @@
     </p:spTree>
     <p:extLst>
       <p:ext uri="{BB962C8B-B14F-4D97-AF65-F5344CB8AC3E}">
-        <p14:creationId xmlns:p14="http://schemas.microsoft.com/office/powerpoint/2010/main" val="1506902780"/>
+        <p14:creationId xmlns:p14="http://schemas.microsoft.com/office/powerpoint/2010/main" xmlns="" val="1506902780"/>
       </p:ext>
     </p:extLst>
   </p:cSld>
@@ -3238,7 +3236,7 @@
     </p:spTree>
     <p:extLst>
       <p:ext uri="{BB962C8B-B14F-4D97-AF65-F5344CB8AC3E}">
-        <p14:creationId xmlns:p14="http://schemas.microsoft.com/office/powerpoint/2010/main" val="369909214"/>
+        <p14:creationId xmlns:p14="http://schemas.microsoft.com/office/powerpoint/2010/main" xmlns="" val="369909214"/>
       </p:ext>
     </p:extLst>
   </p:cSld>
@@ -3502,7 +3500,7 @@
     </p:spTree>
     <p:extLst>
       <p:ext uri="{BB962C8B-B14F-4D97-AF65-F5344CB8AC3E}">
-        <p14:creationId xmlns:p14="http://schemas.microsoft.com/office/powerpoint/2010/main" val="3017200259"/>
+        <p14:creationId xmlns:p14="http://schemas.microsoft.com/office/powerpoint/2010/main" xmlns="" val="3017200259"/>
       </p:ext>
     </p:extLst>
   </p:cSld>
@@ -3838,7 +3836,7 @@
     </p:spTree>
     <p:extLst>
       <p:ext uri="{BB962C8B-B14F-4D97-AF65-F5344CB8AC3E}">
-        <p14:creationId xmlns:p14="http://schemas.microsoft.com/office/powerpoint/2010/main" val="2732314535"/>
+        <p14:creationId xmlns:p14="http://schemas.microsoft.com/office/powerpoint/2010/main" xmlns="" val="2732314535"/>
       </p:ext>
     </p:extLst>
   </p:cSld>
@@ -4163,7 +4161,7 @@
     </p:spTree>
     <p:extLst>
       <p:ext uri="{BB962C8B-B14F-4D97-AF65-F5344CB8AC3E}">
-        <p14:creationId xmlns:p14="http://schemas.microsoft.com/office/powerpoint/2010/main" val="2944525080"/>
+        <p14:creationId xmlns:p14="http://schemas.microsoft.com/office/powerpoint/2010/main" xmlns="" val="2944525080"/>
       </p:ext>
     </p:extLst>
   </p:cSld>
@@ -4622,7 +4620,7 @@
     </p:spTree>
     <p:extLst>
       <p:ext uri="{BB962C8B-B14F-4D97-AF65-F5344CB8AC3E}">
-        <p14:creationId xmlns:p14="http://schemas.microsoft.com/office/powerpoint/2010/main" val="2552920587"/>
+        <p14:creationId xmlns:p14="http://schemas.microsoft.com/office/powerpoint/2010/main" xmlns="" val="2552920587"/>
       </p:ext>
     </p:extLst>
   </p:cSld>
@@ -4824,7 +4822,7 @@
     </p:spTree>
     <p:extLst>
       <p:ext uri="{BB962C8B-B14F-4D97-AF65-F5344CB8AC3E}">
-        <p14:creationId xmlns:p14="http://schemas.microsoft.com/office/powerpoint/2010/main" val="746962661"/>
+        <p14:creationId xmlns:p14="http://schemas.microsoft.com/office/powerpoint/2010/main" xmlns="" val="746962661"/>
       </p:ext>
     </p:extLst>
   </p:cSld>
@@ -5003,7 +5001,7 @@
     </p:spTree>
     <p:extLst>
       <p:ext uri="{BB962C8B-B14F-4D97-AF65-F5344CB8AC3E}">
-        <p14:creationId xmlns:p14="http://schemas.microsoft.com/office/powerpoint/2010/main" val="1124397907"/>
+        <p14:creationId xmlns:p14="http://schemas.microsoft.com/office/powerpoint/2010/main" xmlns="" val="1124397907"/>
       </p:ext>
     </p:extLst>
   </p:cSld>
@@ -5338,7 +5336,7 @@
     </p:spTree>
     <p:extLst>
       <p:ext uri="{BB962C8B-B14F-4D97-AF65-F5344CB8AC3E}">
-        <p14:creationId xmlns:p14="http://schemas.microsoft.com/office/powerpoint/2010/main" val="767815197"/>
+        <p14:creationId xmlns:p14="http://schemas.microsoft.com/office/powerpoint/2010/main" xmlns="" val="767815197"/>
       </p:ext>
     </p:extLst>
   </p:cSld>
@@ -5690,7 +5688,7 @@
     </p:spTree>
     <p:extLst>
       <p:ext uri="{BB962C8B-B14F-4D97-AF65-F5344CB8AC3E}">
-        <p14:creationId xmlns:p14="http://schemas.microsoft.com/office/powerpoint/2010/main" val="2825805858"/>
+        <p14:creationId xmlns:p14="http://schemas.microsoft.com/office/powerpoint/2010/main" xmlns="" val="2825805858"/>
       </p:ext>
     </p:extLst>
   </p:cSld>
@@ -7693,7 +7691,7 @@
     </p:spTree>
     <p:extLst>
       <p:ext uri="{BB962C8B-B14F-4D97-AF65-F5344CB8AC3E}">
-        <p14:creationId xmlns:p14="http://schemas.microsoft.com/office/powerpoint/2010/main" val="3788863745"/>
+        <p14:creationId xmlns:p14="http://schemas.microsoft.com/office/powerpoint/2010/main" xmlns="" val="3788863745"/>
       </p:ext>
     </p:extLst>
   </p:cSld>
@@ -8268,7 +8266,7 @@
     </p:spTree>
     <p:extLst>
       <p:ext uri="{BB962C8B-B14F-4D97-AF65-F5344CB8AC3E}">
-        <p14:creationId xmlns:p14="http://schemas.microsoft.com/office/powerpoint/2010/main" val="2724423283"/>
+        <p14:creationId xmlns:p14="http://schemas.microsoft.com/office/powerpoint/2010/main" xmlns="" val="2724423283"/>
       </p:ext>
     </p:extLst>
   </p:cSld>
@@ -8352,7 +8350,7 @@
           <a:blip r:embed="rId2" cstate="print">
             <a:extLst>
               <a:ext uri="{28A0092B-C50C-407E-A947-70E740481C1C}">
-                <a14:useLocalDpi xmlns:a14="http://schemas.microsoft.com/office/drawing/2010/main" val="0"/>
+                <a14:useLocalDpi xmlns:a14="http://schemas.microsoft.com/office/drawing/2010/main" xmlns="" val="0"/>
               </a:ext>
             </a:extLst>
           </a:blip>
@@ -8399,7 +8397,7 @@
     </p:spTree>
     <p:extLst>
       <p:ext uri="{BB962C8B-B14F-4D97-AF65-F5344CB8AC3E}">
-        <p14:creationId xmlns:p14="http://schemas.microsoft.com/office/powerpoint/2010/main" val="110383111"/>
+        <p14:creationId xmlns:p14="http://schemas.microsoft.com/office/powerpoint/2010/main" xmlns="" val="110383111"/>
       </p:ext>
     </p:extLst>
   </p:cSld>
@@ -11111,8 +11109,102 @@
         </p:blipFill>
         <p:spPr bwMode="auto">
           <a:xfrm>
-            <a:off x="2198958" y="989814"/>
-            <a:ext cx="9405437" cy="5622251"/>
+            <a:off x="2255520" y="987367"/>
+            <a:ext cx="8554720" cy="5728393"/>
+          </a:xfrm>
+          <a:prstGeom prst="rect">
+            <a:avLst/>
+          </a:prstGeom>
+          <a:noFill/>
+        </p:spPr>
+      </p:pic>
+    </p:spTree>
+    <p:extLst>
+      <p:ext uri="{BB962C8B-B14F-4D97-AF65-F5344CB8AC3E}">
+        <p14:creationId xmlns:p14="http://schemas.microsoft.com/office/powerpoint/2010/main" xmlns="" val="1974539145"/>
+      </p:ext>
+    </p:extLst>
+  </p:cSld>
+  <p:clrMapOvr>
+    <a:masterClrMapping/>
+  </p:clrMapOvr>
+</p:sld>
+</file>
+
+<file path=ppt/slides/slide19.xml><?xml version="1.0" encoding="utf-8"?>
+<p:sld xmlns:a="http://schemas.openxmlformats.org/drawingml/2006/main" xmlns:r="http://schemas.openxmlformats.org/officeDocument/2006/relationships" xmlns:p="http://schemas.openxmlformats.org/presentationml/2006/main">
+  <p:cSld>
+    <p:spTree>
+      <p:nvGrpSpPr>
+        <p:cNvPr id="1" name=""/>
+        <p:cNvGrpSpPr/>
+        <p:nvPr/>
+      </p:nvGrpSpPr>
+      <p:grpSpPr>
+        <a:xfrm>
+          <a:off x="0" y="0"/>
+          <a:ext cx="0" cy="0"/>
+          <a:chOff x="0" y="0"/>
+          <a:chExt cx="0" cy="0"/>
+        </a:xfrm>
+      </p:grpSpPr>
+      <p:sp>
+        <p:nvSpPr>
+          <p:cNvPr id="2" name="Title 1"/>
+          <p:cNvSpPr>
+            <a:spLocks noGrp="1"/>
+          </p:cNvSpPr>
+          <p:nvPr>
+            <p:ph type="title"/>
+          </p:nvPr>
+        </p:nvSpPr>
+        <p:spPr>
+          <a:xfrm>
+            <a:off x="2592925" y="624110"/>
+            <a:ext cx="8911687" cy="780484"/>
+          </a:xfrm>
+        </p:spPr>
+        <p:txBody>
+          <a:bodyPr/>
+          <a:lstStyle/>
+          <a:p>
+            <a:pPr algn="ctr"/>
+            <a:r>
+              <a:rPr lang="en-US" dirty="0" smtClean="0"/>
+              <a:t>ER </a:t>
+            </a:r>
+            <a:r>
+              <a:rPr lang="en-US" dirty="0" smtClean="0">
+                <a:latin typeface="Algerian" panose="04020705040A02060702" pitchFamily="82" charset="0"/>
+              </a:rPr>
+              <a:t>DIAGRAM</a:t>
+            </a:r>
+            <a:endParaRPr lang="en-IN" dirty="0">
+              <a:latin typeface="Algerian" panose="04020705040A02060702" pitchFamily="82" charset="0"/>
+            </a:endParaRPr>
+          </a:p>
+        </p:txBody>
+      </p:sp>
+      <p:pic>
+        <p:nvPicPr>
+          <p:cNvPr id="4" name="Content Placeholder 3"/>
+          <p:cNvPicPr>
+            <a:picLocks noGrp="1" noChangeAspect="1"/>
+          </p:cNvPicPr>
+          <p:nvPr>
+            <p:ph idx="1"/>
+          </p:nvPr>
+        </p:nvPicPr>
+        <p:blipFill>
+          <a:blip r:embed="rId2" cstate="print"/>
+          <a:stretch>
+            <a:fillRect/>
+          </a:stretch>
+        </p:blipFill>
+        <p:spPr>
+          <a:xfrm>
+            <a:off x="2451698" y="1404594"/>
+            <a:ext cx="9124417" cy="4685720"/>
           </a:xfrm>
           <a:prstGeom prst="roundRect">
             <a:avLst>
@@ -11145,132 +11237,6 @@
           </a:sp3d>
         </p:spPr>
       </p:pic>
-    </p:spTree>
-    <p:extLst>
-      <p:ext uri="{BB962C8B-B14F-4D97-AF65-F5344CB8AC3E}">
-        <p14:creationId xmlns:p14="http://schemas.microsoft.com/office/powerpoint/2010/main" val="1974539145"/>
-      </p:ext>
-    </p:extLst>
-  </p:cSld>
-  <p:clrMapOvr>
-    <a:masterClrMapping/>
-  </p:clrMapOvr>
-  <p:timing>
-    <p:tnLst>
-      <p:par>
-        <p:cTn id="1" dur="indefinite" restart="never" nodeType="tmRoot"/>
-      </p:par>
-    </p:tnLst>
-  </p:timing>
-</p:sld>
-</file>
-
-<file path=ppt/slides/slide19.xml><?xml version="1.0" encoding="utf-8"?>
-<p:sld xmlns:a="http://schemas.openxmlformats.org/drawingml/2006/main" xmlns:r="http://schemas.openxmlformats.org/officeDocument/2006/relationships" xmlns:p="http://schemas.openxmlformats.org/presentationml/2006/main">
-  <p:cSld>
-    <p:spTree>
-      <p:nvGrpSpPr>
-        <p:cNvPr id="1" name=""/>
-        <p:cNvGrpSpPr/>
-        <p:nvPr/>
-      </p:nvGrpSpPr>
-      <p:grpSpPr>
-        <a:xfrm>
-          <a:off x="0" y="0"/>
-          <a:ext cx="0" cy="0"/>
-          <a:chOff x="0" y="0"/>
-          <a:chExt cx="0" cy="0"/>
-        </a:xfrm>
-      </p:grpSpPr>
-      <p:sp>
-        <p:nvSpPr>
-          <p:cNvPr id="2" name="Title 1"/>
-          <p:cNvSpPr>
-            <a:spLocks noGrp="1"/>
-          </p:cNvSpPr>
-          <p:nvPr>
-            <p:ph type="title"/>
-          </p:nvPr>
-        </p:nvSpPr>
-        <p:spPr>
-          <a:xfrm>
-            <a:off x="2592925" y="624110"/>
-            <a:ext cx="8911687" cy="780484"/>
-          </a:xfrm>
-        </p:spPr>
-        <p:txBody>
-          <a:bodyPr/>
-          <a:lstStyle/>
-          <a:p>
-            <a:pPr algn="ctr"/>
-            <a:r>
-              <a:rPr lang="en-US" dirty="0" smtClean="0"/>
-              <a:t>ER </a:t>
-            </a:r>
-            <a:r>
-              <a:rPr lang="en-US" dirty="0" smtClean="0">
-                <a:latin typeface="Algerian" panose="04020705040A02060702" pitchFamily="82" charset="0"/>
-              </a:rPr>
-              <a:t>DIAGRAM</a:t>
-            </a:r>
-            <a:endParaRPr lang="en-IN" dirty="0">
-              <a:latin typeface="Algerian" panose="04020705040A02060702" pitchFamily="82" charset="0"/>
-            </a:endParaRPr>
-          </a:p>
-        </p:txBody>
-      </p:sp>
-      <p:pic>
-        <p:nvPicPr>
-          <p:cNvPr id="4" name="Content Placeholder 3"/>
-          <p:cNvPicPr>
-            <a:picLocks noGrp="1" noChangeAspect="1"/>
-          </p:cNvPicPr>
-          <p:nvPr>
-            <p:ph idx="1"/>
-          </p:nvPr>
-        </p:nvPicPr>
-        <p:blipFill>
-          <a:blip r:embed="rId2" cstate="print"/>
-          <a:stretch>
-            <a:fillRect/>
-          </a:stretch>
-        </p:blipFill>
-        <p:spPr>
-          <a:xfrm>
-            <a:off x="2451698" y="1404594"/>
-            <a:ext cx="9124417" cy="4685720"/>
-          </a:xfrm>
-          <a:prstGeom prst="roundRect">
-            <a:avLst>
-              <a:gd name="adj" fmla="val 4167"/>
-            </a:avLst>
-          </a:prstGeom>
-          <a:solidFill>
-            <a:srgbClr val="FFFFFF"/>
-          </a:solidFill>
-          <a:ln w="76200" cap="sq">
-            <a:solidFill>
-              <a:srgbClr val="292929"/>
-            </a:solidFill>
-            <a:miter lim="800000"/>
-          </a:ln>
-          <a:effectLst>
-            <a:reflection blurRad="12700" stA="28000" endPos="28000" dist="5000" dir="5400000" sy="-100000" algn="bl" rotWithShape="0"/>
-          </a:effectLst>
-          <a:scene3d>
-            <a:camera prst="orthographicFront"/>
-            <a:lightRig rig="threePt" dir="t">
-              <a:rot lat="0" lon="0" rev="2700000"/>
-            </a:lightRig>
-          </a:scene3d>
-          <a:sp3d>
-            <a:bevelT h="38100"/>
-            <a:contourClr>
-              <a:srgbClr val="C0C0C0"/>
-            </a:contourClr>
-          </a:sp3d>
-        </p:spPr>
-      </p:pic>
       <p:sp>
         <p:nvSpPr>
           <p:cNvPr id="5" name="TextBox 4"/>
@@ -11309,7 +11275,7 @@
     </p:spTree>
     <p:extLst>
       <p:ext uri="{BB962C8B-B14F-4D97-AF65-F5344CB8AC3E}">
-        <p14:creationId xmlns:p14="http://schemas.microsoft.com/office/powerpoint/2010/main" val="1717095262"/>
+        <p14:creationId xmlns:p14="http://schemas.microsoft.com/office/powerpoint/2010/main" xmlns="" val="1717095262"/>
       </p:ext>
     </p:extLst>
   </p:cSld>
@@ -11529,7 +11495,7 @@
     </p:spTree>
     <p:extLst>
       <p:ext uri="{BB962C8B-B14F-4D97-AF65-F5344CB8AC3E}">
-        <p14:creationId xmlns:p14="http://schemas.microsoft.com/office/powerpoint/2010/main" val="2052618121"/>
+        <p14:creationId xmlns:p14="http://schemas.microsoft.com/office/powerpoint/2010/main" xmlns="" val="2052618121"/>
       </p:ext>
     </p:extLst>
   </p:cSld>
@@ -11608,7 +11574,7 @@
         </p:nvSpPr>
         <p:spPr>
           <a:xfrm>
-            <a:off x="3525624" y="6366120"/>
+            <a:off x="3978111" y="6384973"/>
             <a:ext cx="6344240" cy="369332"/>
           </a:xfrm>
           <a:prstGeom prst="rect">
@@ -11650,44 +11616,40 @@
         </p:blipFill>
         <p:spPr bwMode="auto">
           <a:xfrm>
-            <a:off x="2007909" y="1381351"/>
-            <a:ext cx="9605914" cy="4731479"/>
-          </a:xfrm>
-          <a:prstGeom prst="roundRect">
-            <a:avLst>
-              <a:gd name="adj" fmla="val 4167"/>
-            </a:avLst>
+            <a:off x="2761488" y="1381351"/>
+            <a:ext cx="7936992" cy="4731479"/>
+          </a:xfrm>
+          <a:prstGeom prst="rect">
+            <a:avLst/>
           </a:prstGeom>
-          <a:solidFill>
-            <a:srgbClr val="FFFFFF"/>
-          </a:solidFill>
-          <a:ln w="76200" cap="sq">
-            <a:solidFill>
-              <a:srgbClr val="292929"/>
-            </a:solidFill>
-            <a:miter lim="800000"/>
+          <a:noFill/>
+          <a:ln>
+            <a:noFill/>
           </a:ln>
           <a:effectLst>
-            <a:reflection blurRad="12700" stA="28000" endPos="28000" dist="5000" dir="5400000" sy="-100000" algn="bl" rotWithShape="0"/>
+            <a:outerShdw blurRad="44450" dist="27940" dir="5400000" algn="ctr">
+              <a:srgbClr val="000000">
+                <a:alpha val="32000"/>
+              </a:srgbClr>
+            </a:outerShdw>
           </a:effectLst>
           <a:scene3d>
-            <a:camera prst="orthographicFront"/>
-            <a:lightRig rig="threePt" dir="t">
-              <a:rot lat="0" lon="0" rev="2700000"/>
+            <a:camera prst="orthographicFront">
+              <a:rot lat="0" lon="0" rev="0"/>
+            </a:camera>
+            <a:lightRig rig="balanced" dir="t">
+              <a:rot lat="0" lon="0" rev="8700000"/>
             </a:lightRig>
           </a:scene3d>
           <a:sp3d>
-            <a:bevelT h="38100"/>
-            <a:contourClr>
-              <a:srgbClr val="C0C0C0"/>
-            </a:contourClr>
+            <a:bevelT w="190500" h="38100"/>
           </a:sp3d>
         </p:spPr>
       </p:pic>
     </p:spTree>
     <p:extLst>
       <p:ext uri="{BB962C8B-B14F-4D97-AF65-F5344CB8AC3E}">
-        <p14:creationId xmlns:p14="http://schemas.microsoft.com/office/powerpoint/2010/main" val="2992944003"/>
+        <p14:creationId xmlns:p14="http://schemas.microsoft.com/office/powerpoint/2010/main" xmlns="" val="2992944003"/>
       </p:ext>
     </p:extLst>
   </p:cSld>
@@ -11775,35 +11737,10 @@
             <a:off x="1632903" y="1446848"/>
             <a:ext cx="9407274" cy="4588192"/>
           </a:xfrm>
-          <a:prstGeom prst="roundRect">
-            <a:avLst>
-              <a:gd name="adj" fmla="val 4167"/>
-            </a:avLst>
+          <a:prstGeom prst="rect">
+            <a:avLst/>
           </a:prstGeom>
-          <a:solidFill>
-            <a:srgbClr val="FFFFFF"/>
-          </a:solidFill>
-          <a:ln w="76200" cap="sq">
-            <a:solidFill>
-              <a:srgbClr val="292929"/>
-            </a:solidFill>
-            <a:miter lim="800000"/>
-          </a:ln>
-          <a:effectLst>
-            <a:reflection blurRad="12700" stA="28000" endPos="28000" dist="5000" dir="5400000" sy="-100000" algn="bl" rotWithShape="0"/>
-          </a:effectLst>
-          <a:scene3d>
-            <a:camera prst="orthographicFront"/>
-            <a:lightRig rig="threePt" dir="t">
-              <a:rot lat="0" lon="0" rev="2700000"/>
-            </a:lightRig>
-          </a:scene3d>
-          <a:sp3d>
-            <a:bevelT h="38100"/>
-            <a:contourClr>
-              <a:srgbClr val="C0C0C0"/>
-            </a:contourClr>
-          </a:sp3d>
+          <a:noFill/>
         </p:spPr>
       </p:pic>
       <p:sp>
@@ -11839,20 +11776,13 @@
     </p:spTree>
     <p:extLst>
       <p:ext uri="{BB962C8B-B14F-4D97-AF65-F5344CB8AC3E}">
-        <p14:creationId xmlns:p14="http://schemas.microsoft.com/office/powerpoint/2010/main" val="3059376019"/>
+        <p14:creationId xmlns:p14="http://schemas.microsoft.com/office/powerpoint/2010/main" xmlns="" val="3059376019"/>
       </p:ext>
     </p:extLst>
   </p:cSld>
   <p:clrMapOvr>
     <a:masterClrMapping/>
   </p:clrMapOvr>
-  <p:timing>
-    <p:tnLst>
-      <p:par>
-        <p:cTn id="1" dur="indefinite" restart="never" nodeType="tmRoot"/>
-      </p:par>
-    </p:tnLst>
-  </p:timing>
 </p:sld>
 </file>
 
@@ -11927,35 +11857,10 @@
             <a:off x="2156778" y="1306514"/>
             <a:ext cx="8399462" cy="5069466"/>
           </a:xfrm>
-          <a:prstGeom prst="roundRect">
-            <a:avLst>
-              <a:gd name="adj" fmla="val 4167"/>
-            </a:avLst>
+          <a:prstGeom prst="rect">
+            <a:avLst/>
           </a:prstGeom>
-          <a:solidFill>
-            <a:srgbClr val="FFFFFF"/>
-          </a:solidFill>
-          <a:ln w="76200" cap="sq">
-            <a:solidFill>
-              <a:srgbClr val="292929"/>
-            </a:solidFill>
-            <a:miter lim="800000"/>
-          </a:ln>
-          <a:effectLst>
-            <a:reflection blurRad="12700" stA="28000" endPos="28000" dist="5000" dir="5400000" sy="-100000" algn="bl" rotWithShape="0"/>
-          </a:effectLst>
-          <a:scene3d>
-            <a:camera prst="orthographicFront"/>
-            <a:lightRig rig="threePt" dir="t">
-              <a:rot lat="0" lon="0" rev="2700000"/>
-            </a:lightRig>
-          </a:scene3d>
-          <a:sp3d>
-            <a:bevelT h="38100"/>
-            <a:contourClr>
-              <a:srgbClr val="C0C0C0"/>
-            </a:contourClr>
-          </a:sp3d>
+          <a:noFill/>
         </p:spPr>
       </p:pic>
       <p:sp>
@@ -11981,7 +11886,15 @@
           <a:p>
             <a:r>
               <a:rPr lang="en-IN" b="1" dirty="0" smtClean="0"/>
-              <a:t>Level 1 DFD</a:t>
+              <a:t>Level </a:t>
+            </a:r>
+            <a:r>
+              <a:rPr lang="en-IN" b="1" dirty="0" smtClean="0"/>
+              <a:t>1 </a:t>
+            </a:r>
+            <a:r>
+              <a:rPr lang="en-IN" b="1" dirty="0" smtClean="0"/>
+              <a:t>DFD</a:t>
             </a:r>
             <a:endParaRPr lang="en-US" b="1" dirty="0"/>
           </a:p>
@@ -11990,20 +11903,13 @@
     </p:spTree>
     <p:extLst>
       <p:ext uri="{BB962C8B-B14F-4D97-AF65-F5344CB8AC3E}">
-        <p14:creationId xmlns:p14="http://schemas.microsoft.com/office/powerpoint/2010/main" val="3059376019"/>
+        <p14:creationId xmlns:p14="http://schemas.microsoft.com/office/powerpoint/2010/main" xmlns="" val="3059376019"/>
       </p:ext>
     </p:extLst>
   </p:cSld>
   <p:clrMapOvr>
     <a:masterClrMapping/>
   </p:clrMapOvr>
-  <p:timing>
-    <p:tnLst>
-      <p:par>
-        <p:cTn id="1" dur="indefinite" restart="never" nodeType="tmRoot"/>
-      </p:par>
-    </p:tnLst>
-  </p:timing>
 </p:sld>
 </file>
 
@@ -12075,38 +11981,13 @@
         </p:blipFill>
         <p:spPr bwMode="auto">
           <a:xfrm>
-            <a:off x="1946120" y="1301952"/>
-            <a:ext cx="9083240" cy="5085860"/>
-          </a:xfrm>
-          <a:prstGeom prst="roundRect">
-            <a:avLst>
-              <a:gd name="adj" fmla="val 4167"/>
-            </a:avLst>
+            <a:off x="2464595" y="1301952"/>
+            <a:ext cx="7238205" cy="5085860"/>
+          </a:xfrm>
+          <a:prstGeom prst="rect">
+            <a:avLst/>
           </a:prstGeom>
-          <a:solidFill>
-            <a:srgbClr val="FFFFFF"/>
-          </a:solidFill>
-          <a:ln w="76200" cap="sq">
-            <a:solidFill>
-              <a:srgbClr val="292929"/>
-            </a:solidFill>
-            <a:miter lim="800000"/>
-          </a:ln>
-          <a:effectLst>
-            <a:reflection blurRad="12700" stA="28000" endPos="28000" dist="5000" dir="5400000" sy="-100000" algn="bl" rotWithShape="0"/>
-          </a:effectLst>
-          <a:scene3d>
-            <a:camera prst="orthographicFront"/>
-            <a:lightRig rig="threePt" dir="t">
-              <a:rot lat="0" lon="0" rev="2700000"/>
-            </a:lightRig>
-          </a:scene3d>
-          <a:sp3d>
-            <a:bevelT h="38100"/>
-            <a:contourClr>
-              <a:srgbClr val="C0C0C0"/>
-            </a:contourClr>
-          </a:sp3d>
+          <a:noFill/>
         </p:spPr>
       </p:pic>
       <p:sp>
@@ -12117,7 +11998,7 @@
         </p:nvSpPr>
         <p:spPr>
           <a:xfrm>
-            <a:off x="5340103" y="6488668"/>
+            <a:off x="5183593" y="6488668"/>
             <a:ext cx="1459054" cy="369332"/>
           </a:xfrm>
           <a:prstGeom prst="rect">
@@ -12125,14 +12006,22 @@
           </a:prstGeom>
         </p:spPr>
         <p:txBody>
-          <a:bodyPr wrap="square">
+          <a:bodyPr wrap="none">
             <a:spAutoFit/>
           </a:bodyPr>
           <a:lstStyle/>
           <a:p>
             <a:r>
               <a:rPr lang="en-IN" b="1" dirty="0" smtClean="0"/>
-              <a:t>Level 2 DFD</a:t>
+              <a:t>Level </a:t>
+            </a:r>
+            <a:r>
+              <a:rPr lang="en-IN" b="1" dirty="0" smtClean="0"/>
+              <a:t>2 </a:t>
+            </a:r>
+            <a:r>
+              <a:rPr lang="en-IN" b="1" dirty="0" smtClean="0"/>
+              <a:t>DFD</a:t>
             </a:r>
             <a:endParaRPr lang="en-US" b="1" dirty="0"/>
           </a:p>
@@ -12141,7 +12030,7 @@
     </p:spTree>
     <p:extLst>
       <p:ext uri="{BB962C8B-B14F-4D97-AF65-F5344CB8AC3E}">
-        <p14:creationId xmlns:p14="http://schemas.microsoft.com/office/powerpoint/2010/main" val="3059376019"/>
+        <p14:creationId xmlns:p14="http://schemas.microsoft.com/office/powerpoint/2010/main" xmlns="" val="3059376019"/>
       </p:ext>
     </p:extLst>
   </p:cSld>
@@ -12324,7 +12213,7 @@
     </p:spTree>
     <p:extLst>
       <p:ext uri="{BB962C8B-B14F-4D97-AF65-F5344CB8AC3E}">
-        <p14:creationId xmlns:p14="http://schemas.microsoft.com/office/powerpoint/2010/main" val="3968908613"/>
+        <p14:creationId xmlns:p14="http://schemas.microsoft.com/office/powerpoint/2010/main" xmlns="" val="3968908613"/>
       </p:ext>
     </p:extLst>
   </p:cSld>
@@ -12561,7 +12450,7 @@
     </p:spTree>
     <p:extLst>
       <p:ext uri="{BB962C8B-B14F-4D97-AF65-F5344CB8AC3E}">
-        <p14:creationId xmlns:p14="http://schemas.microsoft.com/office/powerpoint/2010/main" val="1379778435"/>
+        <p14:creationId xmlns:p14="http://schemas.microsoft.com/office/powerpoint/2010/main" xmlns="" val="1379778435"/>
       </p:ext>
     </p:extLst>
   </p:cSld>
@@ -12666,7 +12555,7 @@
     </p:spTree>
     <p:extLst>
       <p:ext uri="{BB962C8B-B14F-4D97-AF65-F5344CB8AC3E}">
-        <p14:creationId xmlns:p14="http://schemas.microsoft.com/office/powerpoint/2010/main" val="3097096989"/>
+        <p14:creationId xmlns:p14="http://schemas.microsoft.com/office/powerpoint/2010/main" xmlns="" val="3097096989"/>
       </p:ext>
     </p:extLst>
   </p:cSld>
@@ -12769,7 +12658,7 @@
     </p:spTree>
     <p:extLst>
       <p:ext uri="{BB962C8B-B14F-4D97-AF65-F5344CB8AC3E}">
-        <p14:creationId xmlns:p14="http://schemas.microsoft.com/office/powerpoint/2010/main" val="3184472628"/>
+        <p14:creationId xmlns:p14="http://schemas.microsoft.com/office/powerpoint/2010/main" xmlns="" val="3184472628"/>
       </p:ext>
     </p:extLst>
   </p:cSld>
@@ -12994,7 +12883,7 @@
     </p:spTree>
     <p:extLst>
       <p:ext uri="{BB962C8B-B14F-4D97-AF65-F5344CB8AC3E}">
-        <p14:creationId xmlns:p14="http://schemas.microsoft.com/office/powerpoint/2010/main" val="1027228061"/>
+        <p14:creationId xmlns:p14="http://schemas.microsoft.com/office/powerpoint/2010/main" xmlns="" val="1027228061"/>
       </p:ext>
     </p:extLst>
   </p:cSld>
@@ -13149,7 +13038,7 @@
     </p:spTree>
     <p:extLst>
       <p:ext uri="{BB962C8B-B14F-4D97-AF65-F5344CB8AC3E}">
-        <p14:creationId xmlns:p14="http://schemas.microsoft.com/office/powerpoint/2010/main" val="2020973106"/>
+        <p14:creationId xmlns:p14="http://schemas.microsoft.com/office/powerpoint/2010/main" xmlns="" val="2020973106"/>
       </p:ext>
     </p:extLst>
   </p:cSld>
@@ -13230,7 +13119,7 @@
           <a:blip r:embed="rId2" cstate="print">
             <a:extLst>
               <a:ext uri="{28A0092B-C50C-407E-A947-70E740481C1C}">
-                <a14:useLocalDpi xmlns:a14="http://schemas.microsoft.com/office/drawing/2010/main" val="0"/>
+                <a14:useLocalDpi xmlns:a14="http://schemas.microsoft.com/office/drawing/2010/main" xmlns="" val="0"/>
               </a:ext>
             </a:extLst>
           </a:blip>
@@ -13277,7 +13166,7 @@
     </p:spTree>
     <p:extLst>
       <p:ext uri="{BB962C8B-B14F-4D97-AF65-F5344CB8AC3E}">
-        <p14:creationId xmlns:p14="http://schemas.microsoft.com/office/powerpoint/2010/main" val="551090893"/>
+        <p14:creationId xmlns:p14="http://schemas.microsoft.com/office/powerpoint/2010/main" xmlns="" val="551090893"/>
       </p:ext>
     </p:extLst>
   </p:cSld>
@@ -13729,13 +13618,6 @@
   <p:clrMapOvr>
     <a:masterClrMapping/>
   </p:clrMapOvr>
-  <p:timing>
-    <p:tnLst>
-      <p:par>
-        <p:cTn id="1" dur="indefinite" restart="never" nodeType="tmRoot"/>
-      </p:par>
-    </p:tnLst>
-  </p:timing>
 </p:sld>
 </file>
 
@@ -14278,7 +14160,7 @@
     </p:spTree>
     <p:extLst>
       <p:ext uri="{BB962C8B-B14F-4D97-AF65-F5344CB8AC3E}">
-        <p14:creationId xmlns:p14="http://schemas.microsoft.com/office/powerpoint/2010/main" val="1361238431"/>
+        <p14:creationId xmlns:p14="http://schemas.microsoft.com/office/powerpoint/2010/main" xmlns="" val="1361238431"/>
       </p:ext>
     </p:extLst>
   </p:cSld>
@@ -15380,7 +15262,7 @@
     </p:spTree>
     <p:extLst>
       <p:ext uri="{BB962C8B-B14F-4D97-AF65-F5344CB8AC3E}">
-        <p14:creationId xmlns:p14="http://schemas.microsoft.com/office/powerpoint/2010/main" val="2347577460"/>
+        <p14:creationId xmlns:p14="http://schemas.microsoft.com/office/powerpoint/2010/main" xmlns="" val="2347577460"/>
       </p:ext>
     </p:extLst>
   </p:cSld>
@@ -15463,7 +15345,7 @@
     </p:spTree>
     <p:extLst>
       <p:ext uri="{BB962C8B-B14F-4D97-AF65-F5344CB8AC3E}">
-        <p14:creationId xmlns:p14="http://schemas.microsoft.com/office/powerpoint/2010/main" val="1912276581"/>
+        <p14:creationId xmlns:p14="http://schemas.microsoft.com/office/powerpoint/2010/main" xmlns="" val="1912276581"/>
       </p:ext>
     </p:extLst>
   </p:cSld>
@@ -15679,7 +15561,7 @@
     </p:spTree>
     <p:extLst>
       <p:ext uri="{BB962C8B-B14F-4D97-AF65-F5344CB8AC3E}">
-        <p14:creationId xmlns:p14="http://schemas.microsoft.com/office/powerpoint/2010/main" val="2625934534"/>
+        <p14:creationId xmlns:p14="http://schemas.microsoft.com/office/powerpoint/2010/main" xmlns="" val="2625934534"/>
       </p:ext>
     </p:extLst>
   </p:cSld>
@@ -15842,7 +15724,7 @@
     </p:spTree>
     <p:extLst>
       <p:ext uri="{BB962C8B-B14F-4D97-AF65-F5344CB8AC3E}">
-        <p14:creationId xmlns:p14="http://schemas.microsoft.com/office/powerpoint/2010/main" val="1400058215"/>
+        <p14:creationId xmlns:p14="http://schemas.microsoft.com/office/powerpoint/2010/main" xmlns="" val="1400058215"/>
       </p:ext>
     </p:extLst>
   </p:cSld>
@@ -16068,7 +15950,7 @@
     </p:spTree>
     <p:extLst>
       <p:ext uri="{BB962C8B-B14F-4D97-AF65-F5344CB8AC3E}">
-        <p14:creationId xmlns:p14="http://schemas.microsoft.com/office/powerpoint/2010/main" val="1165276255"/>
+        <p14:creationId xmlns:p14="http://schemas.microsoft.com/office/powerpoint/2010/main" xmlns="" val="1165276255"/>
       </p:ext>
     </p:extLst>
   </p:cSld>
@@ -16217,7 +16099,7 @@
     </p:spTree>
     <p:extLst>
       <p:ext uri="{BB962C8B-B14F-4D97-AF65-F5344CB8AC3E}">
-        <p14:creationId xmlns:p14="http://schemas.microsoft.com/office/powerpoint/2010/main" val="2972335740"/>
+        <p14:creationId xmlns:p14="http://schemas.microsoft.com/office/powerpoint/2010/main" xmlns="" val="2972335740"/>
       </p:ext>
     </p:extLst>
   </p:cSld>
@@ -16429,7 +16311,7 @@
           <a:blip r:embed="rId2" cstate="print">
             <a:extLst>
               <a:ext uri="{28A0092B-C50C-407E-A947-70E740481C1C}">
-                <a14:useLocalDpi xmlns:a14="http://schemas.microsoft.com/office/drawing/2010/main" val="0"/>
+                <a14:useLocalDpi xmlns:a14="http://schemas.microsoft.com/office/drawing/2010/main" xmlns="" val="0"/>
               </a:ext>
             </a:extLst>
           </a:blip>
@@ -16485,7 +16367,7 @@
           <a:blip r:embed="rId3" cstate="print">
             <a:extLst>
               <a:ext uri="{28A0092B-C50C-407E-A947-70E740481C1C}">
-                <a14:useLocalDpi xmlns:a14="http://schemas.microsoft.com/office/drawing/2010/main" val="0"/>
+                <a14:useLocalDpi xmlns:a14="http://schemas.microsoft.com/office/drawing/2010/main" xmlns="" val="0"/>
               </a:ext>
             </a:extLst>
           </a:blip>
@@ -16670,7 +16552,7 @@
           <a:blip r:embed="rId2" cstate="print">
             <a:extLst>
               <a:ext uri="{28A0092B-C50C-407E-A947-70E740481C1C}">
-                <a14:useLocalDpi xmlns:a14="http://schemas.microsoft.com/office/drawing/2010/main" val="0"/>
+                <a14:useLocalDpi xmlns:a14="http://schemas.microsoft.com/office/drawing/2010/main" xmlns="" val="0"/>
               </a:ext>
             </a:extLst>
           </a:blip>
@@ -16717,7 +16599,7 @@
     </p:spTree>
     <p:extLst>
       <p:ext uri="{BB962C8B-B14F-4D97-AF65-F5344CB8AC3E}">
-        <p14:creationId xmlns:p14="http://schemas.microsoft.com/office/powerpoint/2010/main" val="2841187319"/>
+        <p14:creationId xmlns:p14="http://schemas.microsoft.com/office/powerpoint/2010/main" xmlns="" val="2841187319"/>
       </p:ext>
     </p:extLst>
   </p:cSld>
@@ -16971,7 +16853,7 @@
   <a:extraClrSchemeLst/>
   <a:extLst>
     <a:ext uri="{05A4C25C-085E-4340-85A3-A5531E510DB2}">
-      <thm15:themeFamily xmlns:thm15="http://schemas.microsoft.com/office/thememl/2012/main" name="Wisp" id="{7CB32D59-10C0-40DD-B7BD-2E94284A981C}" vid="{F20B7C8E-B819-43F3-AAF9-EE50B1A83630}"/>
+      <thm15:themeFamily xmlns:thm15="http://schemas.microsoft.com/office/thememl/2012/main" xmlns="" name="Wisp" id="{7CB32D59-10C0-40DD-B7BD-2E94284A981C}" vid="{F20B7C8E-B819-43F3-AAF9-EE50B1A83630}"/>
     </a:ext>
   </a:extLst>
 </a:theme>
@@ -17232,7 +17114,7 @@
   <a:extraClrSchemeLst/>
   <a:extLst>
     <a:ext uri="{05A4C25C-085E-4340-85A3-A5531E510DB2}">
-      <thm15:themeFamily xmlns:thm15="http://schemas.microsoft.com/office/thememl/2012/main" name="Office Theme" id="{62F939B6-93AF-4DB8-9C6B-D6C7DFDC589F}" vid="{4A3C46E8-61CC-4603-A589-7422A47A8E4A}"/>
+      <thm15:themeFamily xmlns:thm15="http://schemas.microsoft.com/office/thememl/2012/main" xmlns="" name="Office Theme" id="{62F939B6-93AF-4DB8-9C6B-D6C7DFDC589F}" vid="{4A3C46E8-61CC-4603-A589-7422A47A8E4A}"/>
     </a:ext>
   </a:extLst>
 </a:theme>

</xml_diff>

<commit_message>
All Changes Are Finallised.
</commit_message>
<xml_diff>
--- a/Project letrature/IMAGE_STEGNOGRAPHY_USING_PYTHON.pptx
+++ b/Project letrature/IMAGE_STEGNOGRAPHY_USING_PYTHON.pptx
@@ -141,7 +141,7 @@
   </p:defaultTextStyle>
   <p:extLst>
     <p:ext uri="{521415D9-36F7-43E2-AB2F-B90AF26B5E84}">
-      <p14:sectionLst xmlns:p14="http://schemas.microsoft.com/office/powerpoint/2010/main" xmlns="">
+      <p14:sectionLst xmlns:p14="http://schemas.microsoft.com/office/powerpoint/2010/main">
         <p14:section name="Default Section" id="{1709AB17-A0DF-4151-9302-FDFCA00A6D75}">
           <p14:sldIdLst>
             <p14:sldId id="256"/>
@@ -165,6 +165,8 @@
             <p14:sldId id="264"/>
             <p14:sldId id="265"/>
             <p14:sldId id="288"/>
+            <p14:sldId id="289"/>
+            <p14:sldId id="290"/>
             <p14:sldId id="266"/>
             <p14:sldId id="267"/>
             <p14:sldId id="270"/>
@@ -180,7 +182,7 @@
       </p14:sectionLst>
     </p:ext>
     <p:ext uri="{EFAFB233-063F-42B5-8137-9DF3F51BA10A}">
-      <p15:sldGuideLst xmlns:p15="http://schemas.microsoft.com/office/powerpoint/2012/main" xmlns="">
+      <p15:sldGuideLst xmlns:p15="http://schemas.microsoft.com/office/powerpoint/2012/main">
         <p15:guide id="1" orient="horz" pos="2160">
           <p15:clr>
             <a:srgbClr val="A4A3A4"/>
@@ -202,7 +204,7 @@
   <p:cmAuthor id="1" name="Tarun Verma" initials="TV" lastIdx="2" clrIdx="0">
     <p:extLst>
       <p:ext uri="{19B8F6BF-5375-455C-9EA6-DF929625EA0E}">
-        <p15:presenceInfo xmlns:p15="http://schemas.microsoft.com/office/powerpoint/2012/main" xmlns="" userId="12328a8a1cac093b" providerId="Windows Live"/>
+        <p15:presenceInfo xmlns:p15="http://schemas.microsoft.com/office/powerpoint/2012/main" userId="12328a8a1cac093b" providerId="Windows Live"/>
       </p:ext>
     </p:extLst>
   </p:cmAuthor>
@@ -216,7 +218,7 @@
     <p:text/>
     <p:extLst>
       <p:ext uri="{C676402C-5697-4E1C-873F-D02D1690AC5C}">
-        <p15:threadingInfo xmlns:p15="http://schemas.microsoft.com/office/powerpoint/2012/main" xmlns="" timeZoneBias="-330"/>
+        <p15:threadingInfo xmlns:p15="http://schemas.microsoft.com/office/powerpoint/2012/main" timeZoneBias="-330"/>
       </p:ext>
     </p:extLst>
   </p:cm>
@@ -230,7 +232,7 @@
     <p:text/>
     <p:extLst>
       <p:ext uri="{C676402C-5697-4E1C-873F-D02D1690AC5C}">
-        <p15:threadingInfo xmlns:p15="http://schemas.microsoft.com/office/powerpoint/2012/main" xmlns="" timeZoneBias="-330"/>
+        <p15:threadingInfo xmlns:p15="http://schemas.microsoft.com/office/powerpoint/2012/main" timeZoneBias="-330"/>
       </p:ext>
     </p:extLst>
   </p:cm>
@@ -489,7 +491,7 @@
     </p:spTree>
     <p:extLst>
       <p:ext uri="{BB962C8B-B14F-4D97-AF65-F5344CB8AC3E}">
-        <p14:creationId xmlns:p14="http://schemas.microsoft.com/office/powerpoint/2010/main" xmlns="" val="2598052617"/>
+        <p14:creationId xmlns:p14="http://schemas.microsoft.com/office/powerpoint/2010/main" val="2598052617"/>
       </p:ext>
     </p:extLst>
   </p:cSld>
@@ -917,7 +919,7 @@
     </p:spTree>
     <p:extLst>
       <p:ext uri="{BB962C8B-B14F-4D97-AF65-F5344CB8AC3E}">
-        <p14:creationId xmlns:p14="http://schemas.microsoft.com/office/powerpoint/2010/main" xmlns="" val="2832675995"/>
+        <p14:creationId xmlns:p14="http://schemas.microsoft.com/office/powerpoint/2010/main" val="2832675995"/>
       </p:ext>
     </p:extLst>
   </p:cSld>
@@ -1257,7 +1259,7 @@
     </p:spTree>
     <p:extLst>
       <p:ext uri="{BB962C8B-B14F-4D97-AF65-F5344CB8AC3E}">
-        <p14:creationId xmlns:p14="http://schemas.microsoft.com/office/powerpoint/2010/main" xmlns="" val="1136343294"/>
+        <p14:creationId xmlns:p14="http://schemas.microsoft.com/office/powerpoint/2010/main" val="1136343294"/>
       </p:ext>
     </p:extLst>
   </p:cSld>
@@ -1736,7 +1738,7 @@
     </p:spTree>
     <p:extLst>
       <p:ext uri="{BB962C8B-B14F-4D97-AF65-F5344CB8AC3E}">
-        <p14:creationId xmlns:p14="http://schemas.microsoft.com/office/powerpoint/2010/main" xmlns="" val="1584917057"/>
+        <p14:creationId xmlns:p14="http://schemas.microsoft.com/office/powerpoint/2010/main" val="1584917057"/>
       </p:ext>
     </p:extLst>
   </p:cSld>
@@ -1998,7 +2000,7 @@
     </p:spTree>
     <p:extLst>
       <p:ext uri="{BB962C8B-B14F-4D97-AF65-F5344CB8AC3E}">
-        <p14:creationId xmlns:p14="http://schemas.microsoft.com/office/powerpoint/2010/main" xmlns="" val="1255812982"/>
+        <p14:creationId xmlns:p14="http://schemas.microsoft.com/office/powerpoint/2010/main" val="1255812982"/>
       </p:ext>
     </p:extLst>
   </p:cSld>
@@ -2396,7 +2398,7 @@
     </p:spTree>
     <p:extLst>
       <p:ext uri="{BB962C8B-B14F-4D97-AF65-F5344CB8AC3E}">
-        <p14:creationId xmlns:p14="http://schemas.microsoft.com/office/powerpoint/2010/main" xmlns="" val="3619512775"/>
+        <p14:creationId xmlns:p14="http://schemas.microsoft.com/office/powerpoint/2010/main" val="3619512775"/>
       </p:ext>
     </p:extLst>
   </p:cSld>
@@ -2718,7 +2720,7 @@
     </p:spTree>
     <p:extLst>
       <p:ext uri="{BB962C8B-B14F-4D97-AF65-F5344CB8AC3E}">
-        <p14:creationId xmlns:p14="http://schemas.microsoft.com/office/powerpoint/2010/main" xmlns="" val="3559520111"/>
+        <p14:creationId xmlns:p14="http://schemas.microsoft.com/office/powerpoint/2010/main" val="3559520111"/>
       </p:ext>
     </p:extLst>
   </p:cSld>
@@ -2972,7 +2974,7 @@
     </p:spTree>
     <p:extLst>
       <p:ext uri="{BB962C8B-B14F-4D97-AF65-F5344CB8AC3E}">
-        <p14:creationId xmlns:p14="http://schemas.microsoft.com/office/powerpoint/2010/main" xmlns="" val="1506902780"/>
+        <p14:creationId xmlns:p14="http://schemas.microsoft.com/office/powerpoint/2010/main" val="1506902780"/>
       </p:ext>
     </p:extLst>
   </p:cSld>
@@ -3236,7 +3238,7 @@
     </p:spTree>
     <p:extLst>
       <p:ext uri="{BB962C8B-B14F-4D97-AF65-F5344CB8AC3E}">
-        <p14:creationId xmlns:p14="http://schemas.microsoft.com/office/powerpoint/2010/main" xmlns="" val="369909214"/>
+        <p14:creationId xmlns:p14="http://schemas.microsoft.com/office/powerpoint/2010/main" val="369909214"/>
       </p:ext>
     </p:extLst>
   </p:cSld>
@@ -3500,7 +3502,7 @@
     </p:spTree>
     <p:extLst>
       <p:ext uri="{BB962C8B-B14F-4D97-AF65-F5344CB8AC3E}">
-        <p14:creationId xmlns:p14="http://schemas.microsoft.com/office/powerpoint/2010/main" xmlns="" val="3017200259"/>
+        <p14:creationId xmlns:p14="http://schemas.microsoft.com/office/powerpoint/2010/main" val="3017200259"/>
       </p:ext>
     </p:extLst>
   </p:cSld>
@@ -3836,7 +3838,7 @@
     </p:spTree>
     <p:extLst>
       <p:ext uri="{BB962C8B-B14F-4D97-AF65-F5344CB8AC3E}">
-        <p14:creationId xmlns:p14="http://schemas.microsoft.com/office/powerpoint/2010/main" xmlns="" val="2732314535"/>
+        <p14:creationId xmlns:p14="http://schemas.microsoft.com/office/powerpoint/2010/main" val="2732314535"/>
       </p:ext>
     </p:extLst>
   </p:cSld>
@@ -4161,7 +4163,7 @@
     </p:spTree>
     <p:extLst>
       <p:ext uri="{BB962C8B-B14F-4D97-AF65-F5344CB8AC3E}">
-        <p14:creationId xmlns:p14="http://schemas.microsoft.com/office/powerpoint/2010/main" xmlns="" val="2944525080"/>
+        <p14:creationId xmlns:p14="http://schemas.microsoft.com/office/powerpoint/2010/main" val="2944525080"/>
       </p:ext>
     </p:extLst>
   </p:cSld>
@@ -4620,7 +4622,7 @@
     </p:spTree>
     <p:extLst>
       <p:ext uri="{BB962C8B-B14F-4D97-AF65-F5344CB8AC3E}">
-        <p14:creationId xmlns:p14="http://schemas.microsoft.com/office/powerpoint/2010/main" xmlns="" val="2552920587"/>
+        <p14:creationId xmlns:p14="http://schemas.microsoft.com/office/powerpoint/2010/main" val="2552920587"/>
       </p:ext>
     </p:extLst>
   </p:cSld>
@@ -4822,7 +4824,7 @@
     </p:spTree>
     <p:extLst>
       <p:ext uri="{BB962C8B-B14F-4D97-AF65-F5344CB8AC3E}">
-        <p14:creationId xmlns:p14="http://schemas.microsoft.com/office/powerpoint/2010/main" xmlns="" val="746962661"/>
+        <p14:creationId xmlns:p14="http://schemas.microsoft.com/office/powerpoint/2010/main" val="746962661"/>
       </p:ext>
     </p:extLst>
   </p:cSld>
@@ -5001,7 +5003,7 @@
     </p:spTree>
     <p:extLst>
       <p:ext uri="{BB962C8B-B14F-4D97-AF65-F5344CB8AC3E}">
-        <p14:creationId xmlns:p14="http://schemas.microsoft.com/office/powerpoint/2010/main" xmlns="" val="1124397907"/>
+        <p14:creationId xmlns:p14="http://schemas.microsoft.com/office/powerpoint/2010/main" val="1124397907"/>
       </p:ext>
     </p:extLst>
   </p:cSld>
@@ -5336,7 +5338,7 @@
     </p:spTree>
     <p:extLst>
       <p:ext uri="{BB962C8B-B14F-4D97-AF65-F5344CB8AC3E}">
-        <p14:creationId xmlns:p14="http://schemas.microsoft.com/office/powerpoint/2010/main" xmlns="" val="767815197"/>
+        <p14:creationId xmlns:p14="http://schemas.microsoft.com/office/powerpoint/2010/main" val="767815197"/>
       </p:ext>
     </p:extLst>
   </p:cSld>
@@ -5688,7 +5690,7 @@
     </p:spTree>
     <p:extLst>
       <p:ext uri="{BB962C8B-B14F-4D97-AF65-F5344CB8AC3E}">
-        <p14:creationId xmlns:p14="http://schemas.microsoft.com/office/powerpoint/2010/main" xmlns="" val="2825805858"/>
+        <p14:creationId xmlns:p14="http://schemas.microsoft.com/office/powerpoint/2010/main" val="2825805858"/>
       </p:ext>
     </p:extLst>
   </p:cSld>
@@ -7691,7 +7693,7 @@
     </p:spTree>
     <p:extLst>
       <p:ext uri="{BB962C8B-B14F-4D97-AF65-F5344CB8AC3E}">
-        <p14:creationId xmlns:p14="http://schemas.microsoft.com/office/powerpoint/2010/main" xmlns="" val="3788863745"/>
+        <p14:creationId xmlns:p14="http://schemas.microsoft.com/office/powerpoint/2010/main" val="3788863745"/>
       </p:ext>
     </p:extLst>
   </p:cSld>
@@ -8266,7 +8268,7 @@
     </p:spTree>
     <p:extLst>
       <p:ext uri="{BB962C8B-B14F-4D97-AF65-F5344CB8AC3E}">
-        <p14:creationId xmlns:p14="http://schemas.microsoft.com/office/powerpoint/2010/main" xmlns="" val="2724423283"/>
+        <p14:creationId xmlns:p14="http://schemas.microsoft.com/office/powerpoint/2010/main" val="2724423283"/>
       </p:ext>
     </p:extLst>
   </p:cSld>
@@ -8350,7 +8352,7 @@
           <a:blip r:embed="rId2" cstate="print">
             <a:extLst>
               <a:ext uri="{28A0092B-C50C-407E-A947-70E740481C1C}">
-                <a14:useLocalDpi xmlns:a14="http://schemas.microsoft.com/office/drawing/2010/main" xmlns="" val="0"/>
+                <a14:useLocalDpi xmlns:a14="http://schemas.microsoft.com/office/drawing/2010/main" val="0"/>
               </a:ext>
             </a:extLst>
           </a:blip>
@@ -8397,7 +8399,7 @@
     </p:spTree>
     <p:extLst>
       <p:ext uri="{BB962C8B-B14F-4D97-AF65-F5344CB8AC3E}">
-        <p14:creationId xmlns:p14="http://schemas.microsoft.com/office/powerpoint/2010/main" xmlns="" val="110383111"/>
+        <p14:creationId xmlns:p14="http://schemas.microsoft.com/office/powerpoint/2010/main" val="110383111"/>
       </p:ext>
     </p:extLst>
   </p:cSld>
@@ -11109,102 +11111,8 @@
         </p:blipFill>
         <p:spPr bwMode="auto">
           <a:xfrm>
-            <a:off x="2255520" y="987367"/>
-            <a:ext cx="8554720" cy="5728393"/>
-          </a:xfrm>
-          <a:prstGeom prst="rect">
-            <a:avLst/>
-          </a:prstGeom>
-          <a:noFill/>
-        </p:spPr>
-      </p:pic>
-    </p:spTree>
-    <p:extLst>
-      <p:ext uri="{BB962C8B-B14F-4D97-AF65-F5344CB8AC3E}">
-        <p14:creationId xmlns:p14="http://schemas.microsoft.com/office/powerpoint/2010/main" xmlns="" val="1974539145"/>
-      </p:ext>
-    </p:extLst>
-  </p:cSld>
-  <p:clrMapOvr>
-    <a:masterClrMapping/>
-  </p:clrMapOvr>
-</p:sld>
-</file>
-
-<file path=ppt/slides/slide19.xml><?xml version="1.0" encoding="utf-8"?>
-<p:sld xmlns:a="http://schemas.openxmlformats.org/drawingml/2006/main" xmlns:r="http://schemas.openxmlformats.org/officeDocument/2006/relationships" xmlns:p="http://schemas.openxmlformats.org/presentationml/2006/main">
-  <p:cSld>
-    <p:spTree>
-      <p:nvGrpSpPr>
-        <p:cNvPr id="1" name=""/>
-        <p:cNvGrpSpPr/>
-        <p:nvPr/>
-      </p:nvGrpSpPr>
-      <p:grpSpPr>
-        <a:xfrm>
-          <a:off x="0" y="0"/>
-          <a:ext cx="0" cy="0"/>
-          <a:chOff x="0" y="0"/>
-          <a:chExt cx="0" cy="0"/>
-        </a:xfrm>
-      </p:grpSpPr>
-      <p:sp>
-        <p:nvSpPr>
-          <p:cNvPr id="2" name="Title 1"/>
-          <p:cNvSpPr>
-            <a:spLocks noGrp="1"/>
-          </p:cNvSpPr>
-          <p:nvPr>
-            <p:ph type="title"/>
-          </p:nvPr>
-        </p:nvSpPr>
-        <p:spPr>
-          <a:xfrm>
-            <a:off x="2592925" y="624110"/>
-            <a:ext cx="8911687" cy="780484"/>
-          </a:xfrm>
-        </p:spPr>
-        <p:txBody>
-          <a:bodyPr/>
-          <a:lstStyle/>
-          <a:p>
-            <a:pPr algn="ctr"/>
-            <a:r>
-              <a:rPr lang="en-US" dirty="0" smtClean="0"/>
-              <a:t>ER </a:t>
-            </a:r>
-            <a:r>
-              <a:rPr lang="en-US" dirty="0" smtClean="0">
-                <a:latin typeface="Algerian" panose="04020705040A02060702" pitchFamily="82" charset="0"/>
-              </a:rPr>
-              <a:t>DIAGRAM</a:t>
-            </a:r>
-            <a:endParaRPr lang="en-IN" dirty="0">
-              <a:latin typeface="Algerian" panose="04020705040A02060702" pitchFamily="82" charset="0"/>
-            </a:endParaRPr>
-          </a:p>
-        </p:txBody>
-      </p:sp>
-      <p:pic>
-        <p:nvPicPr>
-          <p:cNvPr id="4" name="Content Placeholder 3"/>
-          <p:cNvPicPr>
-            <a:picLocks noGrp="1" noChangeAspect="1"/>
-          </p:cNvPicPr>
-          <p:nvPr>
-            <p:ph idx="1"/>
-          </p:nvPr>
-        </p:nvPicPr>
-        <p:blipFill>
-          <a:blip r:embed="rId2" cstate="print"/>
-          <a:stretch>
-            <a:fillRect/>
-          </a:stretch>
-        </p:blipFill>
-        <p:spPr>
-          <a:xfrm>
-            <a:off x="2451698" y="1404594"/>
-            <a:ext cx="9124417" cy="4685720"/>
+            <a:off x="2198958" y="989814"/>
+            <a:ext cx="9405437" cy="5622251"/>
           </a:xfrm>
           <a:prstGeom prst="roundRect">
             <a:avLst>
@@ -11237,6 +11145,132 @@
           </a:sp3d>
         </p:spPr>
       </p:pic>
+    </p:spTree>
+    <p:extLst>
+      <p:ext uri="{BB962C8B-B14F-4D97-AF65-F5344CB8AC3E}">
+        <p14:creationId xmlns:p14="http://schemas.microsoft.com/office/powerpoint/2010/main" val="1974539145"/>
+      </p:ext>
+    </p:extLst>
+  </p:cSld>
+  <p:clrMapOvr>
+    <a:masterClrMapping/>
+  </p:clrMapOvr>
+  <p:timing>
+    <p:tnLst>
+      <p:par>
+        <p:cTn id="1" dur="indefinite" restart="never" nodeType="tmRoot"/>
+      </p:par>
+    </p:tnLst>
+  </p:timing>
+</p:sld>
+</file>
+
+<file path=ppt/slides/slide19.xml><?xml version="1.0" encoding="utf-8"?>
+<p:sld xmlns:a="http://schemas.openxmlformats.org/drawingml/2006/main" xmlns:r="http://schemas.openxmlformats.org/officeDocument/2006/relationships" xmlns:p="http://schemas.openxmlformats.org/presentationml/2006/main">
+  <p:cSld>
+    <p:spTree>
+      <p:nvGrpSpPr>
+        <p:cNvPr id="1" name=""/>
+        <p:cNvGrpSpPr/>
+        <p:nvPr/>
+      </p:nvGrpSpPr>
+      <p:grpSpPr>
+        <a:xfrm>
+          <a:off x="0" y="0"/>
+          <a:ext cx="0" cy="0"/>
+          <a:chOff x="0" y="0"/>
+          <a:chExt cx="0" cy="0"/>
+        </a:xfrm>
+      </p:grpSpPr>
+      <p:sp>
+        <p:nvSpPr>
+          <p:cNvPr id="2" name="Title 1"/>
+          <p:cNvSpPr>
+            <a:spLocks noGrp="1"/>
+          </p:cNvSpPr>
+          <p:nvPr>
+            <p:ph type="title"/>
+          </p:nvPr>
+        </p:nvSpPr>
+        <p:spPr>
+          <a:xfrm>
+            <a:off x="2592925" y="624110"/>
+            <a:ext cx="8911687" cy="780484"/>
+          </a:xfrm>
+        </p:spPr>
+        <p:txBody>
+          <a:bodyPr/>
+          <a:lstStyle/>
+          <a:p>
+            <a:pPr algn="ctr"/>
+            <a:r>
+              <a:rPr lang="en-US" dirty="0" smtClean="0"/>
+              <a:t>ER </a:t>
+            </a:r>
+            <a:r>
+              <a:rPr lang="en-US" dirty="0" smtClean="0">
+                <a:latin typeface="Algerian" panose="04020705040A02060702" pitchFamily="82" charset="0"/>
+              </a:rPr>
+              <a:t>DIAGRAM</a:t>
+            </a:r>
+            <a:endParaRPr lang="en-IN" dirty="0">
+              <a:latin typeface="Algerian" panose="04020705040A02060702" pitchFamily="82" charset="0"/>
+            </a:endParaRPr>
+          </a:p>
+        </p:txBody>
+      </p:sp>
+      <p:pic>
+        <p:nvPicPr>
+          <p:cNvPr id="4" name="Content Placeholder 3"/>
+          <p:cNvPicPr>
+            <a:picLocks noGrp="1" noChangeAspect="1"/>
+          </p:cNvPicPr>
+          <p:nvPr>
+            <p:ph idx="1"/>
+          </p:nvPr>
+        </p:nvPicPr>
+        <p:blipFill>
+          <a:blip r:embed="rId2" cstate="print"/>
+          <a:stretch>
+            <a:fillRect/>
+          </a:stretch>
+        </p:blipFill>
+        <p:spPr>
+          <a:xfrm>
+            <a:off x="2451698" y="1404594"/>
+            <a:ext cx="9124417" cy="4685720"/>
+          </a:xfrm>
+          <a:prstGeom prst="roundRect">
+            <a:avLst>
+              <a:gd name="adj" fmla="val 4167"/>
+            </a:avLst>
+          </a:prstGeom>
+          <a:solidFill>
+            <a:srgbClr val="FFFFFF"/>
+          </a:solidFill>
+          <a:ln w="76200" cap="sq">
+            <a:solidFill>
+              <a:srgbClr val="292929"/>
+            </a:solidFill>
+            <a:miter lim="800000"/>
+          </a:ln>
+          <a:effectLst>
+            <a:reflection blurRad="12700" stA="28000" endPos="28000" dist="5000" dir="5400000" sy="-100000" algn="bl" rotWithShape="0"/>
+          </a:effectLst>
+          <a:scene3d>
+            <a:camera prst="orthographicFront"/>
+            <a:lightRig rig="threePt" dir="t">
+              <a:rot lat="0" lon="0" rev="2700000"/>
+            </a:lightRig>
+          </a:scene3d>
+          <a:sp3d>
+            <a:bevelT h="38100"/>
+            <a:contourClr>
+              <a:srgbClr val="C0C0C0"/>
+            </a:contourClr>
+          </a:sp3d>
+        </p:spPr>
+      </p:pic>
       <p:sp>
         <p:nvSpPr>
           <p:cNvPr id="5" name="TextBox 4"/>
@@ -11275,7 +11309,7 @@
     </p:spTree>
     <p:extLst>
       <p:ext uri="{BB962C8B-B14F-4D97-AF65-F5344CB8AC3E}">
-        <p14:creationId xmlns:p14="http://schemas.microsoft.com/office/powerpoint/2010/main" xmlns="" val="1717095262"/>
+        <p14:creationId xmlns:p14="http://schemas.microsoft.com/office/powerpoint/2010/main" val="1717095262"/>
       </p:ext>
     </p:extLst>
   </p:cSld>
@@ -11495,7 +11529,7 @@
     </p:spTree>
     <p:extLst>
       <p:ext uri="{BB962C8B-B14F-4D97-AF65-F5344CB8AC3E}">
-        <p14:creationId xmlns:p14="http://schemas.microsoft.com/office/powerpoint/2010/main" xmlns="" val="2052618121"/>
+        <p14:creationId xmlns:p14="http://schemas.microsoft.com/office/powerpoint/2010/main" val="2052618121"/>
       </p:ext>
     </p:extLst>
   </p:cSld>
@@ -11574,7 +11608,7 @@
         </p:nvSpPr>
         <p:spPr>
           <a:xfrm>
-            <a:off x="3978111" y="6384973"/>
+            <a:off x="3525624" y="6366120"/>
             <a:ext cx="6344240" cy="369332"/>
           </a:xfrm>
           <a:prstGeom prst="rect">
@@ -11616,40 +11650,44 @@
         </p:blipFill>
         <p:spPr bwMode="auto">
           <a:xfrm>
-            <a:off x="2761488" y="1381351"/>
-            <a:ext cx="7936992" cy="4731479"/>
-          </a:xfrm>
-          <a:prstGeom prst="rect">
-            <a:avLst/>
+            <a:off x="2007909" y="1381351"/>
+            <a:ext cx="9605914" cy="4731479"/>
+          </a:xfrm>
+          <a:prstGeom prst="roundRect">
+            <a:avLst>
+              <a:gd name="adj" fmla="val 4167"/>
+            </a:avLst>
           </a:prstGeom>
-          <a:noFill/>
-          <a:ln>
-            <a:noFill/>
+          <a:solidFill>
+            <a:srgbClr val="FFFFFF"/>
+          </a:solidFill>
+          <a:ln w="76200" cap="sq">
+            <a:solidFill>
+              <a:srgbClr val="292929"/>
+            </a:solidFill>
+            <a:miter lim="800000"/>
           </a:ln>
           <a:effectLst>
-            <a:outerShdw blurRad="44450" dist="27940" dir="5400000" algn="ctr">
-              <a:srgbClr val="000000">
-                <a:alpha val="32000"/>
-              </a:srgbClr>
-            </a:outerShdw>
+            <a:reflection blurRad="12700" stA="28000" endPos="28000" dist="5000" dir="5400000" sy="-100000" algn="bl" rotWithShape="0"/>
           </a:effectLst>
           <a:scene3d>
-            <a:camera prst="orthographicFront">
-              <a:rot lat="0" lon="0" rev="0"/>
-            </a:camera>
-            <a:lightRig rig="balanced" dir="t">
-              <a:rot lat="0" lon="0" rev="8700000"/>
+            <a:camera prst="orthographicFront"/>
+            <a:lightRig rig="threePt" dir="t">
+              <a:rot lat="0" lon="0" rev="2700000"/>
             </a:lightRig>
           </a:scene3d>
           <a:sp3d>
-            <a:bevelT w="190500" h="38100"/>
+            <a:bevelT h="38100"/>
+            <a:contourClr>
+              <a:srgbClr val="C0C0C0"/>
+            </a:contourClr>
           </a:sp3d>
         </p:spPr>
       </p:pic>
     </p:spTree>
     <p:extLst>
       <p:ext uri="{BB962C8B-B14F-4D97-AF65-F5344CB8AC3E}">
-        <p14:creationId xmlns:p14="http://schemas.microsoft.com/office/powerpoint/2010/main" xmlns="" val="2992944003"/>
+        <p14:creationId xmlns:p14="http://schemas.microsoft.com/office/powerpoint/2010/main" val="2992944003"/>
       </p:ext>
     </p:extLst>
   </p:cSld>
@@ -11737,28 +11775,53 @@
             <a:off x="1632903" y="1446848"/>
             <a:ext cx="9407274" cy="4588192"/>
           </a:xfrm>
+          <a:prstGeom prst="roundRect">
+            <a:avLst>
+              <a:gd name="adj" fmla="val 4167"/>
+            </a:avLst>
+          </a:prstGeom>
+          <a:solidFill>
+            <a:srgbClr val="FFFFFF"/>
+          </a:solidFill>
+          <a:ln w="76200" cap="sq">
+            <a:solidFill>
+              <a:srgbClr val="292929"/>
+            </a:solidFill>
+            <a:miter lim="800000"/>
+          </a:ln>
+          <a:effectLst>
+            <a:reflection blurRad="12700" stA="28000" endPos="28000" dist="5000" dir="5400000" sy="-100000" algn="bl" rotWithShape="0"/>
+          </a:effectLst>
+          <a:scene3d>
+            <a:camera prst="orthographicFront"/>
+            <a:lightRig rig="threePt" dir="t">
+              <a:rot lat="0" lon="0" rev="2700000"/>
+            </a:lightRig>
+          </a:scene3d>
+          <a:sp3d>
+            <a:bevelT h="38100"/>
+            <a:contourClr>
+              <a:srgbClr val="C0C0C0"/>
+            </a:contourClr>
+          </a:sp3d>
+        </p:spPr>
+      </p:pic>
+      <p:sp>
+        <p:nvSpPr>
+          <p:cNvPr id="6" name="TextBox 5"/>
+          <p:cNvSpPr txBox="1"/>
+          <p:nvPr/>
+        </p:nvSpPr>
+        <p:spPr>
+          <a:xfrm>
+            <a:off x="5659120" y="6278880"/>
+            <a:ext cx="1473200" cy="369332"/>
+          </a:xfrm>
           <a:prstGeom prst="rect">
             <a:avLst/>
           </a:prstGeom>
           <a:noFill/>
         </p:spPr>
-      </p:pic>
-      <p:sp>
-        <p:nvSpPr>
-          <p:cNvPr id="6" name="TextBox 5"/>
-          <p:cNvSpPr txBox="1"/>
-          <p:nvPr/>
-        </p:nvSpPr>
-        <p:spPr>
-          <a:xfrm>
-            <a:off x="5659120" y="6278880"/>
-            <a:ext cx="1473200" cy="369332"/>
-          </a:xfrm>
-          <a:prstGeom prst="rect">
-            <a:avLst/>
-          </a:prstGeom>
-          <a:noFill/>
-        </p:spPr>
         <p:txBody>
           <a:bodyPr wrap="square" rtlCol="0">
             <a:spAutoFit/>
@@ -11776,13 +11839,20 @@
     </p:spTree>
     <p:extLst>
       <p:ext uri="{BB962C8B-B14F-4D97-AF65-F5344CB8AC3E}">
-        <p14:creationId xmlns:p14="http://schemas.microsoft.com/office/powerpoint/2010/main" xmlns="" val="3059376019"/>
+        <p14:creationId xmlns:p14="http://schemas.microsoft.com/office/powerpoint/2010/main" val="3059376019"/>
       </p:ext>
     </p:extLst>
   </p:cSld>
   <p:clrMapOvr>
     <a:masterClrMapping/>
   </p:clrMapOvr>
+  <p:timing>
+    <p:tnLst>
+      <p:par>
+        <p:cTn id="1" dur="indefinite" restart="never" nodeType="tmRoot"/>
+      </p:par>
+    </p:tnLst>
+  </p:timing>
 </p:sld>
 </file>
 
@@ -11857,10 +11927,35 @@
             <a:off x="2156778" y="1306514"/>
             <a:ext cx="8399462" cy="5069466"/>
           </a:xfrm>
-          <a:prstGeom prst="rect">
-            <a:avLst/>
+          <a:prstGeom prst="roundRect">
+            <a:avLst>
+              <a:gd name="adj" fmla="val 4167"/>
+            </a:avLst>
           </a:prstGeom>
-          <a:noFill/>
+          <a:solidFill>
+            <a:srgbClr val="FFFFFF"/>
+          </a:solidFill>
+          <a:ln w="76200" cap="sq">
+            <a:solidFill>
+              <a:srgbClr val="292929"/>
+            </a:solidFill>
+            <a:miter lim="800000"/>
+          </a:ln>
+          <a:effectLst>
+            <a:reflection blurRad="12700" stA="28000" endPos="28000" dist="5000" dir="5400000" sy="-100000" algn="bl" rotWithShape="0"/>
+          </a:effectLst>
+          <a:scene3d>
+            <a:camera prst="orthographicFront"/>
+            <a:lightRig rig="threePt" dir="t">
+              <a:rot lat="0" lon="0" rev="2700000"/>
+            </a:lightRig>
+          </a:scene3d>
+          <a:sp3d>
+            <a:bevelT h="38100"/>
+            <a:contourClr>
+              <a:srgbClr val="C0C0C0"/>
+            </a:contourClr>
+          </a:sp3d>
         </p:spPr>
       </p:pic>
       <p:sp>
@@ -11886,15 +11981,7 @@
           <a:p>
             <a:r>
               <a:rPr lang="en-IN" b="1" dirty="0" smtClean="0"/>
-              <a:t>Level </a:t>
-            </a:r>
-            <a:r>
-              <a:rPr lang="en-IN" b="1" dirty="0" smtClean="0"/>
-              <a:t>1 </a:t>
-            </a:r>
-            <a:r>
-              <a:rPr lang="en-IN" b="1" dirty="0" smtClean="0"/>
-              <a:t>DFD</a:t>
+              <a:t>Level 1 DFD</a:t>
             </a:r>
             <a:endParaRPr lang="en-US" b="1" dirty="0"/>
           </a:p>
@@ -11903,13 +11990,20 @@
     </p:spTree>
     <p:extLst>
       <p:ext uri="{BB962C8B-B14F-4D97-AF65-F5344CB8AC3E}">
-        <p14:creationId xmlns:p14="http://schemas.microsoft.com/office/powerpoint/2010/main" xmlns="" val="3059376019"/>
+        <p14:creationId xmlns:p14="http://schemas.microsoft.com/office/powerpoint/2010/main" val="3059376019"/>
       </p:ext>
     </p:extLst>
   </p:cSld>
   <p:clrMapOvr>
     <a:masterClrMapping/>
   </p:clrMapOvr>
+  <p:timing>
+    <p:tnLst>
+      <p:par>
+        <p:cTn id="1" dur="indefinite" restart="never" nodeType="tmRoot"/>
+      </p:par>
+    </p:tnLst>
+  </p:timing>
 </p:sld>
 </file>
 
@@ -11981,47 +12075,64 @@
         </p:blipFill>
         <p:spPr bwMode="auto">
           <a:xfrm>
-            <a:off x="2464595" y="1301952"/>
-            <a:ext cx="7238205" cy="5085860"/>
+            <a:off x="1946120" y="1301952"/>
+            <a:ext cx="9083240" cy="5085860"/>
+          </a:xfrm>
+          <a:prstGeom prst="roundRect">
+            <a:avLst>
+              <a:gd name="adj" fmla="val 4167"/>
+            </a:avLst>
+          </a:prstGeom>
+          <a:solidFill>
+            <a:srgbClr val="FFFFFF"/>
+          </a:solidFill>
+          <a:ln w="76200" cap="sq">
+            <a:solidFill>
+              <a:srgbClr val="292929"/>
+            </a:solidFill>
+            <a:miter lim="800000"/>
+          </a:ln>
+          <a:effectLst>
+            <a:reflection blurRad="12700" stA="28000" endPos="28000" dist="5000" dir="5400000" sy="-100000" algn="bl" rotWithShape="0"/>
+          </a:effectLst>
+          <a:scene3d>
+            <a:camera prst="orthographicFront"/>
+            <a:lightRig rig="threePt" dir="t">
+              <a:rot lat="0" lon="0" rev="2700000"/>
+            </a:lightRig>
+          </a:scene3d>
+          <a:sp3d>
+            <a:bevelT h="38100"/>
+            <a:contourClr>
+              <a:srgbClr val="C0C0C0"/>
+            </a:contourClr>
+          </a:sp3d>
+        </p:spPr>
+      </p:pic>
+      <p:sp>
+        <p:nvSpPr>
+          <p:cNvPr id="5" name="Rectangle 4"/>
+          <p:cNvSpPr/>
+          <p:nvPr/>
+        </p:nvSpPr>
+        <p:spPr>
+          <a:xfrm>
+            <a:off x="5340103" y="6488668"/>
+            <a:ext cx="1459054" cy="369332"/>
           </a:xfrm>
           <a:prstGeom prst="rect">
             <a:avLst/>
           </a:prstGeom>
-          <a:noFill/>
-        </p:spPr>
-      </p:pic>
-      <p:sp>
-        <p:nvSpPr>
-          <p:cNvPr id="5" name="Rectangle 4"/>
-          <p:cNvSpPr/>
-          <p:nvPr/>
-        </p:nvSpPr>
-        <p:spPr>
-          <a:xfrm>
-            <a:off x="5183593" y="6488668"/>
-            <a:ext cx="1459054" cy="369332"/>
-          </a:xfrm>
-          <a:prstGeom prst="rect">
-            <a:avLst/>
-          </a:prstGeom>
-        </p:spPr>
-        <p:txBody>
-          <a:bodyPr wrap="none">
+        </p:spPr>
+        <p:txBody>
+          <a:bodyPr wrap="square">
             <a:spAutoFit/>
           </a:bodyPr>
           <a:lstStyle/>
           <a:p>
             <a:r>
               <a:rPr lang="en-IN" b="1" dirty="0" smtClean="0"/>
-              <a:t>Level </a:t>
-            </a:r>
-            <a:r>
-              <a:rPr lang="en-IN" b="1" dirty="0" smtClean="0"/>
-              <a:t>2 </a:t>
-            </a:r>
-            <a:r>
-              <a:rPr lang="en-IN" b="1" dirty="0" smtClean="0"/>
-              <a:t>DFD</a:t>
+              <a:t>Level 2 DFD</a:t>
             </a:r>
             <a:endParaRPr lang="en-US" b="1" dirty="0"/>
           </a:p>
@@ -12030,7 +12141,7 @@
     </p:spTree>
     <p:extLst>
       <p:ext uri="{BB962C8B-B14F-4D97-AF65-F5344CB8AC3E}">
-        <p14:creationId xmlns:p14="http://schemas.microsoft.com/office/powerpoint/2010/main" xmlns="" val="3059376019"/>
+        <p14:creationId xmlns:p14="http://schemas.microsoft.com/office/powerpoint/2010/main" val="3059376019"/>
       </p:ext>
     </p:extLst>
   </p:cSld>
@@ -12213,7 +12324,7 @@
     </p:spTree>
     <p:extLst>
       <p:ext uri="{BB962C8B-B14F-4D97-AF65-F5344CB8AC3E}">
-        <p14:creationId xmlns:p14="http://schemas.microsoft.com/office/powerpoint/2010/main" xmlns="" val="3968908613"/>
+        <p14:creationId xmlns:p14="http://schemas.microsoft.com/office/powerpoint/2010/main" val="3968908613"/>
       </p:ext>
     </p:extLst>
   </p:cSld>
@@ -12450,7 +12561,7 @@
     </p:spTree>
     <p:extLst>
       <p:ext uri="{BB962C8B-B14F-4D97-AF65-F5344CB8AC3E}">
-        <p14:creationId xmlns:p14="http://schemas.microsoft.com/office/powerpoint/2010/main" xmlns="" val="1379778435"/>
+        <p14:creationId xmlns:p14="http://schemas.microsoft.com/office/powerpoint/2010/main" val="1379778435"/>
       </p:ext>
     </p:extLst>
   </p:cSld>
@@ -12555,7 +12666,7 @@
     </p:spTree>
     <p:extLst>
       <p:ext uri="{BB962C8B-B14F-4D97-AF65-F5344CB8AC3E}">
-        <p14:creationId xmlns:p14="http://schemas.microsoft.com/office/powerpoint/2010/main" xmlns="" val="3097096989"/>
+        <p14:creationId xmlns:p14="http://schemas.microsoft.com/office/powerpoint/2010/main" val="3097096989"/>
       </p:ext>
     </p:extLst>
   </p:cSld>
@@ -12658,7 +12769,7 @@
     </p:spTree>
     <p:extLst>
       <p:ext uri="{BB962C8B-B14F-4D97-AF65-F5344CB8AC3E}">
-        <p14:creationId xmlns:p14="http://schemas.microsoft.com/office/powerpoint/2010/main" xmlns="" val="3184472628"/>
+        <p14:creationId xmlns:p14="http://schemas.microsoft.com/office/powerpoint/2010/main" val="3184472628"/>
       </p:ext>
     </p:extLst>
   </p:cSld>
@@ -12883,7 +12994,7 @@
     </p:spTree>
     <p:extLst>
       <p:ext uri="{BB962C8B-B14F-4D97-AF65-F5344CB8AC3E}">
-        <p14:creationId xmlns:p14="http://schemas.microsoft.com/office/powerpoint/2010/main" xmlns="" val="1027228061"/>
+        <p14:creationId xmlns:p14="http://schemas.microsoft.com/office/powerpoint/2010/main" val="1027228061"/>
       </p:ext>
     </p:extLst>
   </p:cSld>
@@ -13038,7 +13149,7 @@
     </p:spTree>
     <p:extLst>
       <p:ext uri="{BB962C8B-B14F-4D97-AF65-F5344CB8AC3E}">
-        <p14:creationId xmlns:p14="http://schemas.microsoft.com/office/powerpoint/2010/main" xmlns="" val="2020973106"/>
+        <p14:creationId xmlns:p14="http://schemas.microsoft.com/office/powerpoint/2010/main" val="2020973106"/>
       </p:ext>
     </p:extLst>
   </p:cSld>
@@ -13119,7 +13230,7 @@
           <a:blip r:embed="rId2" cstate="print">
             <a:extLst>
               <a:ext uri="{28A0092B-C50C-407E-A947-70E740481C1C}">
-                <a14:useLocalDpi xmlns:a14="http://schemas.microsoft.com/office/drawing/2010/main" xmlns="" val="0"/>
+                <a14:useLocalDpi xmlns:a14="http://schemas.microsoft.com/office/drawing/2010/main" val="0"/>
               </a:ext>
             </a:extLst>
           </a:blip>
@@ -13166,7 +13277,7 @@
     </p:spTree>
     <p:extLst>
       <p:ext uri="{BB962C8B-B14F-4D97-AF65-F5344CB8AC3E}">
-        <p14:creationId xmlns:p14="http://schemas.microsoft.com/office/powerpoint/2010/main" xmlns="" val="551090893"/>
+        <p14:creationId xmlns:p14="http://schemas.microsoft.com/office/powerpoint/2010/main" val="551090893"/>
       </p:ext>
     </p:extLst>
   </p:cSld>
@@ -13618,6 +13729,13 @@
   <p:clrMapOvr>
     <a:masterClrMapping/>
   </p:clrMapOvr>
+  <p:timing>
+    <p:tnLst>
+      <p:par>
+        <p:cTn id="1" dur="indefinite" restart="never" nodeType="tmRoot"/>
+      </p:par>
+    </p:tnLst>
+  </p:timing>
 </p:sld>
 </file>
 
@@ -14160,7 +14278,7 @@
     </p:spTree>
     <p:extLst>
       <p:ext uri="{BB962C8B-B14F-4D97-AF65-F5344CB8AC3E}">
-        <p14:creationId xmlns:p14="http://schemas.microsoft.com/office/powerpoint/2010/main" xmlns="" val="1361238431"/>
+        <p14:creationId xmlns:p14="http://schemas.microsoft.com/office/powerpoint/2010/main" val="1361238431"/>
       </p:ext>
     </p:extLst>
   </p:cSld>
@@ -15262,7 +15380,7 @@
     </p:spTree>
     <p:extLst>
       <p:ext uri="{BB962C8B-B14F-4D97-AF65-F5344CB8AC3E}">
-        <p14:creationId xmlns:p14="http://schemas.microsoft.com/office/powerpoint/2010/main" xmlns="" val="2347577460"/>
+        <p14:creationId xmlns:p14="http://schemas.microsoft.com/office/powerpoint/2010/main" val="2347577460"/>
       </p:ext>
     </p:extLst>
   </p:cSld>
@@ -15345,7 +15463,7 @@
     </p:spTree>
     <p:extLst>
       <p:ext uri="{BB962C8B-B14F-4D97-AF65-F5344CB8AC3E}">
-        <p14:creationId xmlns:p14="http://schemas.microsoft.com/office/powerpoint/2010/main" xmlns="" val="1912276581"/>
+        <p14:creationId xmlns:p14="http://schemas.microsoft.com/office/powerpoint/2010/main" val="1912276581"/>
       </p:ext>
     </p:extLst>
   </p:cSld>
@@ -15561,7 +15679,7 @@
     </p:spTree>
     <p:extLst>
       <p:ext uri="{BB962C8B-B14F-4D97-AF65-F5344CB8AC3E}">
-        <p14:creationId xmlns:p14="http://schemas.microsoft.com/office/powerpoint/2010/main" xmlns="" val="2625934534"/>
+        <p14:creationId xmlns:p14="http://schemas.microsoft.com/office/powerpoint/2010/main" val="2625934534"/>
       </p:ext>
     </p:extLst>
   </p:cSld>
@@ -15724,7 +15842,7 @@
     </p:spTree>
     <p:extLst>
       <p:ext uri="{BB962C8B-B14F-4D97-AF65-F5344CB8AC3E}">
-        <p14:creationId xmlns:p14="http://schemas.microsoft.com/office/powerpoint/2010/main" xmlns="" val="1400058215"/>
+        <p14:creationId xmlns:p14="http://schemas.microsoft.com/office/powerpoint/2010/main" val="1400058215"/>
       </p:ext>
     </p:extLst>
   </p:cSld>
@@ -15950,7 +16068,7 @@
     </p:spTree>
     <p:extLst>
       <p:ext uri="{BB962C8B-B14F-4D97-AF65-F5344CB8AC3E}">
-        <p14:creationId xmlns:p14="http://schemas.microsoft.com/office/powerpoint/2010/main" xmlns="" val="1165276255"/>
+        <p14:creationId xmlns:p14="http://schemas.microsoft.com/office/powerpoint/2010/main" val="1165276255"/>
       </p:ext>
     </p:extLst>
   </p:cSld>
@@ -16099,7 +16217,7 @@
     </p:spTree>
     <p:extLst>
       <p:ext uri="{BB962C8B-B14F-4D97-AF65-F5344CB8AC3E}">
-        <p14:creationId xmlns:p14="http://schemas.microsoft.com/office/powerpoint/2010/main" xmlns="" val="2972335740"/>
+        <p14:creationId xmlns:p14="http://schemas.microsoft.com/office/powerpoint/2010/main" val="2972335740"/>
       </p:ext>
     </p:extLst>
   </p:cSld>
@@ -16311,7 +16429,7 @@
           <a:blip r:embed="rId2" cstate="print">
             <a:extLst>
               <a:ext uri="{28A0092B-C50C-407E-A947-70E740481C1C}">
-                <a14:useLocalDpi xmlns:a14="http://schemas.microsoft.com/office/drawing/2010/main" xmlns="" val="0"/>
+                <a14:useLocalDpi xmlns:a14="http://schemas.microsoft.com/office/drawing/2010/main" val="0"/>
               </a:ext>
             </a:extLst>
           </a:blip>
@@ -16367,7 +16485,7 @@
           <a:blip r:embed="rId3" cstate="print">
             <a:extLst>
               <a:ext uri="{28A0092B-C50C-407E-A947-70E740481C1C}">
-                <a14:useLocalDpi xmlns:a14="http://schemas.microsoft.com/office/drawing/2010/main" xmlns="" val="0"/>
+                <a14:useLocalDpi xmlns:a14="http://schemas.microsoft.com/office/drawing/2010/main" val="0"/>
               </a:ext>
             </a:extLst>
           </a:blip>
@@ -16552,7 +16670,7 @@
           <a:blip r:embed="rId2" cstate="print">
             <a:extLst>
               <a:ext uri="{28A0092B-C50C-407E-A947-70E740481C1C}">
-                <a14:useLocalDpi xmlns:a14="http://schemas.microsoft.com/office/drawing/2010/main" xmlns="" val="0"/>
+                <a14:useLocalDpi xmlns:a14="http://schemas.microsoft.com/office/drawing/2010/main" val="0"/>
               </a:ext>
             </a:extLst>
           </a:blip>
@@ -16599,7 +16717,7 @@
     </p:spTree>
     <p:extLst>
       <p:ext uri="{BB962C8B-B14F-4D97-AF65-F5344CB8AC3E}">
-        <p14:creationId xmlns:p14="http://schemas.microsoft.com/office/powerpoint/2010/main" xmlns="" val="2841187319"/>
+        <p14:creationId xmlns:p14="http://schemas.microsoft.com/office/powerpoint/2010/main" val="2841187319"/>
       </p:ext>
     </p:extLst>
   </p:cSld>
@@ -16853,7 +16971,7 @@
   <a:extraClrSchemeLst/>
   <a:extLst>
     <a:ext uri="{05A4C25C-085E-4340-85A3-A5531E510DB2}">
-      <thm15:themeFamily xmlns:thm15="http://schemas.microsoft.com/office/thememl/2012/main" xmlns="" name="Wisp" id="{7CB32D59-10C0-40DD-B7BD-2E94284A981C}" vid="{F20B7C8E-B819-43F3-AAF9-EE50B1A83630}"/>
+      <thm15:themeFamily xmlns:thm15="http://schemas.microsoft.com/office/thememl/2012/main" name="Wisp" id="{7CB32D59-10C0-40DD-B7BD-2E94284A981C}" vid="{F20B7C8E-B819-43F3-AAF9-EE50B1A83630}"/>
     </a:ext>
   </a:extLst>
 </a:theme>
@@ -17114,7 +17232,7 @@
   <a:extraClrSchemeLst/>
   <a:extLst>
     <a:ext uri="{05A4C25C-085E-4340-85A3-A5531E510DB2}">
-      <thm15:themeFamily xmlns:thm15="http://schemas.microsoft.com/office/thememl/2012/main" xmlns="" name="Office Theme" id="{62F939B6-93AF-4DB8-9C6B-D6C7DFDC589F}" vid="{4A3C46E8-61CC-4603-A589-7422A47A8E4A}"/>
+      <thm15:themeFamily xmlns:thm15="http://schemas.microsoft.com/office/thememl/2012/main" name="Office Theme" id="{62F939B6-93AF-4DB8-9C6B-D6C7DFDC589F}" vid="{4A3C46E8-61CC-4603-A589-7422A47A8E4A}"/>
     </a:ext>
   </a:extLst>
 </a:theme>

</xml_diff>